<commit_message>
Add presentation updated and notebook with the dataset modified;
</commit_message>
<xml_diff>
--- a/Presentation.pptx
+++ b/Presentation.pptx
@@ -10,9 +10,11 @@
     <p:sldId id="257" r:id="rId4"/>
     <p:sldId id="260" r:id="rId5"/>
     <p:sldId id="262" r:id="rId6"/>
-    <p:sldId id="261" r:id="rId7"/>
-    <p:sldId id="263" r:id="rId8"/>
-    <p:sldId id="259" r:id="rId9"/>
+    <p:sldId id="265" r:id="rId7"/>
+    <p:sldId id="264" r:id="rId8"/>
+    <p:sldId id="261" r:id="rId9"/>
+    <p:sldId id="263" r:id="rId10"/>
+    <p:sldId id="259" r:id="rId11"/>
   </p:sldIdLst>
   <p:sldSz cx="12192000" cy="6858000"/>
   <p:notesSz cx="6858000" cy="9144000"/>
@@ -111,6 +113,29 @@
       </a:defRPr>
     </a:lvl9pPr>
   </p:defaultTextStyle>
+  <p:extLst>
+    <p:ext uri="{521415D9-36F7-43E2-AB2F-B90AF26B5E84}">
+      <p14:sectionLst xmlns:p14="http://schemas.microsoft.com/office/powerpoint/2010/main">
+        <p14:section name="Default Section" id="{DD5307BF-C712-914B-8142-C50BD2A6323E}">
+          <p14:sldIdLst>
+            <p14:sldId id="256"/>
+            <p14:sldId id="258"/>
+            <p14:sldId id="257"/>
+            <p14:sldId id="260"/>
+            <p14:sldId id="262"/>
+            <p14:sldId id="265"/>
+            <p14:sldId id="264"/>
+            <p14:sldId id="261"/>
+            <p14:sldId id="263"/>
+            <p14:sldId id="259"/>
+          </p14:sldIdLst>
+        </p14:section>
+        <p14:section name="Pipeline" id="{C32284C8-BCB6-D64E-99B2-12EB62CDFCF4}">
+          <p14:sldIdLst/>
+        </p14:section>
+      </p14:sectionLst>
+    </p:ext>
+  </p:extLst>
 </p:presentation>
 </file>
 
@@ -8072,6 +8097,310 @@
 </p:sld>
 </file>
 
+<file path=ppt/slides/slide10.xml><?xml version="1.0" encoding="utf-8"?>
+<p:sld xmlns:a="http://schemas.openxmlformats.org/drawingml/2006/main" xmlns:r="http://schemas.openxmlformats.org/officeDocument/2006/relationships" xmlns:p="http://schemas.openxmlformats.org/presentationml/2006/main">
+  <p:cSld>
+    <p:spTree>
+      <p:nvGrpSpPr>
+        <p:cNvPr id="1" name=""/>
+        <p:cNvGrpSpPr/>
+        <p:nvPr/>
+      </p:nvGrpSpPr>
+      <p:grpSpPr>
+        <a:xfrm>
+          <a:off x="0" y="0"/>
+          <a:ext cx="0" cy="0"/>
+          <a:chOff x="0" y="0"/>
+          <a:chExt cx="0" cy="0"/>
+        </a:xfrm>
+      </p:grpSpPr>
+      <p:sp>
+        <p:nvSpPr>
+          <p:cNvPr id="2" name="Title 1">
+            <a:extLst>
+              <a:ext uri="{FF2B5EF4-FFF2-40B4-BE49-F238E27FC236}">
+                <a16:creationId xmlns:a16="http://schemas.microsoft.com/office/drawing/2014/main" id="{0A3F13E1-FBC2-8129-4193-6EAC1898ECEB}"/>
+              </a:ext>
+            </a:extLst>
+          </p:cNvPr>
+          <p:cNvSpPr>
+            <a:spLocks noGrp="1"/>
+          </p:cNvSpPr>
+          <p:nvPr>
+            <p:ph type="title"/>
+          </p:nvPr>
+        </p:nvSpPr>
+        <p:spPr/>
+        <p:txBody>
+          <a:bodyPr/>
+          <a:lstStyle/>
+          <a:p>
+            <a:r>
+              <a:rPr lang="en-US" dirty="0"/>
+              <a:t>Classification problem/model</a:t>
+            </a:r>
+          </a:p>
+        </p:txBody>
+      </p:sp>
+      <p:sp>
+        <p:nvSpPr>
+          <p:cNvPr id="3" name="Content Placeholder 2">
+            <a:extLst>
+              <a:ext uri="{FF2B5EF4-FFF2-40B4-BE49-F238E27FC236}">
+                <a16:creationId xmlns:a16="http://schemas.microsoft.com/office/drawing/2014/main" id="{22259D3C-32FB-1EDC-BE2D-6EAAD7F244FF}"/>
+              </a:ext>
+            </a:extLst>
+          </p:cNvPr>
+          <p:cNvSpPr>
+            <a:spLocks noGrp="1"/>
+          </p:cNvSpPr>
+          <p:nvPr>
+            <p:ph sz="half" idx="1"/>
+          </p:nvPr>
+        </p:nvSpPr>
+        <p:spPr>
+          <a:xfrm>
+            <a:off x="1371600" y="2112265"/>
+            <a:ext cx="4846320" cy="3959352"/>
+          </a:xfrm>
+        </p:spPr>
+        <p:txBody>
+          <a:bodyPr>
+            <a:normAutofit fontScale="85000" lnSpcReduction="10000"/>
+          </a:bodyPr>
+          <a:lstStyle/>
+          <a:p>
+            <a:pPr algn="just">
+              <a:lnSpc>
+                <a:spcPct val="160000"/>
+              </a:lnSpc>
+            </a:pPr>
+            <a:r>
+              <a:rPr lang="en-US" dirty="0"/>
+              <a:t>Baseline model 1</a:t>
+            </a:r>
+          </a:p>
+          <a:p>
+            <a:pPr algn="just">
+              <a:lnSpc>
+                <a:spcPct val="160000"/>
+              </a:lnSpc>
+            </a:pPr>
+            <a:r>
+              <a:rPr lang="en-US" dirty="0"/>
+              <a:t>Logistic Regressor</a:t>
+            </a:r>
+          </a:p>
+          <a:p>
+            <a:pPr marL="0" indent="0" algn="just">
+              <a:lnSpc>
+                <a:spcPct val="160000"/>
+              </a:lnSpc>
+              <a:buNone/>
+            </a:pPr>
+            <a:r>
+              <a:rPr lang="en-US" i="1" dirty="0"/>
+              <a:t>Evaluation metrics</a:t>
+            </a:r>
+          </a:p>
+          <a:p>
+            <a:pPr marL="0" indent="0" algn="just">
+              <a:lnSpc>
+                <a:spcPct val="160000"/>
+              </a:lnSpc>
+              <a:buNone/>
+            </a:pPr>
+            <a:r>
+              <a:rPr lang="en-CA" b="0" i="0" dirty="0">
+                <a:effectLst/>
+                <a:highlight>
+                  <a:srgbClr val="FFFF00"/>
+                </a:highlight>
+              </a:rPr>
+              <a:t>Accuracy: 0.7218543046357616</a:t>
+            </a:r>
+          </a:p>
+          <a:p>
+            <a:pPr marL="0" indent="0" algn="just">
+              <a:lnSpc>
+                <a:spcPct val="160000"/>
+              </a:lnSpc>
+              <a:buNone/>
+            </a:pPr>
+            <a:r>
+              <a:rPr lang="en-CA" b="0" i="0" dirty="0">
+                <a:effectLst/>
+              </a:rPr>
+              <a:t>Precision: 0.7043478260869566 </a:t>
+            </a:r>
+          </a:p>
+          <a:p>
+            <a:pPr marL="0" indent="0" algn="just">
+              <a:lnSpc>
+                <a:spcPct val="160000"/>
+              </a:lnSpc>
+              <a:buNone/>
+            </a:pPr>
+            <a:r>
+              <a:rPr lang="en-CA" b="0" i="0" dirty="0">
+                <a:effectLst/>
+              </a:rPr>
+              <a:t>Recall: 0.9101123595505618 </a:t>
+            </a:r>
+          </a:p>
+          <a:p>
+            <a:pPr marL="0" indent="0" algn="just">
+              <a:lnSpc>
+                <a:spcPct val="160000"/>
+              </a:lnSpc>
+              <a:buNone/>
+            </a:pPr>
+            <a:r>
+              <a:rPr lang="en-CA" b="0" i="0" dirty="0">
+                <a:effectLst/>
+              </a:rPr>
+              <a:t>F1-score: 0.7941176470588236</a:t>
+            </a:r>
+            <a:endParaRPr lang="en-US" dirty="0"/>
+          </a:p>
+        </p:txBody>
+      </p:sp>
+      <p:sp>
+        <p:nvSpPr>
+          <p:cNvPr id="4" name="Content Placeholder 3">
+            <a:extLst>
+              <a:ext uri="{FF2B5EF4-FFF2-40B4-BE49-F238E27FC236}">
+                <a16:creationId xmlns:a16="http://schemas.microsoft.com/office/drawing/2014/main" id="{94D0BA7E-AF13-72EA-A7FA-F041FBDAD482}"/>
+              </a:ext>
+            </a:extLst>
+          </p:cNvPr>
+          <p:cNvSpPr>
+            <a:spLocks noGrp="1"/>
+          </p:cNvSpPr>
+          <p:nvPr>
+            <p:ph sz="half" idx="2"/>
+          </p:nvPr>
+        </p:nvSpPr>
+        <p:spPr>
+          <a:xfrm>
+            <a:off x="6604514" y="2112266"/>
+            <a:ext cx="4846320" cy="3959351"/>
+          </a:xfrm>
+        </p:spPr>
+        <p:txBody>
+          <a:bodyPr>
+            <a:normAutofit fontScale="85000" lnSpcReduction="10000"/>
+          </a:bodyPr>
+          <a:lstStyle/>
+          <a:p>
+            <a:pPr algn="just">
+              <a:lnSpc>
+                <a:spcPct val="160000"/>
+              </a:lnSpc>
+            </a:pPr>
+            <a:r>
+              <a:rPr lang="en-US" dirty="0"/>
+              <a:t>Baseline model 2</a:t>
+            </a:r>
+          </a:p>
+          <a:p>
+            <a:pPr algn="just">
+              <a:lnSpc>
+                <a:spcPct val="160000"/>
+              </a:lnSpc>
+            </a:pPr>
+            <a:r>
+              <a:rPr lang="en-US" dirty="0"/>
+              <a:t>Random Forest</a:t>
+            </a:r>
+          </a:p>
+          <a:p>
+            <a:pPr marL="0" indent="0" algn="just">
+              <a:lnSpc>
+                <a:spcPct val="160000"/>
+              </a:lnSpc>
+              <a:buNone/>
+            </a:pPr>
+            <a:r>
+              <a:rPr lang="en-US" i="1" dirty="0"/>
+              <a:t>Evaluation metrics</a:t>
+            </a:r>
+          </a:p>
+          <a:p>
+            <a:pPr marL="0" indent="0" algn="just">
+              <a:lnSpc>
+                <a:spcPct val="160000"/>
+              </a:lnSpc>
+              <a:buNone/>
+            </a:pPr>
+            <a:r>
+              <a:rPr lang="en-CA" b="0" i="0" dirty="0">
+                <a:effectLst/>
+                <a:highlight>
+                  <a:srgbClr val="FFFF00"/>
+                </a:highlight>
+              </a:rPr>
+              <a:t>Accuracy: 0.6754966887417219</a:t>
+            </a:r>
+          </a:p>
+          <a:p>
+            <a:pPr marL="0" indent="0" algn="just">
+              <a:lnSpc>
+                <a:spcPct val="160000"/>
+              </a:lnSpc>
+              <a:buNone/>
+            </a:pPr>
+            <a:r>
+              <a:rPr lang="en-CA" b="0" i="0" dirty="0">
+                <a:effectLst/>
+              </a:rPr>
+              <a:t>Precision: 0.6694915254237288</a:t>
+            </a:r>
+          </a:p>
+          <a:p>
+            <a:pPr marL="0" indent="0" algn="just">
+              <a:lnSpc>
+                <a:spcPct val="160000"/>
+              </a:lnSpc>
+              <a:buNone/>
+            </a:pPr>
+            <a:r>
+              <a:rPr lang="en-CA" b="0" i="0" dirty="0">
+                <a:effectLst/>
+              </a:rPr>
+              <a:t>Recall: 0.8876404494382022</a:t>
+            </a:r>
+          </a:p>
+          <a:p>
+            <a:pPr marL="0" indent="0" algn="just">
+              <a:lnSpc>
+                <a:spcPct val="160000"/>
+              </a:lnSpc>
+              <a:buNone/>
+            </a:pPr>
+            <a:r>
+              <a:rPr lang="en-CA" b="0" i="0" dirty="0">
+                <a:effectLst/>
+              </a:rPr>
+              <a:t>F1-score: 0.7632850241545893</a:t>
+            </a:r>
+            <a:endParaRPr lang="en-US" dirty="0"/>
+          </a:p>
+        </p:txBody>
+      </p:sp>
+    </p:spTree>
+    <p:extLst>
+      <p:ext uri="{BB962C8B-B14F-4D97-AF65-F5344CB8AC3E}">
+        <p14:creationId xmlns:p14="http://schemas.microsoft.com/office/powerpoint/2010/main" val="323434526"/>
+      </p:ext>
+    </p:extLst>
+  </p:cSld>
+  <p:clrMapOvr>
+    <a:masterClrMapping/>
+  </p:clrMapOvr>
+</p:sld>
+</file>
+
 <file path=ppt/slides/slide2.xml><?xml version="1.0" encoding="utf-8"?>
 <p:sld xmlns:a="http://schemas.openxmlformats.org/drawingml/2006/main" xmlns:r="http://schemas.openxmlformats.org/officeDocument/2006/relationships" xmlns:p="http://schemas.openxmlformats.org/presentationml/2006/main">
   <p:cSld>
@@ -8967,6 +9296,14 @@
 <file path=ppt/slides/slide6.xml><?xml version="1.0" encoding="utf-8"?>
 <p:sld xmlns:a="http://schemas.openxmlformats.org/drawingml/2006/main" xmlns:r="http://schemas.openxmlformats.org/officeDocument/2006/relationships" xmlns:p="http://schemas.openxmlformats.org/presentationml/2006/main">
   <p:cSld>
+    <p:bg>
+      <p:bgPr>
+        <a:solidFill>
+          <a:schemeClr val="bg1"/>
+        </a:solidFill>
+        <a:effectLst/>
+      </p:bgPr>
+    </p:bg>
     <p:spTree>
       <p:nvGrpSpPr>
         <p:cNvPr id="1" name=""/>
@@ -8983,10 +9320,236 @@
       </p:grpSpPr>
       <p:sp>
         <p:nvSpPr>
-          <p:cNvPr id="2" name="Title 1">
-            <a:extLst>
-              <a:ext uri="{FF2B5EF4-FFF2-40B4-BE49-F238E27FC236}">
-                <a16:creationId xmlns:a16="http://schemas.microsoft.com/office/drawing/2014/main" id="{5A94E3A4-FAAF-A502-8265-B2AE97300322}"/>
+          <p:cNvPr id="27" name="Rectangle 10">
+            <a:extLst>
+              <a:ext uri="{FF2B5EF4-FFF2-40B4-BE49-F238E27FC236}">
+                <a16:creationId xmlns:a16="http://schemas.microsoft.com/office/drawing/2014/main" id="{BD4C0BBB-0042-4603-A226-6117F3FD5B3C}"/>
+              </a:ext>
+              <a:ext uri="{C183D7F6-B498-43B3-948B-1728B52AA6E4}">
+                <adec:decorative xmlns:adec="http://schemas.microsoft.com/office/drawing/2017/decorative" val="1"/>
+              </a:ext>
+            </a:extLst>
+          </p:cNvPr>
+          <p:cNvSpPr>
+            <a:spLocks noGrp="1" noRot="1" noChangeAspect="1" noMove="1" noResize="1" noEditPoints="1" noAdjustHandles="1" noChangeArrowheads="1" noChangeShapeType="1" noTextEdit="1"/>
+          </p:cNvSpPr>
+          <p:nvPr>
+            <p:extLst>
+              <p:ext uri="{386F3935-93C4-4BCD-93E2-E3B085C9AB24}">
+                <p16:designElem xmlns:p16="http://schemas.microsoft.com/office/powerpoint/2015/main" val="1"/>
+              </p:ext>
+            </p:extLst>
+          </p:nvPr>
+        </p:nvSpPr>
+        <p:spPr>
+          <a:xfrm rot="10800000" flipH="1">
+            <a:off x="0" y="6400799"/>
+            <a:ext cx="12192000" cy="456773"/>
+          </a:xfrm>
+          <a:prstGeom prst="rect">
+            <a:avLst/>
+          </a:prstGeom>
+          <a:gradFill>
+            <a:gsLst>
+              <a:gs pos="14000">
+                <a:schemeClr val="accent4">
+                  <a:alpha val="28000"/>
+                </a:schemeClr>
+              </a:gs>
+              <a:gs pos="100000">
+                <a:schemeClr val="accent5">
+                  <a:alpha val="85000"/>
+                </a:schemeClr>
+              </a:gs>
+            </a:gsLst>
+            <a:lin ang="6000000" scaled="0"/>
+          </a:gradFill>
+          <a:ln>
+            <a:noFill/>
+          </a:ln>
+        </p:spPr>
+        <p:style>
+          <a:lnRef idx="2">
+            <a:schemeClr val="accent1">
+              <a:shade val="50000"/>
+            </a:schemeClr>
+          </a:lnRef>
+          <a:fillRef idx="1">
+            <a:schemeClr val="accent1"/>
+          </a:fillRef>
+          <a:effectRef idx="0">
+            <a:schemeClr val="accent1"/>
+          </a:effectRef>
+          <a:fontRef idx="minor">
+            <a:schemeClr val="lt1"/>
+          </a:fontRef>
+        </p:style>
+        <p:txBody>
+          <a:bodyPr rtlCol="0" anchor="ctr"/>
+          <a:lstStyle/>
+          <a:p>
+            <a:pPr algn="ctr"/>
+            <a:endParaRPr lang="en-US"/>
+          </a:p>
+        </p:txBody>
+      </p:sp>
+      <p:sp>
+        <p:nvSpPr>
+          <p:cNvPr id="28" name="Rectangle 12">
+            <a:extLst>
+              <a:ext uri="{FF2B5EF4-FFF2-40B4-BE49-F238E27FC236}">
+                <a16:creationId xmlns:a16="http://schemas.microsoft.com/office/drawing/2014/main" id="{EC44F520-2598-460E-9F91-B02F60830CA2}"/>
+              </a:ext>
+              <a:ext uri="{C183D7F6-B498-43B3-948B-1728B52AA6E4}">
+                <adec:decorative xmlns:adec="http://schemas.microsoft.com/office/drawing/2017/decorative" val="1"/>
+              </a:ext>
+            </a:extLst>
+          </p:cNvPr>
+          <p:cNvSpPr>
+            <a:spLocks noGrp="1" noRot="1" noChangeAspect="1" noMove="1" noResize="1" noEditPoints="1" noAdjustHandles="1" noChangeArrowheads="1" noChangeShapeType="1" noTextEdit="1"/>
+          </p:cNvSpPr>
+          <p:nvPr>
+            <p:extLst>
+              <p:ext uri="{386F3935-93C4-4BCD-93E2-E3B085C9AB24}">
+                <p16:designElem xmlns:p16="http://schemas.microsoft.com/office/powerpoint/2015/main" val="1"/>
+              </p:ext>
+            </p:extLst>
+          </p:nvPr>
+        </p:nvSpPr>
+        <p:spPr>
+          <a:xfrm flipH="1">
+            <a:off x="4038600" y="6400799"/>
+            <a:ext cx="8153398" cy="456772"/>
+          </a:xfrm>
+          <a:prstGeom prst="rect">
+            <a:avLst/>
+          </a:prstGeom>
+          <a:gradFill>
+            <a:gsLst>
+              <a:gs pos="9000">
+                <a:schemeClr val="accent2">
+                  <a:lumMod val="60000"/>
+                  <a:lumOff val="40000"/>
+                  <a:alpha val="55000"/>
+                </a:schemeClr>
+              </a:gs>
+              <a:gs pos="99000">
+                <a:schemeClr val="accent2"/>
+              </a:gs>
+            </a:gsLst>
+            <a:lin ang="14400000" scaled="0"/>
+          </a:gradFill>
+          <a:ln>
+            <a:noFill/>
+          </a:ln>
+        </p:spPr>
+        <p:style>
+          <a:lnRef idx="2">
+            <a:schemeClr val="accent1">
+              <a:shade val="50000"/>
+            </a:schemeClr>
+          </a:lnRef>
+          <a:fillRef idx="1">
+            <a:schemeClr val="accent1"/>
+          </a:fillRef>
+          <a:effectRef idx="0">
+            <a:schemeClr val="accent1"/>
+          </a:effectRef>
+          <a:fontRef idx="minor">
+            <a:schemeClr val="lt1"/>
+          </a:fontRef>
+        </p:style>
+        <p:txBody>
+          <a:bodyPr rtlCol="0" anchor="ctr"/>
+          <a:lstStyle/>
+          <a:p>
+            <a:pPr algn="ctr"/>
+            <a:endParaRPr lang="en-US"/>
+          </a:p>
+        </p:txBody>
+      </p:sp>
+      <p:sp useBgFill="1">
+        <p:nvSpPr>
+          <p:cNvPr id="29" name="Rectangle 14">
+            <a:extLst>
+              <a:ext uri="{FF2B5EF4-FFF2-40B4-BE49-F238E27FC236}">
+                <a16:creationId xmlns:a16="http://schemas.microsoft.com/office/drawing/2014/main" id="{2F23DF24-8E9A-4AD0-93DF-A82A41666725}"/>
+              </a:ext>
+              <a:ext uri="{C183D7F6-B498-43B3-948B-1728B52AA6E4}">
+                <adec:decorative xmlns:adec="http://schemas.microsoft.com/office/drawing/2017/decorative" val="1"/>
+              </a:ext>
+            </a:extLst>
+          </p:cNvPr>
+          <p:cNvSpPr>
+            <a:spLocks noGrp="1" noRot="1" noChangeAspect="1" noMove="1" noResize="1" noEditPoints="1" noAdjustHandles="1" noChangeArrowheads="1" noChangeShapeType="1" noTextEdit="1"/>
+          </p:cNvSpPr>
+          <p:nvPr>
+            <p:extLst>
+              <p:ext uri="{386F3935-93C4-4BCD-93E2-E3B085C9AB24}">
+                <p16:designElem xmlns:p16="http://schemas.microsoft.com/office/powerpoint/2015/main" val="1"/>
+              </p:ext>
+            </p:extLst>
+          </p:nvPr>
+        </p:nvSpPr>
+        <p:spPr>
+          <a:xfrm>
+            <a:off x="0" y="0"/>
+            <a:ext cx="12192000" cy="6858000"/>
+          </a:xfrm>
+          <a:prstGeom prst="rect">
+            <a:avLst/>
+          </a:prstGeom>
+          <a:ln w="12700" cap="flat" cmpd="sng" algn="ctr">
+            <a:noFill/>
+            <a:prstDash val="solid"/>
+            <a:miter lim="800000"/>
+          </a:ln>
+          <a:effectLst/>
+          <a:extLst>
+            <a:ext uri="{91240B29-F687-4F45-9708-019B960494DF}">
+              <a14:hiddenLine xmlns:a14="http://schemas.microsoft.com/office/drawing/2010/main" w="12700" cap="flat" cmpd="sng" algn="ctr">
+                <a:solidFill>
+                  <a:schemeClr val="accent1">
+                    <a:shade val="50000"/>
+                  </a:schemeClr>
+                </a:solidFill>
+                <a:prstDash val="solid"/>
+                <a:miter lim="800000"/>
+              </a14:hiddenLine>
+            </a:ext>
+          </a:extLst>
+        </p:spPr>
+        <p:style>
+          <a:lnRef idx="2">
+            <a:schemeClr val="accent1">
+              <a:shade val="50000"/>
+            </a:schemeClr>
+          </a:lnRef>
+          <a:fillRef idx="1">
+            <a:schemeClr val="accent1"/>
+          </a:fillRef>
+          <a:effectRef idx="0">
+            <a:schemeClr val="accent1"/>
+          </a:effectRef>
+          <a:fontRef idx="minor">
+            <a:schemeClr val="lt1"/>
+          </a:fontRef>
+        </p:style>
+        <p:txBody>
+          <a:bodyPr rtlCol="0" anchor="ctr"/>
+          <a:lstStyle/>
+          <a:p>
+            <a:pPr algn="ctr"/>
+            <a:endParaRPr lang="en-US"/>
+          </a:p>
+        </p:txBody>
+      </p:sp>
+      <p:sp>
+        <p:nvSpPr>
+          <p:cNvPr id="5" name="Title 4">
+            <a:extLst>
+              <a:ext uri="{FF2B5EF4-FFF2-40B4-BE49-F238E27FC236}">
+                <a16:creationId xmlns:a16="http://schemas.microsoft.com/office/drawing/2014/main" id="{42B0CFE3-D8D9-7B24-218A-3F616E9BD697}"/>
               </a:ext>
             </a:extLst>
           </p:cNvPr>
@@ -8997,13 +9560,21 @@
             <p:ph type="title"/>
           </p:nvPr>
         </p:nvSpPr>
-        <p:spPr/>
+        <p:spPr>
+          <a:xfrm>
+            <a:off x="6633768" y="3968153"/>
+            <a:ext cx="4978735" cy="1995326"/>
+          </a:xfrm>
+        </p:spPr>
         <p:txBody>
-          <a:bodyPr/>
+          <a:bodyPr vert="horz" lIns="0" tIns="0" rIns="0" bIns="0" rtlCol="0" anchor="b">
+            <a:normAutofit/>
+          </a:bodyPr>
           <a:lstStyle/>
           <a:p>
+            <a:pPr algn="r"/>
             <a:r>
-              <a:rPr lang="en-US" dirty="0"/>
+              <a:rPr lang="en-US" sz="3600" dirty="0"/>
               <a:t>Hypothesis test</a:t>
             </a:r>
           </a:p>
@@ -9011,10 +9582,312 @@
       </p:sp>
       <p:sp>
         <p:nvSpPr>
-          <p:cNvPr id="3" name="Content Placeholder 2">
-            <a:extLst>
-              <a:ext uri="{FF2B5EF4-FFF2-40B4-BE49-F238E27FC236}">
-                <a16:creationId xmlns:a16="http://schemas.microsoft.com/office/drawing/2014/main" id="{03AA7B49-7088-E09B-860C-DC98EE5D77C9}"/>
+          <p:cNvPr id="30" name="Rectangle 16">
+            <a:extLst>
+              <a:ext uri="{FF2B5EF4-FFF2-40B4-BE49-F238E27FC236}">
+                <a16:creationId xmlns:a16="http://schemas.microsoft.com/office/drawing/2014/main" id="{E728B9D0-05A6-4333-BB22-46585AA7706F}"/>
+              </a:ext>
+              <a:ext uri="{C183D7F6-B498-43B3-948B-1728B52AA6E4}">
+                <adec:decorative xmlns:adec="http://schemas.microsoft.com/office/drawing/2017/decorative" val="1"/>
+              </a:ext>
+            </a:extLst>
+          </p:cNvPr>
+          <p:cNvSpPr>
+            <a:spLocks noGrp="1" noRot="1" noChangeAspect="1" noMove="1" noResize="1" noEditPoints="1" noAdjustHandles="1" noChangeArrowheads="1" noChangeShapeType="1" noTextEdit="1"/>
+          </p:cNvSpPr>
+          <p:nvPr>
+            <p:extLst>
+              <p:ext uri="{386F3935-93C4-4BCD-93E2-E3B085C9AB24}">
+                <p16:designElem xmlns:p16="http://schemas.microsoft.com/office/powerpoint/2015/main" val="1"/>
+              </p:ext>
+            </p:extLst>
+          </p:nvPr>
+        </p:nvSpPr>
+        <p:spPr>
+          <a:xfrm flipH="1">
+            <a:off x="-2" y="0"/>
+            <a:ext cx="6096000" cy="6858000"/>
+          </a:xfrm>
+          <a:prstGeom prst="rect">
+            <a:avLst/>
+          </a:prstGeom>
+          <a:gradFill>
+            <a:gsLst>
+              <a:gs pos="8000">
+                <a:schemeClr val="accent6"/>
+              </a:gs>
+              <a:gs pos="100000">
+                <a:schemeClr val="accent5">
+                  <a:alpha val="89000"/>
+                </a:schemeClr>
+              </a:gs>
+            </a:gsLst>
+            <a:lin ang="2400000" scaled="0"/>
+          </a:gradFill>
+          <a:ln>
+            <a:noFill/>
+          </a:ln>
+        </p:spPr>
+        <p:style>
+          <a:lnRef idx="2">
+            <a:schemeClr val="accent1">
+              <a:shade val="50000"/>
+            </a:schemeClr>
+          </a:lnRef>
+          <a:fillRef idx="1">
+            <a:schemeClr val="accent1"/>
+          </a:fillRef>
+          <a:effectRef idx="0">
+            <a:schemeClr val="accent1"/>
+          </a:effectRef>
+          <a:fontRef idx="minor">
+            <a:schemeClr val="lt1"/>
+          </a:fontRef>
+        </p:style>
+        <p:txBody>
+          <a:bodyPr rtlCol="0" anchor="ctr"/>
+          <a:lstStyle/>
+          <a:p>
+            <a:pPr algn="ctr"/>
+            <a:endParaRPr lang="en-US"/>
+          </a:p>
+        </p:txBody>
+      </p:sp>
+      <p:sp>
+        <p:nvSpPr>
+          <p:cNvPr id="31" name="Rectangle 18">
+            <a:extLst>
+              <a:ext uri="{FF2B5EF4-FFF2-40B4-BE49-F238E27FC236}">
+                <a16:creationId xmlns:a16="http://schemas.microsoft.com/office/drawing/2014/main" id="{E2BACE5B-B094-444A-A9B3-E31F591F377F}"/>
+              </a:ext>
+              <a:ext uri="{C183D7F6-B498-43B3-948B-1728B52AA6E4}">
+                <adec:decorative xmlns:adec="http://schemas.microsoft.com/office/drawing/2017/decorative" val="1"/>
+              </a:ext>
+            </a:extLst>
+          </p:cNvPr>
+          <p:cNvSpPr>
+            <a:spLocks noGrp="1" noRot="1" noChangeAspect="1" noMove="1" noResize="1" noEditPoints="1" noAdjustHandles="1" noChangeArrowheads="1" noChangeShapeType="1" noTextEdit="1"/>
+          </p:cNvSpPr>
+          <p:nvPr>
+            <p:extLst>
+              <p:ext uri="{386F3935-93C4-4BCD-93E2-E3B085C9AB24}">
+                <p16:designElem xmlns:p16="http://schemas.microsoft.com/office/powerpoint/2015/main" val="1"/>
+              </p:ext>
+            </p:extLst>
+          </p:nvPr>
+        </p:nvSpPr>
+        <p:spPr>
+          <a:xfrm flipH="1">
+            <a:off x="0" y="17416"/>
+            <a:ext cx="4038600" cy="6840156"/>
+          </a:xfrm>
+          <a:prstGeom prst="rect">
+            <a:avLst/>
+          </a:prstGeom>
+          <a:gradFill>
+            <a:gsLst>
+              <a:gs pos="22000">
+                <a:schemeClr val="accent5">
+                  <a:lumMod val="60000"/>
+                  <a:lumOff val="40000"/>
+                  <a:alpha val="0"/>
+                </a:schemeClr>
+              </a:gs>
+              <a:gs pos="99000">
+                <a:schemeClr val="accent2">
+                  <a:alpha val="92000"/>
+                </a:schemeClr>
+              </a:gs>
+            </a:gsLst>
+            <a:lin ang="4200000" scaled="0"/>
+          </a:gradFill>
+          <a:ln>
+            <a:noFill/>
+          </a:ln>
+        </p:spPr>
+        <p:style>
+          <a:lnRef idx="2">
+            <a:schemeClr val="accent1">
+              <a:shade val="50000"/>
+            </a:schemeClr>
+          </a:lnRef>
+          <a:fillRef idx="1">
+            <a:schemeClr val="accent1"/>
+          </a:fillRef>
+          <a:effectRef idx="0">
+            <a:schemeClr val="accent1"/>
+          </a:effectRef>
+          <a:fontRef idx="minor">
+            <a:schemeClr val="lt1"/>
+          </a:fontRef>
+        </p:style>
+        <p:txBody>
+          <a:bodyPr rtlCol="0" anchor="ctr"/>
+          <a:lstStyle/>
+          <a:p>
+            <a:pPr algn="ctr"/>
+            <a:endParaRPr lang="en-US"/>
+          </a:p>
+        </p:txBody>
+      </p:sp>
+      <p:sp>
+        <p:nvSpPr>
+          <p:cNvPr id="32" name="Rectangle 20">
+            <a:extLst>
+              <a:ext uri="{FF2B5EF4-FFF2-40B4-BE49-F238E27FC236}">
+                <a16:creationId xmlns:a16="http://schemas.microsoft.com/office/drawing/2014/main" id="{AF8B47F9-648C-4086-8D7A-EA234E2EE800}"/>
+              </a:ext>
+              <a:ext uri="{C183D7F6-B498-43B3-948B-1728B52AA6E4}">
+                <adec:decorative xmlns:adec="http://schemas.microsoft.com/office/drawing/2017/decorative" val="1"/>
+              </a:ext>
+            </a:extLst>
+          </p:cNvPr>
+          <p:cNvSpPr>
+            <a:spLocks noGrp="1" noRot="1" noChangeAspect="1" noMove="1" noResize="1" noEditPoints="1" noAdjustHandles="1" noChangeArrowheads="1" noChangeShapeType="1" noTextEdit="1"/>
+          </p:cNvSpPr>
+          <p:nvPr>
+            <p:extLst>
+              <p:ext uri="{386F3935-93C4-4BCD-93E2-E3B085C9AB24}">
+                <p16:designElem xmlns:p16="http://schemas.microsoft.com/office/powerpoint/2015/main" val="1"/>
+              </p:ext>
+            </p:extLst>
+          </p:nvPr>
+        </p:nvSpPr>
+        <p:spPr>
+          <a:xfrm rot="5400000" flipH="1">
+            <a:off x="-129604" y="614984"/>
+            <a:ext cx="6812404" cy="5638799"/>
+          </a:xfrm>
+          <a:prstGeom prst="rect">
+            <a:avLst/>
+          </a:prstGeom>
+          <a:gradFill>
+            <a:gsLst>
+              <a:gs pos="2000">
+                <a:schemeClr val="accent5">
+                  <a:alpha val="19000"/>
+                </a:schemeClr>
+              </a:gs>
+              <a:gs pos="100000">
+                <a:schemeClr val="accent4">
+                  <a:alpha val="0"/>
+                </a:schemeClr>
+              </a:gs>
+            </a:gsLst>
+            <a:lin ang="21594000" scaled="0"/>
+          </a:gradFill>
+          <a:ln>
+            <a:noFill/>
+          </a:ln>
+        </p:spPr>
+        <p:style>
+          <a:lnRef idx="2">
+            <a:schemeClr val="accent1">
+              <a:shade val="50000"/>
+            </a:schemeClr>
+          </a:lnRef>
+          <a:fillRef idx="1">
+            <a:schemeClr val="accent1"/>
+          </a:fillRef>
+          <a:effectRef idx="0">
+            <a:schemeClr val="accent1"/>
+          </a:effectRef>
+          <a:fontRef idx="minor">
+            <a:schemeClr val="lt1"/>
+          </a:fontRef>
+        </p:style>
+        <p:txBody>
+          <a:bodyPr rtlCol="0" anchor="ctr"/>
+          <a:lstStyle/>
+          <a:p>
+            <a:pPr algn="ctr"/>
+            <a:endParaRPr lang="en-US"/>
+          </a:p>
+        </p:txBody>
+      </p:sp>
+      <p:sp>
+        <p:nvSpPr>
+          <p:cNvPr id="33" name="Oval 22">
+            <a:extLst>
+              <a:ext uri="{FF2B5EF4-FFF2-40B4-BE49-F238E27FC236}">
+                <a16:creationId xmlns:a16="http://schemas.microsoft.com/office/drawing/2014/main" id="{48844505-07B5-4F60-8809-3CA2D031ED6F}"/>
+              </a:ext>
+              <a:ext uri="{C183D7F6-B498-43B3-948B-1728B52AA6E4}">
+                <adec:decorative xmlns:adec="http://schemas.microsoft.com/office/drawing/2017/decorative" val="1"/>
+              </a:ext>
+            </a:extLst>
+          </p:cNvPr>
+          <p:cNvSpPr>
+            <a:spLocks noGrp="1" noRot="1" noChangeAspect="1" noMove="1" noResize="1" noEditPoints="1" noAdjustHandles="1" noChangeArrowheads="1" noChangeShapeType="1" noTextEdit="1"/>
+          </p:cNvSpPr>
+          <p:nvPr>
+            <p:extLst>
+              <p:ext uri="{386F3935-93C4-4BCD-93E2-E3B085C9AB24}">
+                <p16:designElem xmlns:p16="http://schemas.microsoft.com/office/powerpoint/2015/main" val="1"/>
+              </p:ext>
+            </p:extLst>
+          </p:nvPr>
+        </p:nvSpPr>
+        <p:spPr>
+          <a:xfrm rot="12508972">
+            <a:off x="652110" y="716188"/>
+            <a:ext cx="5005754" cy="5005754"/>
+          </a:xfrm>
+          <a:prstGeom prst="ellipse">
+            <a:avLst/>
+          </a:prstGeom>
+          <a:gradFill>
+            <a:gsLst>
+              <a:gs pos="31000">
+                <a:schemeClr val="accent6">
+                  <a:alpha val="0"/>
+                </a:schemeClr>
+              </a:gs>
+              <a:gs pos="85000">
+                <a:schemeClr val="accent6">
+                  <a:lumMod val="60000"/>
+                  <a:lumOff val="40000"/>
+                  <a:alpha val="23000"/>
+                </a:schemeClr>
+              </a:gs>
+            </a:gsLst>
+            <a:lin ang="11400000" scaled="0"/>
+          </a:gradFill>
+          <a:ln>
+            <a:noFill/>
+          </a:ln>
+        </p:spPr>
+        <p:style>
+          <a:lnRef idx="2">
+            <a:schemeClr val="accent1">
+              <a:shade val="50000"/>
+            </a:schemeClr>
+          </a:lnRef>
+          <a:fillRef idx="1">
+            <a:schemeClr val="accent1"/>
+          </a:fillRef>
+          <a:effectRef idx="0">
+            <a:schemeClr val="accent1"/>
+          </a:effectRef>
+          <a:fontRef idx="minor">
+            <a:schemeClr val="lt1"/>
+          </a:fontRef>
+        </p:style>
+        <p:txBody>
+          <a:bodyPr rtlCol="0" anchor="ctr"/>
+          <a:lstStyle/>
+          <a:p>
+            <a:pPr algn="ctr"/>
+            <a:endParaRPr lang="en-US" dirty="0"/>
+          </a:p>
+        </p:txBody>
+      </p:sp>
+      <p:sp>
+        <p:nvSpPr>
+          <p:cNvPr id="6" name="Text Placeholder 5">
+            <a:extLst>
+              <a:ext uri="{FF2B5EF4-FFF2-40B4-BE49-F238E27FC236}">
+                <a16:creationId xmlns:a16="http://schemas.microsoft.com/office/drawing/2014/main" id="{D2BAF2B7-65F3-925B-1B3C-BE3B305954F5}"/>
               </a:ext>
             </a:extLst>
           </p:cNvPr>
@@ -9022,15 +9895,948 @@
             <a:spLocks noGrp="1"/>
           </p:cNvSpPr>
           <p:nvPr>
-            <p:ph idx="1"/>
+            <p:ph type="body" idx="1"/>
           </p:nvPr>
         </p:nvSpPr>
-        <p:spPr/>
+        <p:spPr>
+          <a:xfrm>
+            <a:off x="6548528" y="2177143"/>
+            <a:ext cx="5073272" cy="1480457"/>
+          </a:xfrm>
+        </p:spPr>
         <p:txBody>
-          <a:bodyPr/>
+          <a:bodyPr vert="horz" lIns="0" tIns="0" rIns="0" bIns="0" rtlCol="0" anchor="b">
+            <a:normAutofit/>
+          </a:bodyPr>
           <a:lstStyle/>
           <a:p>
+            <a:pPr algn="ctr">
+              <a:lnSpc>
+                <a:spcPct val="150000"/>
+              </a:lnSpc>
+            </a:pPr>
+            <a:r>
+              <a:rPr lang="en-US" sz="1200" b="1" dirty="0"/>
+              <a:t>1. Loan amount status approval 2. average of loan amount requested</a:t>
+            </a:r>
+          </a:p>
+        </p:txBody>
+      </p:sp>
+    </p:spTree>
+    <p:extLst>
+      <p:ext uri="{BB962C8B-B14F-4D97-AF65-F5344CB8AC3E}">
+        <p14:creationId xmlns:p14="http://schemas.microsoft.com/office/powerpoint/2010/main" val="1861636386"/>
+      </p:ext>
+    </p:extLst>
+  </p:cSld>
+  <p:clrMapOvr>
+    <a:masterClrMapping/>
+  </p:clrMapOvr>
+</p:sld>
+</file>
+
+<file path=ppt/slides/slide7.xml><?xml version="1.0" encoding="utf-8"?>
+<p:sld xmlns:a="http://schemas.openxmlformats.org/drawingml/2006/main" xmlns:r="http://schemas.openxmlformats.org/officeDocument/2006/relationships" xmlns:p="http://schemas.openxmlformats.org/presentationml/2006/main">
+  <p:cSld>
+    <p:bg>
+      <p:bgPr>
+        <a:solidFill>
+          <a:schemeClr val="bg1"/>
+        </a:solidFill>
+        <a:effectLst/>
+      </p:bgPr>
+    </p:bg>
+    <p:spTree>
+      <p:nvGrpSpPr>
+        <p:cNvPr id="1" name=""/>
+        <p:cNvGrpSpPr/>
+        <p:nvPr/>
+      </p:nvGrpSpPr>
+      <p:grpSpPr>
+        <a:xfrm>
+          <a:off x="0" y="0"/>
+          <a:ext cx="0" cy="0"/>
+          <a:chOff x="0" y="0"/>
+          <a:chExt cx="0" cy="0"/>
+        </a:xfrm>
+      </p:grpSpPr>
+      <p:sp>
+        <p:nvSpPr>
+          <p:cNvPr id="25" name="Rectangle 10">
+            <a:extLst>
+              <a:ext uri="{FF2B5EF4-FFF2-40B4-BE49-F238E27FC236}">
+                <a16:creationId xmlns:a16="http://schemas.microsoft.com/office/drawing/2014/main" id="{BD4C0BBB-0042-4603-A226-6117F3FD5B3C}"/>
+              </a:ext>
+              <a:ext uri="{C183D7F6-B498-43B3-948B-1728B52AA6E4}">
+                <adec:decorative xmlns:adec="http://schemas.microsoft.com/office/drawing/2017/decorative" val="1"/>
+              </a:ext>
+            </a:extLst>
+          </p:cNvPr>
+          <p:cNvSpPr>
+            <a:spLocks noGrp="1" noRot="1" noChangeAspect="1" noMove="1" noResize="1" noEditPoints="1" noAdjustHandles="1" noChangeArrowheads="1" noChangeShapeType="1" noTextEdit="1"/>
+          </p:cNvSpPr>
+          <p:nvPr>
+            <p:extLst>
+              <p:ext uri="{386F3935-93C4-4BCD-93E2-E3B085C9AB24}">
+                <p16:designElem xmlns:p16="http://schemas.microsoft.com/office/powerpoint/2015/main" val="1"/>
+              </p:ext>
+            </p:extLst>
+          </p:nvPr>
+        </p:nvSpPr>
+        <p:spPr>
+          <a:xfrm rot="10800000" flipH="1">
+            <a:off x="0" y="6400799"/>
+            <a:ext cx="12192000" cy="456773"/>
+          </a:xfrm>
+          <a:prstGeom prst="rect">
+            <a:avLst/>
+          </a:prstGeom>
+          <a:gradFill>
+            <a:gsLst>
+              <a:gs pos="14000">
+                <a:schemeClr val="accent4">
+                  <a:alpha val="28000"/>
+                </a:schemeClr>
+              </a:gs>
+              <a:gs pos="100000">
+                <a:schemeClr val="accent5">
+                  <a:alpha val="85000"/>
+                </a:schemeClr>
+              </a:gs>
+            </a:gsLst>
+            <a:lin ang="6000000" scaled="0"/>
+          </a:gradFill>
+          <a:ln>
+            <a:noFill/>
+          </a:ln>
+        </p:spPr>
+        <p:style>
+          <a:lnRef idx="2">
+            <a:schemeClr val="accent1">
+              <a:shade val="50000"/>
+            </a:schemeClr>
+          </a:lnRef>
+          <a:fillRef idx="1">
+            <a:schemeClr val="accent1"/>
+          </a:fillRef>
+          <a:effectRef idx="0">
+            <a:schemeClr val="accent1"/>
+          </a:effectRef>
+          <a:fontRef idx="minor">
+            <a:schemeClr val="lt1"/>
+          </a:fontRef>
+        </p:style>
+        <p:txBody>
+          <a:bodyPr rtlCol="0" anchor="ctr"/>
+          <a:lstStyle/>
+          <a:p>
+            <a:pPr algn="ctr"/>
             <a:endParaRPr lang="en-US"/>
+          </a:p>
+        </p:txBody>
+      </p:sp>
+      <p:sp>
+        <p:nvSpPr>
+          <p:cNvPr id="26" name="Rectangle 12">
+            <a:extLst>
+              <a:ext uri="{FF2B5EF4-FFF2-40B4-BE49-F238E27FC236}">
+                <a16:creationId xmlns:a16="http://schemas.microsoft.com/office/drawing/2014/main" id="{EC44F520-2598-460E-9F91-B02F60830CA2}"/>
+              </a:ext>
+              <a:ext uri="{C183D7F6-B498-43B3-948B-1728B52AA6E4}">
+                <adec:decorative xmlns:adec="http://schemas.microsoft.com/office/drawing/2017/decorative" val="1"/>
+              </a:ext>
+            </a:extLst>
+          </p:cNvPr>
+          <p:cNvSpPr>
+            <a:spLocks noGrp="1" noRot="1" noChangeAspect="1" noMove="1" noResize="1" noEditPoints="1" noAdjustHandles="1" noChangeArrowheads="1" noChangeShapeType="1" noTextEdit="1"/>
+          </p:cNvSpPr>
+          <p:nvPr>
+            <p:extLst>
+              <p:ext uri="{386F3935-93C4-4BCD-93E2-E3B085C9AB24}">
+                <p16:designElem xmlns:p16="http://schemas.microsoft.com/office/powerpoint/2015/main" val="1"/>
+              </p:ext>
+            </p:extLst>
+          </p:nvPr>
+        </p:nvSpPr>
+        <p:spPr>
+          <a:xfrm flipH="1">
+            <a:off x="4038600" y="6400799"/>
+            <a:ext cx="8153398" cy="456772"/>
+          </a:xfrm>
+          <a:prstGeom prst="rect">
+            <a:avLst/>
+          </a:prstGeom>
+          <a:gradFill>
+            <a:gsLst>
+              <a:gs pos="9000">
+                <a:schemeClr val="accent2">
+                  <a:lumMod val="60000"/>
+                  <a:lumOff val="40000"/>
+                  <a:alpha val="55000"/>
+                </a:schemeClr>
+              </a:gs>
+              <a:gs pos="99000">
+                <a:schemeClr val="accent2"/>
+              </a:gs>
+            </a:gsLst>
+            <a:lin ang="14400000" scaled="0"/>
+          </a:gradFill>
+          <a:ln>
+            <a:noFill/>
+          </a:ln>
+        </p:spPr>
+        <p:style>
+          <a:lnRef idx="2">
+            <a:schemeClr val="accent1">
+              <a:shade val="50000"/>
+            </a:schemeClr>
+          </a:lnRef>
+          <a:fillRef idx="1">
+            <a:schemeClr val="accent1"/>
+          </a:fillRef>
+          <a:effectRef idx="0">
+            <a:schemeClr val="accent1"/>
+          </a:effectRef>
+          <a:fontRef idx="minor">
+            <a:schemeClr val="lt1"/>
+          </a:fontRef>
+        </p:style>
+        <p:txBody>
+          <a:bodyPr rtlCol="0" anchor="ctr"/>
+          <a:lstStyle/>
+          <a:p>
+            <a:pPr algn="ctr"/>
+            <a:endParaRPr lang="en-US"/>
+          </a:p>
+        </p:txBody>
+      </p:sp>
+      <p:sp useBgFill="1">
+        <p:nvSpPr>
+          <p:cNvPr id="27" name="Rectangle 14">
+            <a:extLst>
+              <a:ext uri="{FF2B5EF4-FFF2-40B4-BE49-F238E27FC236}">
+                <a16:creationId xmlns:a16="http://schemas.microsoft.com/office/drawing/2014/main" id="{315596D0-7A93-45AB-A289-2A2B141E0BBF}"/>
+              </a:ext>
+              <a:ext uri="{C183D7F6-B498-43B3-948B-1728B52AA6E4}">
+                <adec:decorative xmlns:adec="http://schemas.microsoft.com/office/drawing/2017/decorative" val="1"/>
+              </a:ext>
+            </a:extLst>
+          </p:cNvPr>
+          <p:cNvSpPr>
+            <a:spLocks noGrp="1" noRot="1" noChangeAspect="1" noMove="1" noResize="1" noEditPoints="1" noAdjustHandles="1" noChangeArrowheads="1" noChangeShapeType="1" noTextEdit="1"/>
+          </p:cNvSpPr>
+          <p:nvPr>
+            <p:extLst>
+              <p:ext uri="{386F3935-93C4-4BCD-93E2-E3B085C9AB24}">
+                <p16:designElem xmlns:p16="http://schemas.microsoft.com/office/powerpoint/2015/main" val="1"/>
+              </p:ext>
+            </p:extLst>
+          </p:nvPr>
+        </p:nvSpPr>
+        <p:spPr>
+          <a:xfrm>
+            <a:off x="0" y="0"/>
+            <a:ext cx="12192000" cy="6858000"/>
+          </a:xfrm>
+          <a:prstGeom prst="rect">
+            <a:avLst/>
+          </a:prstGeom>
+          <a:ln w="12700" cap="flat" cmpd="sng" algn="ctr">
+            <a:noFill/>
+            <a:prstDash val="solid"/>
+            <a:miter lim="800000"/>
+          </a:ln>
+          <a:effectLst/>
+          <a:extLst>
+            <a:ext uri="{91240B29-F687-4F45-9708-019B960494DF}">
+              <a14:hiddenLine xmlns:a14="http://schemas.microsoft.com/office/drawing/2010/main" w="12700" cap="flat" cmpd="sng" algn="ctr">
+                <a:solidFill>
+                  <a:schemeClr val="accent1">
+                    <a:shade val="50000"/>
+                  </a:schemeClr>
+                </a:solidFill>
+                <a:prstDash val="solid"/>
+                <a:miter lim="800000"/>
+              </a14:hiddenLine>
+            </a:ext>
+          </a:extLst>
+        </p:spPr>
+        <p:style>
+          <a:lnRef idx="2">
+            <a:schemeClr val="accent1">
+              <a:shade val="50000"/>
+            </a:schemeClr>
+          </a:lnRef>
+          <a:fillRef idx="1">
+            <a:schemeClr val="accent1"/>
+          </a:fillRef>
+          <a:effectRef idx="0">
+            <a:schemeClr val="accent1"/>
+          </a:effectRef>
+          <a:fontRef idx="minor">
+            <a:schemeClr val="lt1"/>
+          </a:fontRef>
+        </p:style>
+        <p:txBody>
+          <a:bodyPr rtlCol="0" anchor="ctr"/>
+          <a:lstStyle/>
+          <a:p>
+            <a:pPr algn="ctr"/>
+            <a:endParaRPr lang="en-US"/>
+          </a:p>
+        </p:txBody>
+      </p:sp>
+      <p:sp>
+        <p:nvSpPr>
+          <p:cNvPr id="28" name="Rectangle 16">
+            <a:extLst>
+              <a:ext uri="{FF2B5EF4-FFF2-40B4-BE49-F238E27FC236}">
+                <a16:creationId xmlns:a16="http://schemas.microsoft.com/office/drawing/2014/main" id="{A90F64BE-B6DF-4D20-9A3E-DAD003896C0E}"/>
+              </a:ext>
+              <a:ext uri="{C183D7F6-B498-43B3-948B-1728B52AA6E4}">
+                <adec:decorative xmlns:adec="http://schemas.microsoft.com/office/drawing/2017/decorative" val="1"/>
+              </a:ext>
+            </a:extLst>
+          </p:cNvPr>
+          <p:cNvSpPr>
+            <a:spLocks noGrp="1" noRot="1" noChangeAspect="1" noMove="1" noResize="1" noEditPoints="1" noAdjustHandles="1" noChangeArrowheads="1" noChangeShapeType="1" noTextEdit="1"/>
+          </p:cNvSpPr>
+          <p:nvPr>
+            <p:extLst>
+              <p:ext uri="{386F3935-93C4-4BCD-93E2-E3B085C9AB24}">
+                <p16:designElem xmlns:p16="http://schemas.microsoft.com/office/powerpoint/2015/main" val="1"/>
+              </p:ext>
+            </p:extLst>
+          </p:nvPr>
+        </p:nvSpPr>
+        <p:spPr>
+          <a:xfrm>
+            <a:off x="-1" y="-8890"/>
+            <a:ext cx="4038601" cy="6866462"/>
+          </a:xfrm>
+          <a:prstGeom prst="rect">
+            <a:avLst/>
+          </a:prstGeom>
+          <a:gradFill>
+            <a:gsLst>
+              <a:gs pos="0">
+                <a:schemeClr val="accent5"/>
+              </a:gs>
+              <a:gs pos="100000">
+                <a:schemeClr val="accent4">
+                  <a:alpha val="55000"/>
+                </a:schemeClr>
+              </a:gs>
+            </a:gsLst>
+            <a:lin ang="18000000" scaled="0"/>
+          </a:gradFill>
+          <a:ln>
+            <a:noFill/>
+          </a:ln>
+        </p:spPr>
+        <p:style>
+          <a:lnRef idx="2">
+            <a:schemeClr val="accent1">
+              <a:shade val="50000"/>
+            </a:schemeClr>
+          </a:lnRef>
+          <a:fillRef idx="1">
+            <a:schemeClr val="accent1"/>
+          </a:fillRef>
+          <a:effectRef idx="0">
+            <a:schemeClr val="accent1"/>
+          </a:effectRef>
+          <a:fontRef idx="minor">
+            <a:schemeClr val="lt1"/>
+          </a:fontRef>
+        </p:style>
+        <p:txBody>
+          <a:bodyPr rtlCol="0" anchor="ctr"/>
+          <a:lstStyle/>
+          <a:p>
+            <a:pPr algn="ctr"/>
+            <a:endParaRPr lang="en-US"/>
+          </a:p>
+        </p:txBody>
+      </p:sp>
+      <p:sp>
+        <p:nvSpPr>
+          <p:cNvPr id="29" name="Rectangle 18">
+            <a:extLst>
+              <a:ext uri="{FF2B5EF4-FFF2-40B4-BE49-F238E27FC236}">
+                <a16:creationId xmlns:a16="http://schemas.microsoft.com/office/drawing/2014/main" id="{3299ACA5-1949-4821-8FA4-95A78A2097AE}"/>
+              </a:ext>
+              <a:ext uri="{C183D7F6-B498-43B3-948B-1728B52AA6E4}">
+                <adec:decorative xmlns:adec="http://schemas.microsoft.com/office/drawing/2017/decorative" val="1"/>
+              </a:ext>
+            </a:extLst>
+          </p:cNvPr>
+          <p:cNvSpPr>
+            <a:spLocks noGrp="1" noRot="1" noChangeAspect="1" noMove="1" noResize="1" noEditPoints="1" noAdjustHandles="1" noChangeArrowheads="1" noChangeShapeType="1" noTextEdit="1"/>
+          </p:cNvSpPr>
+          <p:nvPr>
+            <p:extLst>
+              <p:ext uri="{386F3935-93C4-4BCD-93E2-E3B085C9AB24}">
+                <p16:designElem xmlns:p16="http://schemas.microsoft.com/office/powerpoint/2015/main" val="1"/>
+              </p:ext>
+            </p:extLst>
+          </p:nvPr>
+        </p:nvSpPr>
+        <p:spPr>
+          <a:xfrm rot="16200000" flipH="1">
+            <a:off x="-1185328" y="1633640"/>
+            <a:ext cx="6866462" cy="3581401"/>
+          </a:xfrm>
+          <a:prstGeom prst="rect">
+            <a:avLst/>
+          </a:prstGeom>
+          <a:gradFill>
+            <a:gsLst>
+              <a:gs pos="0">
+                <a:schemeClr val="accent2"/>
+              </a:gs>
+              <a:gs pos="100000">
+                <a:schemeClr val="accent5">
+                  <a:alpha val="13000"/>
+                </a:schemeClr>
+              </a:gs>
+            </a:gsLst>
+            <a:lin ang="13800000" scaled="0"/>
+          </a:gradFill>
+          <a:ln>
+            <a:noFill/>
+          </a:ln>
+        </p:spPr>
+        <p:style>
+          <a:lnRef idx="2">
+            <a:schemeClr val="accent1">
+              <a:shade val="50000"/>
+            </a:schemeClr>
+          </a:lnRef>
+          <a:fillRef idx="1">
+            <a:schemeClr val="accent1"/>
+          </a:fillRef>
+          <a:effectRef idx="0">
+            <a:schemeClr val="accent1"/>
+          </a:effectRef>
+          <a:fontRef idx="minor">
+            <a:schemeClr val="lt1"/>
+          </a:fontRef>
+        </p:style>
+        <p:txBody>
+          <a:bodyPr rtlCol="0" anchor="ctr"/>
+          <a:lstStyle/>
+          <a:p>
+            <a:pPr algn="ctr"/>
+            <a:endParaRPr lang="en-US" dirty="0"/>
+          </a:p>
+        </p:txBody>
+      </p:sp>
+      <p:sp>
+        <p:nvSpPr>
+          <p:cNvPr id="30" name="Rectangle 20">
+            <a:extLst>
+              <a:ext uri="{FF2B5EF4-FFF2-40B4-BE49-F238E27FC236}">
+                <a16:creationId xmlns:a16="http://schemas.microsoft.com/office/drawing/2014/main" id="{85559C2F-075A-49B7-8935-4591245136E5}"/>
+              </a:ext>
+              <a:ext uri="{C183D7F6-B498-43B3-948B-1728B52AA6E4}">
+                <adec:decorative xmlns:adec="http://schemas.microsoft.com/office/drawing/2017/decorative" val="1"/>
+              </a:ext>
+            </a:extLst>
+          </p:cNvPr>
+          <p:cNvSpPr>
+            <a:spLocks noGrp="1" noRot="1" noChangeAspect="1" noMove="1" noResize="1" noEditPoints="1" noAdjustHandles="1" noChangeArrowheads="1" noChangeShapeType="1" noTextEdit="1"/>
+          </p:cNvSpPr>
+          <p:nvPr>
+            <p:extLst>
+              <p:ext uri="{386F3935-93C4-4BCD-93E2-E3B085C9AB24}">
+                <p16:designElem xmlns:p16="http://schemas.microsoft.com/office/powerpoint/2015/main" val="1"/>
+              </p:ext>
+            </p:extLst>
+          </p:nvPr>
+        </p:nvSpPr>
+        <p:spPr>
+          <a:xfrm>
+            <a:off x="0" y="2232044"/>
+            <a:ext cx="4038600" cy="4634418"/>
+          </a:xfrm>
+          <a:prstGeom prst="rect">
+            <a:avLst/>
+          </a:prstGeom>
+          <a:gradFill>
+            <a:gsLst>
+              <a:gs pos="0">
+                <a:schemeClr val="accent5">
+                  <a:alpha val="36000"/>
+                </a:schemeClr>
+              </a:gs>
+              <a:gs pos="67000">
+                <a:schemeClr val="accent5">
+                  <a:alpha val="0"/>
+                </a:schemeClr>
+              </a:gs>
+            </a:gsLst>
+            <a:lin ang="2400000" scaled="0"/>
+          </a:gradFill>
+          <a:ln>
+            <a:noFill/>
+          </a:ln>
+        </p:spPr>
+        <p:style>
+          <a:lnRef idx="2">
+            <a:schemeClr val="accent1">
+              <a:shade val="50000"/>
+            </a:schemeClr>
+          </a:lnRef>
+          <a:fillRef idx="1">
+            <a:schemeClr val="accent1"/>
+          </a:fillRef>
+          <a:effectRef idx="0">
+            <a:schemeClr val="accent1"/>
+          </a:effectRef>
+          <a:fontRef idx="minor">
+            <a:schemeClr val="lt1"/>
+          </a:fontRef>
+        </p:style>
+        <p:txBody>
+          <a:bodyPr rtlCol="0" anchor="ctr"/>
+          <a:lstStyle/>
+          <a:p>
+            <a:pPr algn="ctr"/>
+            <a:endParaRPr lang="en-US" dirty="0"/>
+          </a:p>
+        </p:txBody>
+      </p:sp>
+      <p:sp>
+        <p:nvSpPr>
+          <p:cNvPr id="2" name="Title 1">
+            <a:extLst>
+              <a:ext uri="{FF2B5EF4-FFF2-40B4-BE49-F238E27FC236}">
+                <a16:creationId xmlns:a16="http://schemas.microsoft.com/office/drawing/2014/main" id="{609F77FC-504E-9CE2-B050-D6788F462AC0}"/>
+              </a:ext>
+            </a:extLst>
+          </p:cNvPr>
+          <p:cNvSpPr>
+            <a:spLocks noGrp="1"/>
+          </p:cNvSpPr>
+          <p:nvPr>
+            <p:ph type="title"/>
+          </p:nvPr>
+        </p:nvSpPr>
+        <p:spPr>
+          <a:xfrm>
+            <a:off x="347241" y="2463419"/>
+            <a:ext cx="3331624" cy="3936952"/>
+          </a:xfrm>
+        </p:spPr>
+        <p:txBody>
+          <a:bodyPr vert="horz" lIns="0" tIns="0" rIns="0" bIns="0" rtlCol="0" anchor="t">
+            <a:normAutofit/>
+          </a:bodyPr>
+          <a:lstStyle/>
+          <a:p>
+            <a:pPr algn="ctr"/>
+            <a:r>
+              <a:rPr lang="en-US" sz="3200" spc="750" dirty="0">
+                <a:solidFill>
+                  <a:schemeClr val="bg1"/>
+                </a:solidFill>
+              </a:rPr>
+              <a:t>Income by education</a:t>
+            </a:r>
+            <a:br>
+              <a:rPr lang="en-US" sz="3200" spc="750" dirty="0">
+                <a:solidFill>
+                  <a:schemeClr val="bg1"/>
+                </a:solidFill>
+              </a:rPr>
+            </a:br>
+            <a:br>
+              <a:rPr lang="en-US" sz="3200" spc="750" dirty="0">
+                <a:solidFill>
+                  <a:schemeClr val="bg1"/>
+                </a:solidFill>
+              </a:rPr>
+            </a:br>
+            <a:r>
+              <a:rPr lang="en-US" sz="1600" b="0" spc="750" dirty="0">
+                <a:solidFill>
+                  <a:schemeClr val="bg1"/>
+                </a:solidFill>
+              </a:rPr>
+              <a:t>group of applicants and co-applicants who have High income are also graduated.</a:t>
+            </a:r>
+            <a:br>
+              <a:rPr lang="en-US" sz="1600" b="0" i="1" spc="750" dirty="0">
+                <a:solidFill>
+                  <a:schemeClr val="bg1"/>
+                </a:solidFill>
+              </a:rPr>
+            </a:br>
+            <a:endParaRPr lang="en-US" sz="1600" b="0" i="1" spc="750" dirty="0">
+              <a:solidFill>
+                <a:schemeClr val="bg1"/>
+              </a:solidFill>
+            </a:endParaRPr>
+          </a:p>
+        </p:txBody>
+      </p:sp>
+      <p:pic>
+        <p:nvPicPr>
+          <p:cNvPr id="5" name="Picture 4" descr="Chart, radar chart&#10;&#10;Description automatically generated">
+            <a:extLst>
+              <a:ext uri="{FF2B5EF4-FFF2-40B4-BE49-F238E27FC236}">
+                <a16:creationId xmlns:a16="http://schemas.microsoft.com/office/drawing/2014/main" id="{FFC856EC-1C64-C767-974A-B53557FB7A87}"/>
+              </a:ext>
+            </a:extLst>
+          </p:cNvPr>
+          <p:cNvPicPr>
+            <a:picLocks noChangeAspect="1"/>
+          </p:cNvPicPr>
+          <p:nvPr/>
+        </p:nvPicPr>
+        <p:blipFill>
+          <a:blip r:embed="rId2"/>
+          <a:stretch>
+            <a:fillRect/>
+          </a:stretch>
+        </p:blipFill>
+        <p:spPr>
+          <a:xfrm>
+            <a:off x="4788090" y="1761402"/>
+            <a:ext cx="3147409" cy="3339426"/>
+          </a:xfrm>
+          <a:prstGeom prst="rect">
+            <a:avLst/>
+          </a:prstGeom>
+        </p:spPr>
+      </p:pic>
+      <p:pic>
+        <p:nvPicPr>
+          <p:cNvPr id="6" name="Picture 5" descr="Diagram&#10;&#10;Description automatically generated">
+            <a:extLst>
+              <a:ext uri="{FF2B5EF4-FFF2-40B4-BE49-F238E27FC236}">
+                <a16:creationId xmlns:a16="http://schemas.microsoft.com/office/drawing/2014/main" id="{10DB4394-703E-C7F9-B741-61B0A6B09DDA}"/>
+              </a:ext>
+            </a:extLst>
+          </p:cNvPr>
+          <p:cNvPicPr>
+            <a:picLocks noChangeAspect="1"/>
+          </p:cNvPicPr>
+          <p:nvPr/>
+        </p:nvPicPr>
+        <p:blipFill>
+          <a:blip r:embed="rId3"/>
+          <a:stretch>
+            <a:fillRect/>
+          </a:stretch>
+        </p:blipFill>
+        <p:spPr>
+          <a:xfrm>
+            <a:off x="8260974" y="1778371"/>
+            <a:ext cx="3181533" cy="3305488"/>
+          </a:xfrm>
+          <a:prstGeom prst="rect">
+            <a:avLst/>
+          </a:prstGeom>
+        </p:spPr>
+      </p:pic>
+    </p:spTree>
+    <p:extLst>
+      <p:ext uri="{BB962C8B-B14F-4D97-AF65-F5344CB8AC3E}">
+        <p14:creationId xmlns:p14="http://schemas.microsoft.com/office/powerpoint/2010/main" val="809840982"/>
+      </p:ext>
+    </p:extLst>
+  </p:cSld>
+  <p:clrMapOvr>
+    <a:masterClrMapping/>
+  </p:clrMapOvr>
+</p:sld>
+</file>
+
+<file path=ppt/slides/slide8.xml><?xml version="1.0" encoding="utf-8"?>
+<p:sld xmlns:a="http://schemas.openxmlformats.org/drawingml/2006/main" xmlns:r="http://schemas.openxmlformats.org/officeDocument/2006/relationships" xmlns:p="http://schemas.openxmlformats.org/presentationml/2006/main">
+  <p:cSld>
+    <p:bg>
+      <p:bgPr>
+        <a:solidFill>
+          <a:schemeClr val="bg1"/>
+        </a:solidFill>
+        <a:effectLst/>
+      </p:bgPr>
+    </p:bg>
+    <p:spTree>
+      <p:nvGrpSpPr>
+        <p:cNvPr id="1" name=""/>
+        <p:cNvGrpSpPr/>
+        <p:nvPr/>
+      </p:nvGrpSpPr>
+      <p:grpSpPr>
+        <a:xfrm>
+          <a:off x="0" y="0"/>
+          <a:ext cx="0" cy="0"/>
+          <a:chOff x="0" y="0"/>
+          <a:chExt cx="0" cy="0"/>
+        </a:xfrm>
+      </p:grpSpPr>
+      <p:sp>
+        <p:nvSpPr>
+          <p:cNvPr id="30" name="Rectangle 10">
+            <a:extLst>
+              <a:ext uri="{FF2B5EF4-FFF2-40B4-BE49-F238E27FC236}">
+                <a16:creationId xmlns:a16="http://schemas.microsoft.com/office/drawing/2014/main" id="{BD4C0BBB-0042-4603-A226-6117F3FD5B3C}"/>
+              </a:ext>
+              <a:ext uri="{C183D7F6-B498-43B3-948B-1728B52AA6E4}">
+                <adec:decorative xmlns:adec="http://schemas.microsoft.com/office/drawing/2017/decorative" val="1"/>
+              </a:ext>
+            </a:extLst>
+          </p:cNvPr>
+          <p:cNvSpPr>
+            <a:spLocks noGrp="1" noRot="1" noChangeAspect="1" noMove="1" noResize="1" noEditPoints="1" noAdjustHandles="1" noChangeArrowheads="1" noChangeShapeType="1" noTextEdit="1"/>
+          </p:cNvSpPr>
+          <p:nvPr>
+            <p:extLst>
+              <p:ext uri="{386F3935-93C4-4BCD-93E2-E3B085C9AB24}">
+                <p16:designElem xmlns:p16="http://schemas.microsoft.com/office/powerpoint/2015/main" val="1"/>
+              </p:ext>
+            </p:extLst>
+          </p:nvPr>
+        </p:nvSpPr>
+        <p:spPr>
+          <a:xfrm rot="10800000" flipH="1">
+            <a:off x="0" y="6400799"/>
+            <a:ext cx="12192000" cy="456773"/>
+          </a:xfrm>
+          <a:prstGeom prst="rect">
+            <a:avLst/>
+          </a:prstGeom>
+          <a:gradFill>
+            <a:gsLst>
+              <a:gs pos="14000">
+                <a:schemeClr val="accent4">
+                  <a:alpha val="28000"/>
+                </a:schemeClr>
+              </a:gs>
+              <a:gs pos="100000">
+                <a:schemeClr val="accent5">
+                  <a:alpha val="85000"/>
+                </a:schemeClr>
+              </a:gs>
+            </a:gsLst>
+            <a:lin ang="6000000" scaled="0"/>
+          </a:gradFill>
+          <a:ln>
+            <a:noFill/>
+          </a:ln>
+        </p:spPr>
+        <p:style>
+          <a:lnRef idx="2">
+            <a:schemeClr val="accent1">
+              <a:shade val="50000"/>
+            </a:schemeClr>
+          </a:lnRef>
+          <a:fillRef idx="1">
+            <a:schemeClr val="accent1"/>
+          </a:fillRef>
+          <a:effectRef idx="0">
+            <a:schemeClr val="accent1"/>
+          </a:effectRef>
+          <a:fontRef idx="minor">
+            <a:schemeClr val="lt1"/>
+          </a:fontRef>
+        </p:style>
+        <p:txBody>
+          <a:bodyPr rtlCol="0" anchor="ctr"/>
+          <a:lstStyle/>
+          <a:p>
+            <a:pPr algn="ctr"/>
+            <a:endParaRPr lang="en-US"/>
+          </a:p>
+        </p:txBody>
+      </p:sp>
+      <p:sp>
+        <p:nvSpPr>
+          <p:cNvPr id="31" name="Rectangle 12">
+            <a:extLst>
+              <a:ext uri="{FF2B5EF4-FFF2-40B4-BE49-F238E27FC236}">
+                <a16:creationId xmlns:a16="http://schemas.microsoft.com/office/drawing/2014/main" id="{EC44F520-2598-460E-9F91-B02F60830CA2}"/>
+              </a:ext>
+              <a:ext uri="{C183D7F6-B498-43B3-948B-1728B52AA6E4}">
+                <adec:decorative xmlns:adec="http://schemas.microsoft.com/office/drawing/2017/decorative" val="1"/>
+              </a:ext>
+            </a:extLst>
+          </p:cNvPr>
+          <p:cNvSpPr>
+            <a:spLocks noGrp="1" noRot="1" noChangeAspect="1" noMove="1" noResize="1" noEditPoints="1" noAdjustHandles="1" noChangeArrowheads="1" noChangeShapeType="1" noTextEdit="1"/>
+          </p:cNvSpPr>
+          <p:nvPr>
+            <p:extLst>
+              <p:ext uri="{386F3935-93C4-4BCD-93E2-E3B085C9AB24}">
+                <p16:designElem xmlns:p16="http://schemas.microsoft.com/office/powerpoint/2015/main" val="1"/>
+              </p:ext>
+            </p:extLst>
+          </p:nvPr>
+        </p:nvSpPr>
+        <p:spPr>
+          <a:xfrm flipH="1">
+            <a:off x="4038600" y="6400799"/>
+            <a:ext cx="8153398" cy="456772"/>
+          </a:xfrm>
+          <a:prstGeom prst="rect">
+            <a:avLst/>
+          </a:prstGeom>
+          <a:gradFill>
+            <a:gsLst>
+              <a:gs pos="9000">
+                <a:schemeClr val="accent2">
+                  <a:lumMod val="60000"/>
+                  <a:lumOff val="40000"/>
+                  <a:alpha val="55000"/>
+                </a:schemeClr>
+              </a:gs>
+              <a:gs pos="99000">
+                <a:schemeClr val="accent2"/>
+              </a:gs>
+            </a:gsLst>
+            <a:lin ang="14400000" scaled="0"/>
+          </a:gradFill>
+          <a:ln>
+            <a:noFill/>
+          </a:ln>
+        </p:spPr>
+        <p:style>
+          <a:lnRef idx="2">
+            <a:schemeClr val="accent1">
+              <a:shade val="50000"/>
+            </a:schemeClr>
+          </a:lnRef>
+          <a:fillRef idx="1">
+            <a:schemeClr val="accent1"/>
+          </a:fillRef>
+          <a:effectRef idx="0">
+            <a:schemeClr val="accent1"/>
+          </a:effectRef>
+          <a:fontRef idx="minor">
+            <a:schemeClr val="lt1"/>
+          </a:fontRef>
+        </p:style>
+        <p:txBody>
+          <a:bodyPr rtlCol="0" anchor="ctr"/>
+          <a:lstStyle/>
+          <a:p>
+            <a:pPr algn="ctr"/>
+            <a:endParaRPr lang="en-US"/>
+          </a:p>
+        </p:txBody>
+      </p:sp>
+      <p:sp useBgFill="1">
+        <p:nvSpPr>
+          <p:cNvPr id="32" name="Rectangle 14">
+            <a:extLst>
+              <a:ext uri="{FF2B5EF4-FFF2-40B4-BE49-F238E27FC236}">
+                <a16:creationId xmlns:a16="http://schemas.microsoft.com/office/drawing/2014/main" id="{9C53F8DC-E65E-42A4-ABA3-AB41274F30F8}"/>
+              </a:ext>
+              <a:ext uri="{C183D7F6-B498-43B3-948B-1728B52AA6E4}">
+                <adec:decorative xmlns:adec="http://schemas.microsoft.com/office/drawing/2017/decorative" val="1"/>
+              </a:ext>
+            </a:extLst>
+          </p:cNvPr>
+          <p:cNvSpPr>
+            <a:spLocks noGrp="1" noRot="1" noChangeAspect="1" noMove="1" noResize="1" noEditPoints="1" noAdjustHandles="1" noChangeArrowheads="1" noChangeShapeType="1" noTextEdit="1"/>
+          </p:cNvSpPr>
+          <p:nvPr>
+            <p:extLst>
+              <p:ext uri="{386F3935-93C4-4BCD-93E2-E3B085C9AB24}">
+                <p16:designElem xmlns:p16="http://schemas.microsoft.com/office/powerpoint/2015/main" val="1"/>
+              </p:ext>
+            </p:extLst>
+          </p:nvPr>
+        </p:nvSpPr>
+        <p:spPr>
+          <a:xfrm>
+            <a:off x="0" y="0"/>
+            <a:ext cx="12192000" cy="6858000"/>
+          </a:xfrm>
+          <a:prstGeom prst="rect">
+            <a:avLst/>
+          </a:prstGeom>
+          <a:ln w="12700" cap="flat" cmpd="sng" algn="ctr">
+            <a:noFill/>
+            <a:prstDash val="solid"/>
+            <a:miter lim="800000"/>
+          </a:ln>
+          <a:effectLst/>
+          <a:extLst>
+            <a:ext uri="{91240B29-F687-4F45-9708-019B960494DF}">
+              <a14:hiddenLine xmlns:a14="http://schemas.microsoft.com/office/drawing/2010/main" w="12700" cap="flat" cmpd="sng" algn="ctr">
+                <a:solidFill>
+                  <a:schemeClr val="accent1">
+                    <a:shade val="50000"/>
+                  </a:schemeClr>
+                </a:solidFill>
+                <a:prstDash val="solid"/>
+                <a:miter lim="800000"/>
+              </a14:hiddenLine>
+            </a:ext>
+          </a:extLst>
+        </p:spPr>
+        <p:style>
+          <a:lnRef idx="2">
+            <a:schemeClr val="accent1">
+              <a:shade val="50000"/>
+            </a:schemeClr>
+          </a:lnRef>
+          <a:fillRef idx="1">
+            <a:schemeClr val="accent1"/>
+          </a:fillRef>
+          <a:effectRef idx="0">
+            <a:schemeClr val="accent1"/>
+          </a:effectRef>
+          <a:fontRef idx="minor">
+            <a:schemeClr val="lt1"/>
+          </a:fontRef>
+        </p:style>
+        <p:txBody>
+          <a:bodyPr rtlCol="0" anchor="ctr"/>
+          <a:lstStyle/>
+          <a:p>
+            <a:pPr algn="ctr"/>
+            <a:endParaRPr lang="en-US"/>
+          </a:p>
+        </p:txBody>
+      </p:sp>
+      <p:sp>
+        <p:nvSpPr>
+          <p:cNvPr id="2" name="Title 1">
+            <a:extLst>
+              <a:ext uri="{FF2B5EF4-FFF2-40B4-BE49-F238E27FC236}">
+                <a16:creationId xmlns:a16="http://schemas.microsoft.com/office/drawing/2014/main" id="{5A94E3A4-FAAF-A502-8265-B2AE97300322}"/>
+              </a:ext>
+            </a:extLst>
+          </p:cNvPr>
+          <p:cNvSpPr>
+            <a:spLocks noGrp="1"/>
+          </p:cNvSpPr>
+          <p:nvPr>
+            <p:ph type="title"/>
+          </p:nvPr>
+        </p:nvSpPr>
+        <p:spPr>
+          <a:xfrm>
+            <a:off x="1022817" y="751949"/>
+            <a:ext cx="5524143" cy="1556725"/>
+          </a:xfrm>
+        </p:spPr>
+        <p:txBody>
+          <a:bodyPr vert="horz" lIns="0" tIns="0" rIns="0" bIns="0" rtlCol="0" anchor="b">
+            <a:normAutofit/>
+          </a:bodyPr>
+          <a:lstStyle/>
+          <a:p>
+            <a:r>
+              <a:rPr lang="en-US" sz="3600" dirty="0"/>
+              <a:t>Loan amount status</a:t>
+            </a:r>
           </a:p>
         </p:txBody>
       </p:sp>
@@ -9050,58 +10856,258 @@
             <p:ph type="body" sz="half" idx="2"/>
           </p:nvPr>
         </p:nvSpPr>
-        <p:spPr/>
+        <p:spPr>
+          <a:xfrm>
+            <a:off x="1118187" y="2980855"/>
+            <a:ext cx="4117430" cy="2979753"/>
+          </a:xfrm>
+        </p:spPr>
         <p:txBody>
-          <a:bodyPr>
-            <a:normAutofit fontScale="92500"/>
+          <a:bodyPr vert="horz" lIns="0" tIns="0" rIns="0" bIns="0" rtlCol="0">
+            <a:normAutofit/>
           </a:bodyPr>
           <a:lstStyle/>
           <a:p>
-            <a:pPr marL="342900" indent="-342900" algn="just">
-              <a:buFont typeface="+mj-lt"/>
-              <a:buAutoNum type="arabicPeriod"/>
+            <a:pPr indent="-228600" algn="just">
+              <a:buFont typeface="Arial" panose="020B0604020202020204" pitchFamily="34" charset="0"/>
+              <a:buChar char="•"/>
             </a:pPr>
             <a:r>
-              <a:rPr lang="en-US" dirty="0"/>
+              <a:rPr lang="en-US" sz="2000" dirty="0"/>
               <a:t>Group most likely to get the </a:t>
             </a:r>
             <a:r>
-              <a:rPr lang="en-US" b="1" dirty="0"/>
+              <a:rPr lang="en-US" sz="2000" b="1" dirty="0"/>
               <a:t>loan status approval</a:t>
             </a:r>
             <a:r>
-              <a:rPr lang="en-US" dirty="0"/>
-              <a:t>: male, with a high level of education, married (sum of applicant and co-applicant income together) and living in a semiurban area;</a:t>
+              <a:rPr lang="en-US" sz="2000" dirty="0"/>
+              <a:t>: male, with a high level of education, married (count of applicant and co-applicant income together) and living in a semiurban area.</a:t>
             </a:r>
           </a:p>
           <a:p>
-            <a:pPr marL="342900" indent="-342900" algn="just">
-              <a:buFont typeface="+mj-lt"/>
-              <a:buAutoNum type="arabicPeriod"/>
-            </a:pPr>
-            <a:r>
-              <a:rPr lang="en-US" dirty="0"/>
-              <a:t>As a curiosity, in regards of the group most likely to get a high </a:t>
-            </a:r>
-            <a:r>
-              <a:rPr lang="en-US" b="1" dirty="0"/>
-              <a:t>loan amount approval</a:t>
-            </a:r>
-            <a:r>
-              <a:rPr lang="en-US" dirty="0"/>
-              <a:t>, we have the same demographics, but we have basically a tie between female and male.</a:t>
-            </a:r>
-          </a:p>
-          <a:p>
-            <a:pPr marL="342900" indent="-342900" algn="just">
-              <a:buFont typeface="+mj-lt"/>
-              <a:buAutoNum type="arabicPeriod"/>
+            <a:pPr marL="342900" indent="-228600">
+              <a:buFont typeface="Arial" panose="020B0604020202020204" pitchFamily="34" charset="0"/>
+              <a:buChar char="•"/>
             </a:pPr>
             <a:endParaRPr lang="en-US" dirty="0"/>
           </a:p>
           <a:p>
-            <a:pPr algn="just"/>
+            <a:pPr indent="-228600">
+              <a:buFont typeface="Arial" panose="020B0604020202020204" pitchFamily="34" charset="0"/>
+              <a:buChar char="•"/>
+            </a:pPr>
             <a:endParaRPr lang="en-US" dirty="0"/>
+          </a:p>
+        </p:txBody>
+      </p:sp>
+      <p:pic>
+        <p:nvPicPr>
+          <p:cNvPr id="5" name="Picture 4" descr="Table&#10;&#10;Description automatically generated with medium confidence">
+            <a:extLst>
+              <a:ext uri="{FF2B5EF4-FFF2-40B4-BE49-F238E27FC236}">
+                <a16:creationId xmlns:a16="http://schemas.microsoft.com/office/drawing/2014/main" id="{1D089A32-E651-5570-5BB9-6021E08D4A39}"/>
+              </a:ext>
+            </a:extLst>
+          </p:cNvPr>
+          <p:cNvPicPr>
+            <a:picLocks noChangeAspect="1"/>
+          </p:cNvPicPr>
+          <p:nvPr/>
+        </p:nvPicPr>
+        <p:blipFill>
+          <a:blip r:embed="rId2"/>
+          <a:stretch>
+            <a:fillRect/>
+          </a:stretch>
+        </p:blipFill>
+        <p:spPr>
+          <a:xfrm>
+            <a:off x="6956383" y="354651"/>
+            <a:ext cx="3783814" cy="3074349"/>
+          </a:xfrm>
+          <a:prstGeom prst="rect">
+            <a:avLst/>
+          </a:prstGeom>
+        </p:spPr>
+      </p:pic>
+      <p:pic>
+        <p:nvPicPr>
+          <p:cNvPr id="6" name="Picture 5" descr="Chart&#10;&#10;Description automatically generated">
+            <a:extLst>
+              <a:ext uri="{FF2B5EF4-FFF2-40B4-BE49-F238E27FC236}">
+                <a16:creationId xmlns:a16="http://schemas.microsoft.com/office/drawing/2014/main" id="{F62A955E-F5F1-CF2A-B9E5-E89E14BC68A9}"/>
+              </a:ext>
+            </a:extLst>
+          </p:cNvPr>
+          <p:cNvPicPr>
+            <a:picLocks noChangeAspect="1"/>
+          </p:cNvPicPr>
+          <p:nvPr/>
+        </p:nvPicPr>
+        <p:blipFill>
+          <a:blip r:embed="rId3"/>
+          <a:stretch>
+            <a:fillRect/>
+          </a:stretch>
+        </p:blipFill>
+        <p:spPr>
+          <a:xfrm>
+            <a:off x="6956384" y="3476298"/>
+            <a:ext cx="3783813" cy="2979753"/>
+          </a:xfrm>
+          <a:prstGeom prst="rect">
+            <a:avLst/>
+          </a:prstGeom>
+        </p:spPr>
+      </p:pic>
+      <p:sp>
+        <p:nvSpPr>
+          <p:cNvPr id="33" name="Rectangle 16">
+            <a:extLst>
+              <a:ext uri="{FF2B5EF4-FFF2-40B4-BE49-F238E27FC236}">
+                <a16:creationId xmlns:a16="http://schemas.microsoft.com/office/drawing/2014/main" id="{3808F57C-E98A-4053-BD3D-4D04986CB21A}"/>
+              </a:ext>
+              <a:ext uri="{C183D7F6-B498-43B3-948B-1728B52AA6E4}">
+                <adec:decorative xmlns:adec="http://schemas.microsoft.com/office/drawing/2017/decorative" val="1"/>
+              </a:ext>
+            </a:extLst>
+          </p:cNvPr>
+          <p:cNvSpPr>
+            <a:spLocks noGrp="1" noRot="1" noChangeAspect="1" noMove="1" noResize="1" noEditPoints="1" noAdjustHandles="1" noChangeArrowheads="1" noChangeShapeType="1" noTextEdit="1"/>
+          </p:cNvSpPr>
+          <p:nvPr>
+            <p:extLst>
+              <p:ext uri="{386F3935-93C4-4BCD-93E2-E3B085C9AB24}">
+                <p16:designElem xmlns:p16="http://schemas.microsoft.com/office/powerpoint/2015/main" val="1"/>
+              </p:ext>
+            </p:extLst>
+          </p:nvPr>
+        </p:nvSpPr>
+        <p:spPr>
+          <a:xfrm rot="10800000" flipH="1">
+            <a:off x="0" y="6408741"/>
+            <a:ext cx="12192000" cy="449256"/>
+          </a:xfrm>
+          <a:prstGeom prst="rect">
+            <a:avLst/>
+          </a:prstGeom>
+          <a:gradFill>
+            <a:gsLst>
+              <a:gs pos="14000">
+                <a:schemeClr val="accent4">
+                  <a:alpha val="28000"/>
+                </a:schemeClr>
+              </a:gs>
+              <a:gs pos="100000">
+                <a:schemeClr val="accent5">
+                  <a:alpha val="85000"/>
+                </a:schemeClr>
+              </a:gs>
+            </a:gsLst>
+            <a:lin ang="9000000" scaled="0"/>
+          </a:gradFill>
+          <a:ln>
+            <a:noFill/>
+          </a:ln>
+        </p:spPr>
+        <p:style>
+          <a:lnRef idx="2">
+            <a:schemeClr val="accent1">
+              <a:shade val="50000"/>
+            </a:schemeClr>
+          </a:lnRef>
+          <a:fillRef idx="1">
+            <a:schemeClr val="accent1"/>
+          </a:fillRef>
+          <a:effectRef idx="0">
+            <a:schemeClr val="accent1"/>
+          </a:effectRef>
+          <a:fontRef idx="minor">
+            <a:schemeClr val="lt1"/>
+          </a:fontRef>
+        </p:style>
+        <p:txBody>
+          <a:bodyPr rtlCol="0" anchor="ctr"/>
+          <a:lstStyle/>
+          <a:p>
+            <a:pPr algn="ctr"/>
+            <a:endParaRPr lang="en-US"/>
+          </a:p>
+        </p:txBody>
+      </p:sp>
+      <p:sp>
+        <p:nvSpPr>
+          <p:cNvPr id="34" name="Rectangle 18">
+            <a:extLst>
+              <a:ext uri="{FF2B5EF4-FFF2-40B4-BE49-F238E27FC236}">
+                <a16:creationId xmlns:a16="http://schemas.microsoft.com/office/drawing/2014/main" id="{3DD8121B-71ED-41BD-AA7C-9E5609999D11}"/>
+              </a:ext>
+              <a:ext uri="{C183D7F6-B498-43B3-948B-1728B52AA6E4}">
+                <adec:decorative xmlns:adec="http://schemas.microsoft.com/office/drawing/2017/decorative" val="1"/>
+              </a:ext>
+            </a:extLst>
+          </p:cNvPr>
+          <p:cNvSpPr>
+            <a:spLocks noGrp="1" noRot="1" noChangeAspect="1" noMove="1" noResize="1" noEditPoints="1" noAdjustHandles="1" noChangeArrowheads="1" noChangeShapeType="1" noTextEdit="1"/>
+          </p:cNvSpPr>
+          <p:nvPr>
+            <p:extLst>
+              <p:ext uri="{386F3935-93C4-4BCD-93E2-E3B085C9AB24}">
+                <p16:designElem xmlns:p16="http://schemas.microsoft.com/office/powerpoint/2015/main" val="1"/>
+              </p:ext>
+            </p:extLst>
+          </p:nvPr>
+        </p:nvSpPr>
+        <p:spPr>
+          <a:xfrm flipH="1">
+            <a:off x="4038600" y="6408316"/>
+            <a:ext cx="8153398" cy="449684"/>
+          </a:xfrm>
+          <a:prstGeom prst="rect">
+            <a:avLst/>
+          </a:prstGeom>
+          <a:gradFill>
+            <a:gsLst>
+              <a:gs pos="9000">
+                <a:schemeClr val="accent2">
+                  <a:lumMod val="60000"/>
+                  <a:lumOff val="40000"/>
+                  <a:alpha val="68000"/>
+                </a:schemeClr>
+              </a:gs>
+              <a:gs pos="99000">
+                <a:schemeClr val="accent2"/>
+              </a:gs>
+            </a:gsLst>
+            <a:lin ang="13800000" scaled="0"/>
+          </a:gradFill>
+          <a:ln>
+            <a:noFill/>
+          </a:ln>
+        </p:spPr>
+        <p:style>
+          <a:lnRef idx="2">
+            <a:schemeClr val="accent1">
+              <a:shade val="50000"/>
+            </a:schemeClr>
+          </a:lnRef>
+          <a:fillRef idx="1">
+            <a:schemeClr val="accent1"/>
+          </a:fillRef>
+          <a:effectRef idx="0">
+            <a:schemeClr val="accent1"/>
+          </a:effectRef>
+          <a:fontRef idx="minor">
+            <a:schemeClr val="lt1"/>
+          </a:fontRef>
+        </p:style>
+        <p:txBody>
+          <a:bodyPr rtlCol="0" anchor="ctr"/>
+          <a:lstStyle/>
+          <a:p>
+            <a:pPr algn="ctr"/>
+            <a:endParaRPr lang="en-US"/>
           </a:p>
         </p:txBody>
       </p:sp>
@@ -9118,7 +11124,7 @@
 </p:sld>
 </file>
 
-<file path=ppt/slides/slide7.xml><?xml version="1.0" encoding="utf-8"?>
+<file path=ppt/slides/slide9.xml><?xml version="1.0" encoding="utf-8"?>
 <p:sld xmlns:a="http://schemas.openxmlformats.org/drawingml/2006/main" xmlns:r="http://schemas.openxmlformats.org/officeDocument/2006/relationships" xmlns:p="http://schemas.openxmlformats.org/presentationml/2006/main">
   <p:cSld>
     <p:spTree>
@@ -9151,62 +11157,99 @@
             <p:ph type="title"/>
           </p:nvPr>
         </p:nvSpPr>
-        <p:spPr/>
+        <p:spPr>
+          <a:xfrm>
+            <a:off x="1048297" y="998999"/>
+            <a:ext cx="3932237" cy="1894511"/>
+          </a:xfrm>
+        </p:spPr>
         <p:txBody>
-          <a:bodyPr/>
+          <a:bodyPr>
+            <a:normAutofit/>
+          </a:bodyPr>
           <a:lstStyle/>
           <a:p>
-            <a:endParaRPr lang="en-US"/>
+            <a:r>
+              <a:rPr lang="en-US" dirty="0"/>
+              <a:t>Average loan amount</a:t>
+            </a:r>
           </a:p>
         </p:txBody>
       </p:sp>
+      <p:pic>
+        <p:nvPicPr>
+          <p:cNvPr id="5" name="Picture 4">
+            <a:extLst>
+              <a:ext uri="{FF2B5EF4-FFF2-40B4-BE49-F238E27FC236}">
+                <a16:creationId xmlns:a16="http://schemas.microsoft.com/office/drawing/2014/main" id="{98D3FF54-1812-2584-5F7A-162D98309124}"/>
+              </a:ext>
+            </a:extLst>
+          </p:cNvPr>
+          <p:cNvPicPr>
+            <a:picLocks noChangeAspect="1"/>
+          </p:cNvPicPr>
+          <p:nvPr/>
+        </p:nvPicPr>
+        <p:blipFill>
+          <a:blip r:embed="rId2"/>
+          <a:stretch>
+            <a:fillRect/>
+          </a:stretch>
+        </p:blipFill>
+        <p:spPr>
+          <a:xfrm>
+            <a:off x="5303837" y="1109441"/>
+            <a:ext cx="6203346" cy="4639117"/>
+          </a:xfrm>
+          <a:prstGeom prst="rect">
+            <a:avLst/>
+          </a:prstGeom>
+        </p:spPr>
+      </p:pic>
       <p:sp>
         <p:nvSpPr>
-          <p:cNvPr id="3" name="Content Placeholder 2">
-            <a:extLst>
-              <a:ext uri="{FF2B5EF4-FFF2-40B4-BE49-F238E27FC236}">
-                <a16:creationId xmlns:a16="http://schemas.microsoft.com/office/drawing/2014/main" id="{60EF4D4A-E0D7-0F1E-F508-F8291C0DB995}"/>
-              </a:ext>
-            </a:extLst>
-          </p:cNvPr>
-          <p:cNvSpPr>
-            <a:spLocks noGrp="1"/>
-          </p:cNvSpPr>
-          <p:nvPr>
-            <p:ph idx="1"/>
-          </p:nvPr>
+          <p:cNvPr id="7" name="TextBox 6">
+            <a:extLst>
+              <a:ext uri="{FF2B5EF4-FFF2-40B4-BE49-F238E27FC236}">
+                <a16:creationId xmlns:a16="http://schemas.microsoft.com/office/drawing/2014/main" id="{70E97BB2-6796-5426-152B-9D160E266F1C}"/>
+              </a:ext>
+            </a:extLst>
+          </p:cNvPr>
+          <p:cNvSpPr txBox="1"/>
+          <p:nvPr/>
         </p:nvSpPr>
-        <p:spPr/>
+        <p:spPr>
+          <a:xfrm>
+            <a:off x="1048297" y="3428999"/>
+            <a:ext cx="3809649" cy="1631216"/>
+          </a:xfrm>
+          <a:prstGeom prst="rect">
+            <a:avLst/>
+          </a:prstGeom>
+          <a:noFill/>
+        </p:spPr>
         <p:txBody>
-          <a:bodyPr/>
+          <a:bodyPr wrap="square">
+            <a:spAutoFit/>
+          </a:bodyPr>
           <a:lstStyle/>
           <a:p>
-            <a:endParaRPr lang="en-US"/>
-          </a:p>
-        </p:txBody>
-      </p:sp>
-      <p:sp>
-        <p:nvSpPr>
-          <p:cNvPr id="4" name="Text Placeholder 3">
-            <a:extLst>
-              <a:ext uri="{FF2B5EF4-FFF2-40B4-BE49-F238E27FC236}">
-                <a16:creationId xmlns:a16="http://schemas.microsoft.com/office/drawing/2014/main" id="{7F0E6752-C56C-03F5-CFD3-880B9A2FAE56}"/>
-              </a:ext>
-            </a:extLst>
-          </p:cNvPr>
-          <p:cNvSpPr>
-            <a:spLocks noGrp="1"/>
-          </p:cNvSpPr>
-          <p:nvPr>
-            <p:ph type="body" sz="half" idx="2"/>
-          </p:nvPr>
-        </p:nvSpPr>
-        <p:spPr/>
-        <p:txBody>
-          <a:bodyPr/>
-          <a:lstStyle/>
-          <a:p>
-            <a:endParaRPr lang="en-US"/>
+            <a:pPr marL="342900" indent="-342900" algn="just">
+              <a:buFont typeface="Arial" panose="020B0604020202020204" pitchFamily="34" charset="0"/>
+              <a:buChar char="•"/>
+            </a:pPr>
+            <a:r>
+              <a:rPr lang="en-US" sz="2000" dirty="0"/>
+              <a:t>As a curiosity, in regards of the </a:t>
+            </a:r>
+            <a:r>
+              <a:rPr lang="en-US" sz="2000" b="1" dirty="0"/>
+              <a:t>loan amount approval</a:t>
+            </a:r>
+            <a:r>
+              <a:rPr lang="en-US" sz="2000" dirty="0"/>
+              <a:t>, we have the same demographics, but we have basically a tie between female and male.</a:t>
+            </a:r>
           </a:p>
         </p:txBody>
       </p:sp>
@@ -9214,269 +11257,6 @@
     <p:extLst>
       <p:ext uri="{BB962C8B-B14F-4D97-AF65-F5344CB8AC3E}">
         <p14:creationId xmlns:p14="http://schemas.microsoft.com/office/powerpoint/2010/main" val="3612393829"/>
-      </p:ext>
-    </p:extLst>
-  </p:cSld>
-  <p:clrMapOvr>
-    <a:masterClrMapping/>
-  </p:clrMapOvr>
-</p:sld>
-</file>
-
-<file path=ppt/slides/slide8.xml><?xml version="1.0" encoding="utf-8"?>
-<p:sld xmlns:a="http://schemas.openxmlformats.org/drawingml/2006/main" xmlns:r="http://schemas.openxmlformats.org/officeDocument/2006/relationships" xmlns:p="http://schemas.openxmlformats.org/presentationml/2006/main">
-  <p:cSld>
-    <p:spTree>
-      <p:nvGrpSpPr>
-        <p:cNvPr id="1" name=""/>
-        <p:cNvGrpSpPr/>
-        <p:nvPr/>
-      </p:nvGrpSpPr>
-      <p:grpSpPr>
-        <a:xfrm>
-          <a:off x="0" y="0"/>
-          <a:ext cx="0" cy="0"/>
-          <a:chOff x="0" y="0"/>
-          <a:chExt cx="0" cy="0"/>
-        </a:xfrm>
-      </p:grpSpPr>
-      <p:sp>
-        <p:nvSpPr>
-          <p:cNvPr id="2" name="Title 1">
-            <a:extLst>
-              <a:ext uri="{FF2B5EF4-FFF2-40B4-BE49-F238E27FC236}">
-                <a16:creationId xmlns:a16="http://schemas.microsoft.com/office/drawing/2014/main" id="{0A3F13E1-FBC2-8129-4193-6EAC1898ECEB}"/>
-              </a:ext>
-            </a:extLst>
-          </p:cNvPr>
-          <p:cNvSpPr>
-            <a:spLocks noGrp="1"/>
-          </p:cNvSpPr>
-          <p:nvPr>
-            <p:ph type="title"/>
-          </p:nvPr>
-        </p:nvSpPr>
-        <p:spPr/>
-        <p:txBody>
-          <a:bodyPr/>
-          <a:lstStyle/>
-          <a:p>
-            <a:r>
-              <a:rPr lang="en-US" dirty="0"/>
-              <a:t>Classification problem/model</a:t>
-            </a:r>
-          </a:p>
-        </p:txBody>
-      </p:sp>
-      <p:sp>
-        <p:nvSpPr>
-          <p:cNvPr id="3" name="Content Placeholder 2">
-            <a:extLst>
-              <a:ext uri="{FF2B5EF4-FFF2-40B4-BE49-F238E27FC236}">
-                <a16:creationId xmlns:a16="http://schemas.microsoft.com/office/drawing/2014/main" id="{22259D3C-32FB-1EDC-BE2D-6EAAD7F244FF}"/>
-              </a:ext>
-            </a:extLst>
-          </p:cNvPr>
-          <p:cNvSpPr>
-            <a:spLocks noGrp="1"/>
-          </p:cNvSpPr>
-          <p:nvPr>
-            <p:ph sz="half" idx="1"/>
-          </p:nvPr>
-        </p:nvSpPr>
-        <p:spPr/>
-        <p:txBody>
-          <a:bodyPr>
-            <a:normAutofit lnSpcReduction="10000"/>
-          </a:bodyPr>
-          <a:lstStyle/>
-          <a:p>
-            <a:r>
-              <a:rPr lang="en-US" dirty="0"/>
-              <a:t>Baseline model 1</a:t>
-            </a:r>
-          </a:p>
-          <a:p>
-            <a:r>
-              <a:rPr lang="en-US" dirty="0"/>
-              <a:t>Logistic Regressor</a:t>
-            </a:r>
-          </a:p>
-          <a:p>
-            <a:r>
-              <a:rPr lang="en-US" dirty="0"/>
-              <a:t>Evaluation metrics</a:t>
-            </a:r>
-          </a:p>
-          <a:p>
-            <a:pPr marL="0" indent="0" algn="just">
-              <a:buNone/>
-            </a:pPr>
-            <a:r>
-              <a:rPr lang="en-CA" sz="2000" b="0" i="0" dirty="0">
-                <a:effectLst/>
-                <a:highlight>
-                  <a:srgbClr val="FFFF00"/>
-                </a:highlight>
-              </a:rPr>
-              <a:t>Accuracy: 0.7218543046357616 </a:t>
-            </a:r>
-          </a:p>
-          <a:p>
-            <a:pPr marL="0" indent="0" algn="just">
-              <a:buNone/>
-            </a:pPr>
-            <a:r>
-              <a:rPr lang="en-CA" sz="2000" b="0" i="0" dirty="0">
-                <a:effectLst/>
-              </a:rPr>
-              <a:t>Precision: 0.7008547008547008 </a:t>
-            </a:r>
-          </a:p>
-          <a:p>
-            <a:pPr marL="0" indent="0" algn="just">
-              <a:buNone/>
-            </a:pPr>
-            <a:r>
-              <a:rPr lang="en-CA" sz="2000" b="0" i="0" dirty="0">
-                <a:effectLst/>
-              </a:rPr>
-              <a:t>Recall: 0.9213483146067416 </a:t>
-            </a:r>
-          </a:p>
-          <a:p>
-            <a:pPr marL="0" indent="0" algn="just">
-              <a:buNone/>
-            </a:pPr>
-            <a:r>
-              <a:rPr lang="en-CA" sz="2000" b="0" i="0" dirty="0">
-                <a:effectLst/>
-              </a:rPr>
-              <a:t>F1-score: 0.7961165048543689 </a:t>
-            </a:r>
-          </a:p>
-          <a:p>
-            <a:pPr marL="0" indent="0" algn="just">
-              <a:buNone/>
-            </a:pPr>
-            <a:r>
-              <a:rPr lang="en-CA" sz="2000" b="0" i="0" dirty="0">
-                <a:effectLst/>
-              </a:rPr>
-              <a:t>ROC-AUC score: 0.6784160927872418</a:t>
-            </a:r>
-            <a:endParaRPr lang="en-US" sz="2000" dirty="0"/>
-          </a:p>
-        </p:txBody>
-      </p:sp>
-      <p:sp>
-        <p:nvSpPr>
-          <p:cNvPr id="4" name="Content Placeholder 3">
-            <a:extLst>
-              <a:ext uri="{FF2B5EF4-FFF2-40B4-BE49-F238E27FC236}">
-                <a16:creationId xmlns:a16="http://schemas.microsoft.com/office/drawing/2014/main" id="{94D0BA7E-AF13-72EA-A7FA-F041FBDAD482}"/>
-              </a:ext>
-            </a:extLst>
-          </p:cNvPr>
-          <p:cNvSpPr>
-            <a:spLocks noGrp="1"/>
-          </p:cNvSpPr>
-          <p:nvPr>
-            <p:ph sz="half" idx="2"/>
-          </p:nvPr>
-        </p:nvSpPr>
-        <p:spPr/>
-        <p:txBody>
-          <a:bodyPr>
-            <a:normAutofit lnSpcReduction="10000"/>
-          </a:bodyPr>
-          <a:lstStyle/>
-          <a:p>
-            <a:r>
-              <a:rPr lang="en-US" dirty="0"/>
-              <a:t>Baseline model 2</a:t>
-            </a:r>
-          </a:p>
-          <a:p>
-            <a:r>
-              <a:rPr lang="en-US" dirty="0"/>
-              <a:t>Random Forest</a:t>
-            </a:r>
-          </a:p>
-          <a:p>
-            <a:pPr marL="0" indent="0" algn="just">
-              <a:buNone/>
-            </a:pPr>
-            <a:r>
-              <a:rPr lang="en-US" dirty="0"/>
-              <a:t>Evaluation metrics</a:t>
-            </a:r>
-          </a:p>
-          <a:p>
-            <a:pPr marL="0" indent="0" algn="just">
-              <a:buNone/>
-            </a:pPr>
-            <a:r>
-              <a:rPr lang="en-CA" sz="2000" b="0" i="0" dirty="0">
-                <a:effectLst/>
-                <a:highlight>
-                  <a:srgbClr val="FFFF00"/>
-                </a:highlight>
-              </a:rPr>
-              <a:t>Accuracy: 0.7019867549668874 </a:t>
-            </a:r>
-          </a:p>
-          <a:p>
-            <a:pPr marL="0" indent="0" algn="just">
-              <a:buNone/>
-            </a:pPr>
-            <a:r>
-              <a:rPr lang="en-CA" sz="2000" b="0" i="0" dirty="0">
-                <a:effectLst/>
-              </a:rPr>
-              <a:t>Precision: 0.6929824561403509 </a:t>
-            </a:r>
-          </a:p>
-          <a:p>
-            <a:pPr marL="0" indent="0" algn="just">
-              <a:buNone/>
-            </a:pPr>
-            <a:r>
-              <a:rPr lang="en-CA" sz="2000" b="0" i="0" dirty="0">
-                <a:effectLst/>
-              </a:rPr>
-              <a:t>Recall: 0.8876404494382022 </a:t>
-            </a:r>
-          </a:p>
-          <a:p>
-            <a:pPr marL="0" indent="0" algn="just">
-              <a:buNone/>
-            </a:pPr>
-            <a:r>
-              <a:rPr lang="en-CA" sz="2000" b="0" i="0" dirty="0">
-                <a:effectLst/>
-              </a:rPr>
-              <a:t>F1-score: 0.7783251231527094 </a:t>
-            </a:r>
-          </a:p>
-          <a:p>
-            <a:pPr marL="0" indent="0" algn="just">
-              <a:buNone/>
-            </a:pPr>
-            <a:r>
-              <a:rPr lang="en-CA" sz="2000" b="0" i="0" dirty="0">
-                <a:effectLst/>
-              </a:rPr>
-              <a:t>ROC-AUC score: 0.661562160202972</a:t>
-            </a:r>
-            <a:endParaRPr lang="en-US" sz="2000" dirty="0"/>
-          </a:p>
-        </p:txBody>
-      </p:sp>
-    </p:spTree>
-    <p:extLst>
-      <p:ext uri="{BB962C8B-B14F-4D97-AF65-F5344CB8AC3E}">
-        <p14:creationId xmlns:p14="http://schemas.microsoft.com/office/powerpoint/2010/main" val="323434526"/>
       </p:ext>
     </p:extLst>
   </p:cSld>

</xml_diff>

<commit_message>
Add presentation with the comparison table of the models updated;
</commit_message>
<xml_diff>
--- a/Presentation.pptx
+++ b/Presentation.pptx
@@ -15,6 +15,7 @@
     <p:sldId id="261" r:id="rId9"/>
     <p:sldId id="263" r:id="rId10"/>
     <p:sldId id="259" r:id="rId11"/>
+    <p:sldId id="267" r:id="rId12"/>
   </p:sldIdLst>
   <p:sldSz cx="12192000" cy="6858000"/>
   <p:notesSz cx="6858000" cy="9144000"/>
@@ -128,6 +129,7 @@
             <p14:sldId id="261"/>
             <p14:sldId id="263"/>
             <p14:sldId id="259"/>
+            <p14:sldId id="267"/>
           </p14:sldIdLst>
         </p14:section>
         <p14:section name="Pipeline" id="{C32284C8-BCB6-D64E-99B2-12EB62CDFCF4}">
@@ -8116,10 +8118,10 @@
       </p:grpSpPr>
       <p:sp>
         <p:nvSpPr>
-          <p:cNvPr id="2" name="Title 1">
+          <p:cNvPr id="5" name="Text Placeholder 4">
             <a:extLst>
               <a:ext uri="{FF2B5EF4-FFF2-40B4-BE49-F238E27FC236}">
-                <a16:creationId xmlns:a16="http://schemas.microsoft.com/office/drawing/2014/main" id="{0A3F13E1-FBC2-8129-4193-6EAC1898ECEB}"/>
+                <a16:creationId xmlns:a16="http://schemas.microsoft.com/office/drawing/2014/main" id="{4EAF04F7-B404-DA2C-0706-A9C942EDEE44}"/>
               </a:ext>
             </a:extLst>
           </p:cNvPr>
@@ -8127,7 +8129,7 @@
             <a:spLocks noGrp="1"/>
           </p:cNvSpPr>
           <p:nvPr>
-            <p:ph type="title"/>
+            <p:ph type="body" idx="1"/>
           </p:nvPr>
         </p:nvSpPr>
         <p:spPr/>
@@ -8137,7 +8139,7 @@
           <a:p>
             <a:r>
               <a:rPr lang="en-US" dirty="0"/>
-              <a:t>Classification problem/model</a:t>
+              <a:t>Logistic Regressor</a:t>
             </a:r>
           </a:p>
         </p:txBody>
@@ -8155,18 +8157,13 @@
             <a:spLocks noGrp="1"/>
           </p:cNvSpPr>
           <p:nvPr>
-            <p:ph sz="half" idx="1"/>
+            <p:ph sz="half" idx="2"/>
           </p:nvPr>
         </p:nvSpPr>
-        <p:spPr>
-          <a:xfrm>
-            <a:off x="1371600" y="2112265"/>
-            <a:ext cx="4846320" cy="3959352"/>
-          </a:xfrm>
-        </p:spPr>
+        <p:spPr/>
         <p:txBody>
           <a:bodyPr>
-            <a:normAutofit fontScale="85000" lnSpcReduction="10000"/>
+            <a:normAutofit fontScale="77500" lnSpcReduction="20000"/>
           </a:bodyPr>
           <a:lstStyle/>
           <a:p>
@@ -8178,17 +8175,6 @@
             <a:r>
               <a:rPr lang="en-US" dirty="0"/>
               <a:t>Baseline model 1</a:t>
-            </a:r>
-          </a:p>
-          <a:p>
-            <a:pPr algn="just">
-              <a:lnSpc>
-                <a:spcPct val="160000"/>
-              </a:lnSpc>
-            </a:pPr>
-            <a:r>
-              <a:rPr lang="en-US" dirty="0"/>
-              <a:t>Logistic Regressor</a:t>
             </a:r>
           </a:p>
           <a:p>
@@ -8267,10 +8253,10 @@
       </p:sp>
       <p:sp>
         <p:nvSpPr>
-          <p:cNvPr id="4" name="Content Placeholder 3">
+          <p:cNvPr id="6" name="Text Placeholder 5">
             <a:extLst>
               <a:ext uri="{FF2B5EF4-FFF2-40B4-BE49-F238E27FC236}">
-                <a16:creationId xmlns:a16="http://schemas.microsoft.com/office/drawing/2014/main" id="{94D0BA7E-AF13-72EA-A7FA-F041FBDAD482}"/>
+                <a16:creationId xmlns:a16="http://schemas.microsoft.com/office/drawing/2014/main" id="{BCB7161A-0D8A-7CF8-B8F5-84A7BE504DB5}"/>
               </a:ext>
             </a:extLst>
           </p:cNvPr>
@@ -8278,18 +8264,41 @@
             <a:spLocks noGrp="1"/>
           </p:cNvSpPr>
           <p:nvPr>
-            <p:ph sz="half" idx="2"/>
+            <p:ph type="body" sz="quarter" idx="3"/>
           </p:nvPr>
         </p:nvSpPr>
-        <p:spPr>
-          <a:xfrm>
-            <a:off x="6604514" y="2112266"/>
-            <a:ext cx="4846320" cy="3959351"/>
-          </a:xfrm>
-        </p:spPr>
+        <p:spPr/>
+        <p:txBody>
+          <a:bodyPr/>
+          <a:lstStyle/>
+          <a:p>
+            <a:r>
+              <a:rPr lang="en-US" dirty="0"/>
+              <a:t>Random Forest</a:t>
+            </a:r>
+          </a:p>
+        </p:txBody>
+      </p:sp>
+      <p:sp>
+        <p:nvSpPr>
+          <p:cNvPr id="4" name="Content Placeholder 3">
+            <a:extLst>
+              <a:ext uri="{FF2B5EF4-FFF2-40B4-BE49-F238E27FC236}">
+                <a16:creationId xmlns:a16="http://schemas.microsoft.com/office/drawing/2014/main" id="{94D0BA7E-AF13-72EA-A7FA-F041FBDAD482}"/>
+              </a:ext>
+            </a:extLst>
+          </p:cNvPr>
+          <p:cNvSpPr>
+            <a:spLocks noGrp="1"/>
+          </p:cNvSpPr>
+          <p:nvPr>
+            <p:ph sz="quarter" idx="4"/>
+          </p:nvPr>
+        </p:nvSpPr>
+        <p:spPr/>
         <p:txBody>
           <a:bodyPr>
-            <a:normAutofit fontScale="85000" lnSpcReduction="10000"/>
+            <a:normAutofit fontScale="77500" lnSpcReduction="20000"/>
           </a:bodyPr>
           <a:lstStyle/>
           <a:p>
@@ -8301,17 +8310,6 @@
             <a:r>
               <a:rPr lang="en-US" dirty="0"/>
               <a:t>Baseline model 2</a:t>
-            </a:r>
-          </a:p>
-          <a:p>
-            <a:pPr algn="just">
-              <a:lnSpc>
-                <a:spcPct val="160000"/>
-              </a:lnSpc>
-            </a:pPr>
-            <a:r>
-              <a:rPr lang="en-US" dirty="0"/>
-              <a:t>Random Forest</a:t>
             </a:r>
           </a:p>
           <a:p>
@@ -8388,10 +8386,1298 @@
           </a:p>
         </p:txBody>
       </p:sp>
+      <p:sp>
+        <p:nvSpPr>
+          <p:cNvPr id="2" name="Title 1">
+            <a:extLst>
+              <a:ext uri="{FF2B5EF4-FFF2-40B4-BE49-F238E27FC236}">
+                <a16:creationId xmlns:a16="http://schemas.microsoft.com/office/drawing/2014/main" id="{0A3F13E1-FBC2-8129-4193-6EAC1898ECEB}"/>
+              </a:ext>
+            </a:extLst>
+          </p:cNvPr>
+          <p:cNvSpPr>
+            <a:spLocks noGrp="1"/>
+          </p:cNvSpPr>
+          <p:nvPr>
+            <p:ph type="title"/>
+          </p:nvPr>
+        </p:nvSpPr>
+        <p:spPr/>
+        <p:txBody>
+          <a:bodyPr/>
+          <a:lstStyle/>
+          <a:p>
+            <a:r>
+              <a:rPr lang="en-US" dirty="0"/>
+              <a:t>Classification problem/model</a:t>
+            </a:r>
+          </a:p>
+        </p:txBody>
+      </p:sp>
     </p:spTree>
     <p:extLst>
       <p:ext uri="{BB962C8B-B14F-4D97-AF65-F5344CB8AC3E}">
         <p14:creationId xmlns:p14="http://schemas.microsoft.com/office/powerpoint/2010/main" val="323434526"/>
+      </p:ext>
+    </p:extLst>
+  </p:cSld>
+  <p:clrMapOvr>
+    <a:masterClrMapping/>
+  </p:clrMapOvr>
+</p:sld>
+</file>
+
+<file path=ppt/slides/slide11.xml><?xml version="1.0" encoding="utf-8"?>
+<p:sld xmlns:a="http://schemas.openxmlformats.org/drawingml/2006/main" xmlns:r="http://schemas.openxmlformats.org/officeDocument/2006/relationships" xmlns:p="http://schemas.openxmlformats.org/presentationml/2006/main">
+  <p:cSld>
+    <p:spTree>
+      <p:nvGrpSpPr>
+        <p:cNvPr id="1" name=""/>
+        <p:cNvGrpSpPr/>
+        <p:nvPr/>
+      </p:nvGrpSpPr>
+      <p:grpSpPr>
+        <a:xfrm>
+          <a:off x="0" y="0"/>
+          <a:ext cx="0" cy="0"/>
+          <a:chOff x="0" y="0"/>
+          <a:chExt cx="0" cy="0"/>
+        </a:xfrm>
+      </p:grpSpPr>
+      <p:graphicFrame>
+        <p:nvGraphicFramePr>
+          <p:cNvPr id="7" name="Table 7">
+            <a:extLst>
+              <a:ext uri="{FF2B5EF4-FFF2-40B4-BE49-F238E27FC236}">
+                <a16:creationId xmlns:a16="http://schemas.microsoft.com/office/drawing/2014/main" id="{8C336380-F301-E137-48D5-0898F51C864A}"/>
+              </a:ext>
+            </a:extLst>
+          </p:cNvPr>
+          <p:cNvGraphicFramePr>
+            <a:graphicFrameLocks noGrp="1"/>
+          </p:cNvGraphicFramePr>
+          <p:nvPr>
+            <p:ph sz="half" idx="2"/>
+            <p:extLst>
+              <p:ext uri="{D42A27DB-BD31-4B8C-83A1-F6EECF244321}">
+                <p14:modId xmlns:p14="http://schemas.microsoft.com/office/powerpoint/2010/main" val="623032066"/>
+              </p:ext>
+            </p:extLst>
+          </p:nvPr>
+        </p:nvGraphicFramePr>
+        <p:xfrm>
+          <a:off x="0" y="0"/>
+          <a:ext cx="12191999" cy="6354501"/>
+        </p:xfrm>
+        <a:graphic>
+          <a:graphicData uri="http://schemas.openxmlformats.org/drawingml/2006/table">
+            <a:tbl>
+              <a:tblPr firstRow="1" bandRow="1">
+                <a:tableStyleId>{0660B408-B3CF-4A94-85FC-2B1E0A45F4A2}</a:tableStyleId>
+              </a:tblPr>
+              <a:tblGrid>
+                <a:gridCol w="1432399">
+                  <a:extLst>
+                    <a:ext uri="{9D8B030D-6E8A-4147-A177-3AD203B41FA5}">
+                      <a16:colId xmlns:a16="http://schemas.microsoft.com/office/drawing/2014/main" val="2304630871"/>
+                    </a:ext>
+                  </a:extLst>
+                </a:gridCol>
+                <a:gridCol w="1698125">
+                  <a:extLst>
+                    <a:ext uri="{9D8B030D-6E8A-4147-A177-3AD203B41FA5}">
+                      <a16:colId xmlns:a16="http://schemas.microsoft.com/office/drawing/2014/main" val="4099274381"/>
+                    </a:ext>
+                  </a:extLst>
+                </a:gridCol>
+                <a:gridCol w="1671140">
+                  <a:extLst>
+                    <a:ext uri="{9D8B030D-6E8A-4147-A177-3AD203B41FA5}">
+                      <a16:colId xmlns:a16="http://schemas.microsoft.com/office/drawing/2014/main" val="35176146"/>
+                    </a:ext>
+                  </a:extLst>
+                </a:gridCol>
+                <a:gridCol w="1671140">
+                  <a:extLst>
+                    <a:ext uri="{9D8B030D-6E8A-4147-A177-3AD203B41FA5}">
+                      <a16:colId xmlns:a16="http://schemas.microsoft.com/office/drawing/2014/main" val="1956135299"/>
+                    </a:ext>
+                  </a:extLst>
+                </a:gridCol>
+                <a:gridCol w="1671140">
+                  <a:extLst>
+                    <a:ext uri="{9D8B030D-6E8A-4147-A177-3AD203B41FA5}">
+                      <a16:colId xmlns:a16="http://schemas.microsoft.com/office/drawing/2014/main" val="534838998"/>
+                    </a:ext>
+                  </a:extLst>
+                </a:gridCol>
+                <a:gridCol w="1835627">
+                  <a:extLst>
+                    <a:ext uri="{9D8B030D-6E8A-4147-A177-3AD203B41FA5}">
+                      <a16:colId xmlns:a16="http://schemas.microsoft.com/office/drawing/2014/main" val="2156360941"/>
+                    </a:ext>
+                  </a:extLst>
+                </a:gridCol>
+                <a:gridCol w="2212428">
+                  <a:extLst>
+                    <a:ext uri="{9D8B030D-6E8A-4147-A177-3AD203B41FA5}">
+                      <a16:colId xmlns:a16="http://schemas.microsoft.com/office/drawing/2014/main" val="4037677699"/>
+                    </a:ext>
+                  </a:extLst>
+                </a:gridCol>
+              </a:tblGrid>
+              <a:tr h="2286000">
+                <a:tc>
+                  <a:txBody>
+                    <a:bodyPr/>
+                    <a:lstStyle/>
+                    <a:p>
+                      <a:pPr algn="ctr">
+                        <a:lnSpc>
+                          <a:spcPct val="100000"/>
+                        </a:lnSpc>
+                      </a:pPr>
+                      <a:endParaRPr lang="en-US" dirty="0"/>
+                    </a:p>
+                    <a:p>
+                      <a:pPr algn="ctr">
+                        <a:lnSpc>
+                          <a:spcPct val="100000"/>
+                        </a:lnSpc>
+                      </a:pPr>
+                      <a:endParaRPr lang="en-US" dirty="0"/>
+                    </a:p>
+                    <a:p>
+                      <a:pPr algn="ctr">
+                        <a:lnSpc>
+                          <a:spcPct val="100000"/>
+                        </a:lnSpc>
+                      </a:pPr>
+                      <a:endParaRPr lang="en-US" dirty="0"/>
+                    </a:p>
+                    <a:p>
+                      <a:pPr algn="ctr">
+                        <a:lnSpc>
+                          <a:spcPct val="100000"/>
+                        </a:lnSpc>
+                      </a:pPr>
+                      <a:r>
+                        <a:rPr lang="en-US" dirty="0"/>
+                        <a:t>Metrics</a:t>
+                      </a:r>
+                    </a:p>
+                  </a:txBody>
+                  <a:tcPr/>
+                </a:tc>
+                <a:tc>
+                  <a:txBody>
+                    <a:bodyPr/>
+                    <a:lstStyle/>
+                    <a:p>
+                      <a:pPr algn="ctr">
+                        <a:lnSpc>
+                          <a:spcPct val="100000"/>
+                        </a:lnSpc>
+                      </a:pPr>
+                      <a:r>
+                        <a:rPr lang="en-US" dirty="0"/>
+                        <a:t>Base Line Model 1</a:t>
+                      </a:r>
+                    </a:p>
+                    <a:p>
+                      <a:pPr algn="ctr">
+                        <a:lnSpc>
+                          <a:spcPct val="100000"/>
+                        </a:lnSpc>
+                      </a:pPr>
+                      <a:endParaRPr lang="en-US" dirty="0"/>
+                    </a:p>
+                    <a:p>
+                      <a:pPr algn="ctr">
+                        <a:lnSpc>
+                          <a:spcPct val="100000"/>
+                        </a:lnSpc>
+                      </a:pPr>
+                      <a:endParaRPr lang="en-US" dirty="0"/>
+                    </a:p>
+                    <a:p>
+                      <a:pPr algn="ctr">
+                        <a:lnSpc>
+                          <a:spcPct val="100000"/>
+                        </a:lnSpc>
+                      </a:pPr>
+                      <a:endParaRPr lang="en-US" dirty="0"/>
+                    </a:p>
+                    <a:p>
+                      <a:pPr algn="ctr">
+                        <a:lnSpc>
+                          <a:spcPct val="100000"/>
+                        </a:lnSpc>
+                      </a:pPr>
+                      <a:r>
+                        <a:rPr lang="en-US" dirty="0"/>
+                        <a:t>Logistic Regressor</a:t>
+                      </a:r>
+                    </a:p>
+                  </a:txBody>
+                  <a:tcPr/>
+                </a:tc>
+                <a:tc>
+                  <a:txBody>
+                    <a:bodyPr/>
+                    <a:lstStyle/>
+                    <a:p>
+                      <a:pPr marL="0" marR="0" lvl="0" indent="0" algn="ctr" defTabSz="914400" rtl="0" eaLnBrk="1" fontAlgn="auto" latinLnBrk="0" hangingPunct="1">
+                        <a:lnSpc>
+                          <a:spcPct val="100000"/>
+                        </a:lnSpc>
+                        <a:spcBef>
+                          <a:spcPts val="0"/>
+                        </a:spcBef>
+                        <a:spcAft>
+                          <a:spcPts val="0"/>
+                        </a:spcAft>
+                        <a:buClrTx/>
+                        <a:buSzTx/>
+                        <a:buFontTx/>
+                        <a:buNone/>
+                        <a:tabLst/>
+                        <a:defRPr/>
+                      </a:pPr>
+                      <a:r>
+                        <a:rPr lang="en-US" dirty="0"/>
+                        <a:t>Base Line Model 1 with Grid Search CV</a:t>
+                      </a:r>
+                    </a:p>
+                    <a:p>
+                      <a:pPr marL="0" marR="0" lvl="0" indent="0" algn="ctr" defTabSz="914400" rtl="0" eaLnBrk="1" fontAlgn="auto" latinLnBrk="0" hangingPunct="1">
+                        <a:lnSpc>
+                          <a:spcPct val="100000"/>
+                        </a:lnSpc>
+                        <a:spcBef>
+                          <a:spcPts val="0"/>
+                        </a:spcBef>
+                        <a:spcAft>
+                          <a:spcPts val="0"/>
+                        </a:spcAft>
+                        <a:buClrTx/>
+                        <a:buSzTx/>
+                        <a:buFontTx/>
+                        <a:buNone/>
+                        <a:tabLst/>
+                        <a:defRPr/>
+                      </a:pPr>
+                      <a:endParaRPr lang="en-US" dirty="0"/>
+                    </a:p>
+                    <a:p>
+                      <a:pPr marL="0" marR="0" lvl="0" indent="0" algn="ctr" defTabSz="914400" rtl="0" eaLnBrk="1" fontAlgn="auto" latinLnBrk="0" hangingPunct="1">
+                        <a:lnSpc>
+                          <a:spcPct val="100000"/>
+                        </a:lnSpc>
+                        <a:spcBef>
+                          <a:spcPts val="0"/>
+                        </a:spcBef>
+                        <a:spcAft>
+                          <a:spcPts val="0"/>
+                        </a:spcAft>
+                        <a:buClrTx/>
+                        <a:buSzTx/>
+                        <a:buFontTx/>
+                        <a:buNone/>
+                        <a:tabLst/>
+                        <a:defRPr/>
+                      </a:pPr>
+                      <a:endParaRPr lang="en-US" dirty="0"/>
+                    </a:p>
+                    <a:p>
+                      <a:pPr marL="0" marR="0" lvl="0" indent="0" algn="ctr" defTabSz="914400" rtl="0" eaLnBrk="1" fontAlgn="auto" latinLnBrk="0" hangingPunct="1">
+                        <a:lnSpc>
+                          <a:spcPct val="100000"/>
+                        </a:lnSpc>
+                        <a:spcBef>
+                          <a:spcPts val="0"/>
+                        </a:spcBef>
+                        <a:spcAft>
+                          <a:spcPts val="0"/>
+                        </a:spcAft>
+                        <a:buClrTx/>
+                        <a:buSzTx/>
+                        <a:buFontTx/>
+                        <a:buNone/>
+                        <a:tabLst/>
+                        <a:defRPr/>
+                      </a:pPr>
+                      <a:r>
+                        <a:rPr lang="en-US" dirty="0"/>
+                        <a:t>Logistic Regressor</a:t>
+                      </a:r>
+                    </a:p>
+                  </a:txBody>
+                  <a:tcPr/>
+                </a:tc>
+                <a:tc>
+                  <a:txBody>
+                    <a:bodyPr/>
+                    <a:lstStyle/>
+                    <a:p>
+                      <a:pPr algn="ctr"/>
+                      <a:r>
+                        <a:rPr lang="en-US" dirty="0"/>
+                        <a:t>Pipeline </a:t>
+                      </a:r>
+                    </a:p>
+                    <a:p>
+                      <a:pPr algn="ctr"/>
+                      <a:endParaRPr lang="en-US" dirty="0"/>
+                    </a:p>
+                    <a:p>
+                      <a:pPr algn="ctr"/>
+                      <a:endParaRPr lang="en-US" dirty="0"/>
+                    </a:p>
+                    <a:p>
+                      <a:pPr algn="ctr"/>
+                      <a:endParaRPr lang="en-US" dirty="0"/>
+                    </a:p>
+                    <a:p>
+                      <a:pPr algn="ctr"/>
+                      <a:endParaRPr lang="en-US" dirty="0"/>
+                    </a:p>
+                    <a:p>
+                      <a:pPr algn="ctr"/>
+                      <a:r>
+                        <a:rPr lang="en-US" dirty="0"/>
+                        <a:t>Logistic Regressor </a:t>
+                      </a:r>
+                    </a:p>
+                  </a:txBody>
+                  <a:tcPr/>
+                </a:tc>
+                <a:tc>
+                  <a:txBody>
+                    <a:bodyPr/>
+                    <a:lstStyle/>
+                    <a:p>
+                      <a:pPr algn="ctr">
+                        <a:lnSpc>
+                          <a:spcPct val="100000"/>
+                        </a:lnSpc>
+                      </a:pPr>
+                      <a:r>
+                        <a:rPr lang="en-US" dirty="0"/>
+                        <a:t>Base Line Model 2</a:t>
+                      </a:r>
+                    </a:p>
+                    <a:p>
+                      <a:pPr algn="ctr">
+                        <a:lnSpc>
+                          <a:spcPct val="100000"/>
+                        </a:lnSpc>
+                      </a:pPr>
+                      <a:endParaRPr lang="en-US" dirty="0"/>
+                    </a:p>
+                    <a:p>
+                      <a:pPr algn="ctr">
+                        <a:lnSpc>
+                          <a:spcPct val="100000"/>
+                        </a:lnSpc>
+                      </a:pPr>
+                      <a:endParaRPr lang="en-US" dirty="0"/>
+                    </a:p>
+                    <a:p>
+                      <a:pPr algn="ctr">
+                        <a:lnSpc>
+                          <a:spcPct val="100000"/>
+                        </a:lnSpc>
+                      </a:pPr>
+                      <a:r>
+                        <a:rPr lang="en-US" dirty="0"/>
+                        <a:t> </a:t>
+                      </a:r>
+                    </a:p>
+                    <a:p>
+                      <a:pPr algn="ctr">
+                        <a:lnSpc>
+                          <a:spcPct val="100000"/>
+                        </a:lnSpc>
+                      </a:pPr>
+                      <a:r>
+                        <a:rPr lang="en-US" dirty="0"/>
+                        <a:t>Random Forest</a:t>
+                      </a:r>
+                    </a:p>
+                  </a:txBody>
+                  <a:tcPr/>
+                </a:tc>
+                <a:tc>
+                  <a:txBody>
+                    <a:bodyPr/>
+                    <a:lstStyle/>
+                    <a:p>
+                      <a:pPr marL="0" marR="0" lvl="0" indent="0" algn="ctr" defTabSz="914400" rtl="0" eaLnBrk="1" fontAlgn="auto" latinLnBrk="0" hangingPunct="1">
+                        <a:lnSpc>
+                          <a:spcPct val="100000"/>
+                        </a:lnSpc>
+                        <a:spcBef>
+                          <a:spcPts val="0"/>
+                        </a:spcBef>
+                        <a:spcAft>
+                          <a:spcPts val="0"/>
+                        </a:spcAft>
+                        <a:buClrTx/>
+                        <a:buSzTx/>
+                        <a:buFontTx/>
+                        <a:buNone/>
+                        <a:tabLst/>
+                        <a:defRPr/>
+                      </a:pPr>
+                      <a:r>
+                        <a:rPr lang="en-US" dirty="0"/>
+                        <a:t>Base Line Model 2 with Grid Search CV</a:t>
+                      </a:r>
+                    </a:p>
+                    <a:p>
+                      <a:pPr marL="0" marR="0" lvl="0" indent="0" algn="ctr" defTabSz="914400" rtl="0" eaLnBrk="1" fontAlgn="auto" latinLnBrk="0" hangingPunct="1">
+                        <a:lnSpc>
+                          <a:spcPct val="100000"/>
+                        </a:lnSpc>
+                        <a:spcBef>
+                          <a:spcPts val="0"/>
+                        </a:spcBef>
+                        <a:spcAft>
+                          <a:spcPts val="0"/>
+                        </a:spcAft>
+                        <a:buClrTx/>
+                        <a:buSzTx/>
+                        <a:buFontTx/>
+                        <a:buNone/>
+                        <a:tabLst/>
+                        <a:defRPr/>
+                      </a:pPr>
+                      <a:endParaRPr lang="en-US" dirty="0"/>
+                    </a:p>
+                    <a:p>
+                      <a:pPr marL="0" marR="0" lvl="0" indent="0" algn="ctr" defTabSz="914400" rtl="0" eaLnBrk="1" fontAlgn="auto" latinLnBrk="0" hangingPunct="1">
+                        <a:lnSpc>
+                          <a:spcPct val="100000"/>
+                        </a:lnSpc>
+                        <a:spcBef>
+                          <a:spcPts val="0"/>
+                        </a:spcBef>
+                        <a:spcAft>
+                          <a:spcPts val="0"/>
+                        </a:spcAft>
+                        <a:buClrTx/>
+                        <a:buSzTx/>
+                        <a:buFontTx/>
+                        <a:buNone/>
+                        <a:tabLst/>
+                        <a:defRPr/>
+                      </a:pPr>
+                      <a:endParaRPr lang="en-US" dirty="0"/>
+                    </a:p>
+                    <a:p>
+                      <a:pPr marL="0" marR="0" lvl="0" indent="0" algn="ctr" defTabSz="914400" rtl="0" eaLnBrk="1" fontAlgn="auto" latinLnBrk="0" hangingPunct="1">
+                        <a:lnSpc>
+                          <a:spcPct val="100000"/>
+                        </a:lnSpc>
+                        <a:spcBef>
+                          <a:spcPts val="0"/>
+                        </a:spcBef>
+                        <a:spcAft>
+                          <a:spcPts val="0"/>
+                        </a:spcAft>
+                        <a:buClrTx/>
+                        <a:buSzTx/>
+                        <a:buFontTx/>
+                        <a:buNone/>
+                        <a:tabLst/>
+                        <a:defRPr/>
+                      </a:pPr>
+                      <a:r>
+                        <a:rPr lang="en-US" dirty="0"/>
+                        <a:t>Random Forest</a:t>
+                      </a:r>
+                    </a:p>
+                  </a:txBody>
+                  <a:tcPr/>
+                </a:tc>
+                <a:tc>
+                  <a:txBody>
+                    <a:bodyPr/>
+                    <a:lstStyle/>
+                    <a:p>
+                      <a:pPr marL="0" marR="0" lvl="0" indent="0" algn="ctr" defTabSz="914400" rtl="0" eaLnBrk="1" fontAlgn="auto" latinLnBrk="0" hangingPunct="1">
+                        <a:lnSpc>
+                          <a:spcPct val="100000"/>
+                        </a:lnSpc>
+                        <a:spcBef>
+                          <a:spcPts val="0"/>
+                        </a:spcBef>
+                        <a:spcAft>
+                          <a:spcPts val="0"/>
+                        </a:spcAft>
+                        <a:buClrTx/>
+                        <a:buSzTx/>
+                        <a:buFontTx/>
+                        <a:buNone/>
+                        <a:tabLst/>
+                        <a:defRPr/>
+                      </a:pPr>
+                      <a:r>
+                        <a:rPr lang="en-US" dirty="0"/>
+                        <a:t>Pipeline </a:t>
+                      </a:r>
+                    </a:p>
+                    <a:p>
+                      <a:pPr marL="0" marR="0" lvl="0" indent="0" algn="ctr" defTabSz="914400" rtl="0" eaLnBrk="1" fontAlgn="auto" latinLnBrk="0" hangingPunct="1">
+                        <a:lnSpc>
+                          <a:spcPct val="100000"/>
+                        </a:lnSpc>
+                        <a:spcBef>
+                          <a:spcPts val="0"/>
+                        </a:spcBef>
+                        <a:spcAft>
+                          <a:spcPts val="0"/>
+                        </a:spcAft>
+                        <a:buClrTx/>
+                        <a:buSzTx/>
+                        <a:buFontTx/>
+                        <a:buNone/>
+                        <a:tabLst/>
+                        <a:defRPr/>
+                      </a:pPr>
+                      <a:endParaRPr lang="en-US" dirty="0"/>
+                    </a:p>
+                    <a:p>
+                      <a:pPr marL="0" marR="0" lvl="0" indent="0" algn="ctr" defTabSz="914400" rtl="0" eaLnBrk="1" fontAlgn="auto" latinLnBrk="0" hangingPunct="1">
+                        <a:lnSpc>
+                          <a:spcPct val="100000"/>
+                        </a:lnSpc>
+                        <a:spcBef>
+                          <a:spcPts val="0"/>
+                        </a:spcBef>
+                        <a:spcAft>
+                          <a:spcPts val="0"/>
+                        </a:spcAft>
+                        <a:buClrTx/>
+                        <a:buSzTx/>
+                        <a:buFontTx/>
+                        <a:buNone/>
+                        <a:tabLst/>
+                        <a:defRPr/>
+                      </a:pPr>
+                      <a:endParaRPr lang="en-US" dirty="0"/>
+                    </a:p>
+                    <a:p>
+                      <a:pPr marL="0" marR="0" lvl="0" indent="0" algn="ctr" defTabSz="914400" rtl="0" eaLnBrk="1" fontAlgn="auto" latinLnBrk="0" hangingPunct="1">
+                        <a:lnSpc>
+                          <a:spcPct val="100000"/>
+                        </a:lnSpc>
+                        <a:spcBef>
+                          <a:spcPts val="0"/>
+                        </a:spcBef>
+                        <a:spcAft>
+                          <a:spcPts val="0"/>
+                        </a:spcAft>
+                        <a:buClrTx/>
+                        <a:buSzTx/>
+                        <a:buFontTx/>
+                        <a:buNone/>
+                        <a:tabLst/>
+                        <a:defRPr/>
+                      </a:pPr>
+                      <a:endParaRPr lang="en-US" dirty="0"/>
+                    </a:p>
+                    <a:p>
+                      <a:pPr marL="0" marR="0" lvl="0" indent="0" algn="ctr" defTabSz="914400" rtl="0" eaLnBrk="1" fontAlgn="auto" latinLnBrk="0" hangingPunct="1">
+                        <a:lnSpc>
+                          <a:spcPct val="100000"/>
+                        </a:lnSpc>
+                        <a:spcBef>
+                          <a:spcPts val="0"/>
+                        </a:spcBef>
+                        <a:spcAft>
+                          <a:spcPts val="0"/>
+                        </a:spcAft>
+                        <a:buClrTx/>
+                        <a:buSzTx/>
+                        <a:buFontTx/>
+                        <a:buNone/>
+                        <a:tabLst/>
+                        <a:defRPr/>
+                      </a:pPr>
+                      <a:endParaRPr lang="en-US" dirty="0"/>
+                    </a:p>
+                    <a:p>
+                      <a:pPr marL="0" marR="0" lvl="0" indent="0" algn="ctr" defTabSz="914400" rtl="0" eaLnBrk="1" fontAlgn="auto" latinLnBrk="0" hangingPunct="1">
+                        <a:lnSpc>
+                          <a:spcPct val="100000"/>
+                        </a:lnSpc>
+                        <a:spcBef>
+                          <a:spcPts val="0"/>
+                        </a:spcBef>
+                        <a:spcAft>
+                          <a:spcPts val="0"/>
+                        </a:spcAft>
+                        <a:buClrTx/>
+                        <a:buSzTx/>
+                        <a:buFontTx/>
+                        <a:buNone/>
+                        <a:tabLst/>
+                        <a:defRPr/>
+                      </a:pPr>
+                      <a:r>
+                        <a:rPr lang="en-US" dirty="0"/>
+                        <a:t>Random Forest</a:t>
+                      </a:r>
+                    </a:p>
+                  </a:txBody>
+                  <a:tcPr/>
+                </a:tc>
+                <a:extLst>
+                  <a:ext uri="{0D108BD9-81ED-4DB2-BD59-A6C34878D82A}">
+                    <a16:rowId xmlns:a16="http://schemas.microsoft.com/office/drawing/2014/main" val="3113750937"/>
+                  </a:ext>
+                </a:extLst>
+              </a:tr>
+              <a:tr h="1036599">
+                <a:tc>
+                  <a:txBody>
+                    <a:bodyPr/>
+                    <a:lstStyle/>
+                    <a:p>
+                      <a:pPr algn="ctr">
+                        <a:lnSpc>
+                          <a:spcPct val="100000"/>
+                        </a:lnSpc>
+                      </a:pPr>
+                      <a:r>
+                        <a:rPr lang="en-US" b="1" dirty="0"/>
+                        <a:t>Accuracy</a:t>
+                      </a:r>
+                    </a:p>
+                  </a:txBody>
+                  <a:tcPr/>
+                </a:tc>
+                <a:tc>
+                  <a:txBody>
+                    <a:bodyPr/>
+                    <a:lstStyle/>
+                    <a:p>
+                      <a:pPr marL="0" marR="0" lvl="0" indent="0" algn="ctr" defTabSz="914400" rtl="0" eaLnBrk="1" fontAlgn="auto" latinLnBrk="0" hangingPunct="1">
+                        <a:lnSpc>
+                          <a:spcPct val="100000"/>
+                        </a:lnSpc>
+                        <a:spcBef>
+                          <a:spcPts val="0"/>
+                        </a:spcBef>
+                        <a:spcAft>
+                          <a:spcPts val="0"/>
+                        </a:spcAft>
+                        <a:buClrTx/>
+                        <a:buSzTx/>
+                        <a:buFontTx/>
+                        <a:buNone/>
+                        <a:tabLst/>
+                        <a:defRPr/>
+                      </a:pPr>
+                      <a:r>
+                        <a:rPr lang="en-CA" b="1" dirty="0">
+                          <a:solidFill>
+                            <a:schemeClr val="tx1"/>
+                          </a:solidFill>
+                          <a:effectLst/>
+                        </a:rPr>
+                        <a:t>0.721</a:t>
+                      </a:r>
+                      <a:endParaRPr lang="en-US" b="1" dirty="0">
+                        <a:solidFill>
+                          <a:schemeClr val="tx1"/>
+                        </a:solidFill>
+                      </a:endParaRPr>
+                    </a:p>
+                  </a:txBody>
+                  <a:tcPr/>
+                </a:tc>
+                <a:tc>
+                  <a:txBody>
+                    <a:bodyPr/>
+                    <a:lstStyle/>
+                    <a:p>
+                      <a:pPr algn="ctr"/>
+                      <a:r>
+                        <a:rPr lang="en-CA" sz="1800" b="1" i="0" kern="1200" dirty="0">
+                          <a:solidFill>
+                            <a:schemeClr val="tx1"/>
+                          </a:solidFill>
+                          <a:effectLst/>
+                          <a:latin typeface="+mn-lt"/>
+                          <a:ea typeface="+mn-ea"/>
+                          <a:cs typeface="+mn-cs"/>
+                        </a:rPr>
+                        <a:t>0.728</a:t>
+                      </a:r>
+                      <a:endParaRPr lang="en-US" b="1" dirty="0">
+                        <a:solidFill>
+                          <a:schemeClr val="tx1"/>
+                        </a:solidFill>
+                      </a:endParaRPr>
+                    </a:p>
+                  </a:txBody>
+                  <a:tcPr/>
+                </a:tc>
+                <a:tc>
+                  <a:txBody>
+                    <a:bodyPr/>
+                    <a:lstStyle/>
+                    <a:p>
+                      <a:pPr algn="ctr"/>
+                      <a:r>
+                        <a:rPr lang="en-CA" sz="1800" b="1" kern="1200" dirty="0">
+                          <a:solidFill>
+                            <a:schemeClr val="tx1"/>
+                          </a:solidFill>
+                          <a:effectLst/>
+                        </a:rPr>
+                        <a:t>0.708</a:t>
+                      </a:r>
+                      <a:endParaRPr lang="en-US" b="1" dirty="0">
+                        <a:solidFill>
+                          <a:schemeClr val="tx1"/>
+                        </a:solidFill>
+                      </a:endParaRPr>
+                    </a:p>
+                  </a:txBody>
+                  <a:tcPr/>
+                </a:tc>
+                <a:tc>
+                  <a:txBody>
+                    <a:bodyPr/>
+                    <a:lstStyle/>
+                    <a:p>
+                      <a:pPr marL="0" marR="0" lvl="0" indent="0" algn="ctr" defTabSz="914400" rtl="0" eaLnBrk="1" fontAlgn="auto" latinLnBrk="0" hangingPunct="1">
+                        <a:lnSpc>
+                          <a:spcPct val="100000"/>
+                        </a:lnSpc>
+                        <a:spcBef>
+                          <a:spcPts val="0"/>
+                        </a:spcBef>
+                        <a:spcAft>
+                          <a:spcPts val="0"/>
+                        </a:spcAft>
+                        <a:buClrTx/>
+                        <a:buSzTx/>
+                        <a:buFontTx/>
+                        <a:buNone/>
+                        <a:tabLst/>
+                        <a:defRPr/>
+                      </a:pPr>
+                      <a:r>
+                        <a:rPr lang="en-CA" b="1" dirty="0">
+                          <a:solidFill>
+                            <a:schemeClr val="tx1"/>
+                          </a:solidFill>
+                          <a:effectLst/>
+                        </a:rPr>
+                        <a:t>0.675</a:t>
+                      </a:r>
+                      <a:endParaRPr lang="en-US" b="1" dirty="0">
+                        <a:solidFill>
+                          <a:schemeClr val="tx1"/>
+                        </a:solidFill>
+                      </a:endParaRPr>
+                    </a:p>
+                  </a:txBody>
+                  <a:tcPr/>
+                </a:tc>
+                <a:tc>
+                  <a:txBody>
+                    <a:bodyPr/>
+                    <a:lstStyle/>
+                    <a:p>
+                      <a:pPr algn="ctr"/>
+                      <a:r>
+                        <a:rPr lang="en-CA" sz="1800" b="1" i="0" kern="1200" dirty="0">
+                          <a:solidFill>
+                            <a:schemeClr val="tx1"/>
+                          </a:solidFill>
+                          <a:effectLst/>
+                          <a:latin typeface="+mn-lt"/>
+                          <a:ea typeface="+mn-ea"/>
+                          <a:cs typeface="+mn-cs"/>
+                        </a:rPr>
+                        <a:t>0.728</a:t>
+                      </a:r>
+                      <a:endParaRPr lang="en-US" b="1" dirty="0">
+                        <a:solidFill>
+                          <a:schemeClr val="tx1"/>
+                        </a:solidFill>
+                      </a:endParaRPr>
+                    </a:p>
+                  </a:txBody>
+                  <a:tcPr/>
+                </a:tc>
+                <a:tc>
+                  <a:txBody>
+                    <a:bodyPr/>
+                    <a:lstStyle/>
+                    <a:p>
+                      <a:pPr algn="ctr"/>
+                      <a:r>
+                        <a:rPr lang="en-CA" sz="1800" b="1" kern="1200" dirty="0">
+                          <a:solidFill>
+                            <a:schemeClr val="tx1"/>
+                          </a:solidFill>
+                          <a:effectLst/>
+                        </a:rPr>
+                        <a:t>0.668</a:t>
+                      </a:r>
+                      <a:endParaRPr lang="en-US" b="1" dirty="0">
+                        <a:solidFill>
+                          <a:schemeClr val="tx1"/>
+                        </a:solidFill>
+                      </a:endParaRPr>
+                    </a:p>
+                  </a:txBody>
+                  <a:tcPr/>
+                </a:tc>
+                <a:extLst>
+                  <a:ext uri="{0D108BD9-81ED-4DB2-BD59-A6C34878D82A}">
+                    <a16:rowId xmlns:a16="http://schemas.microsoft.com/office/drawing/2014/main" val="1550660384"/>
+                  </a:ext>
+                </a:extLst>
+              </a:tr>
+              <a:tr h="1036599">
+                <a:tc>
+                  <a:txBody>
+                    <a:bodyPr/>
+                    <a:lstStyle/>
+                    <a:p>
+                      <a:pPr marL="0" indent="0" algn="ctr">
+                        <a:lnSpc>
+                          <a:spcPct val="100000"/>
+                        </a:lnSpc>
+                        <a:buNone/>
+                      </a:pPr>
+                      <a:r>
+                        <a:rPr lang="en-CA" b="0" dirty="0">
+                          <a:effectLst/>
+                        </a:rPr>
+                        <a:t>Precision</a:t>
+                      </a:r>
+                      <a:endParaRPr lang="en-US" dirty="0"/>
+                    </a:p>
+                  </a:txBody>
+                  <a:tcPr/>
+                </a:tc>
+                <a:tc>
+                  <a:txBody>
+                    <a:bodyPr/>
+                    <a:lstStyle/>
+                    <a:p>
+                      <a:pPr marL="0" marR="0" lvl="0" indent="0" algn="ctr" defTabSz="914400" rtl="0" eaLnBrk="1" fontAlgn="auto" latinLnBrk="0" hangingPunct="1">
+                        <a:lnSpc>
+                          <a:spcPct val="100000"/>
+                        </a:lnSpc>
+                        <a:spcBef>
+                          <a:spcPts val="0"/>
+                        </a:spcBef>
+                        <a:spcAft>
+                          <a:spcPts val="0"/>
+                        </a:spcAft>
+                        <a:buClrTx/>
+                        <a:buSzTx/>
+                        <a:buFontTx/>
+                        <a:buNone/>
+                        <a:tabLst/>
+                        <a:defRPr/>
+                      </a:pPr>
+                      <a:r>
+                        <a:rPr lang="en-CA" b="0" dirty="0">
+                          <a:effectLst/>
+                        </a:rPr>
+                        <a:t>0.704</a:t>
+                      </a:r>
+                      <a:endParaRPr lang="en-US" dirty="0"/>
+                    </a:p>
+                  </a:txBody>
+                  <a:tcPr/>
+                </a:tc>
+                <a:tc>
+                  <a:txBody>
+                    <a:bodyPr/>
+                    <a:lstStyle/>
+                    <a:p>
+                      <a:pPr algn="ctr"/>
+                      <a:endParaRPr lang="en-US" dirty="0"/>
+                    </a:p>
+                  </a:txBody>
+                  <a:tcPr/>
+                </a:tc>
+                <a:tc>
+                  <a:txBody>
+                    <a:bodyPr/>
+                    <a:lstStyle/>
+                    <a:p>
+                      <a:pPr marL="0" indent="0" algn="ctr">
+                        <a:lnSpc>
+                          <a:spcPct val="100000"/>
+                        </a:lnSpc>
+                        <a:buNone/>
+                      </a:pPr>
+                      <a:endParaRPr lang="en-US" dirty="0"/>
+                    </a:p>
+                  </a:txBody>
+                  <a:tcPr/>
+                </a:tc>
+                <a:tc>
+                  <a:txBody>
+                    <a:bodyPr/>
+                    <a:lstStyle/>
+                    <a:p>
+                      <a:pPr marL="0" indent="0" algn="ctr">
+                        <a:lnSpc>
+                          <a:spcPct val="100000"/>
+                        </a:lnSpc>
+                        <a:buNone/>
+                      </a:pPr>
+                      <a:r>
+                        <a:rPr lang="en-CA" b="0" dirty="0">
+                          <a:effectLst/>
+                        </a:rPr>
+                        <a:t>0.669</a:t>
+                      </a:r>
+                      <a:endParaRPr lang="en-US" dirty="0"/>
+                    </a:p>
+                  </a:txBody>
+                  <a:tcPr/>
+                </a:tc>
+                <a:tc>
+                  <a:txBody>
+                    <a:bodyPr/>
+                    <a:lstStyle/>
+                    <a:p>
+                      <a:pPr algn="ctr"/>
+                      <a:endParaRPr lang="en-US" dirty="0"/>
+                    </a:p>
+                  </a:txBody>
+                  <a:tcPr/>
+                </a:tc>
+                <a:tc>
+                  <a:txBody>
+                    <a:bodyPr/>
+                    <a:lstStyle/>
+                    <a:p>
+                      <a:pPr algn="ctr"/>
+                      <a:endParaRPr lang="en-US" dirty="0"/>
+                    </a:p>
+                  </a:txBody>
+                  <a:tcPr/>
+                </a:tc>
+                <a:extLst>
+                  <a:ext uri="{0D108BD9-81ED-4DB2-BD59-A6C34878D82A}">
+                    <a16:rowId xmlns:a16="http://schemas.microsoft.com/office/drawing/2014/main" val="3673812393"/>
+                  </a:ext>
+                </a:extLst>
+              </a:tr>
+              <a:tr h="1036599">
+                <a:tc>
+                  <a:txBody>
+                    <a:bodyPr/>
+                    <a:lstStyle/>
+                    <a:p>
+                      <a:pPr algn="ctr">
+                        <a:lnSpc>
+                          <a:spcPct val="100000"/>
+                        </a:lnSpc>
+                      </a:pPr>
+                      <a:r>
+                        <a:rPr lang="en-US" dirty="0"/>
+                        <a:t>Recall</a:t>
+                      </a:r>
+                    </a:p>
+                  </a:txBody>
+                  <a:tcPr/>
+                </a:tc>
+                <a:tc>
+                  <a:txBody>
+                    <a:bodyPr/>
+                    <a:lstStyle/>
+                    <a:p>
+                      <a:pPr marL="0" marR="0" lvl="0" indent="0" algn="ctr" defTabSz="914400" rtl="0" eaLnBrk="1" fontAlgn="auto" latinLnBrk="0" hangingPunct="1">
+                        <a:lnSpc>
+                          <a:spcPct val="100000"/>
+                        </a:lnSpc>
+                        <a:spcBef>
+                          <a:spcPts val="0"/>
+                        </a:spcBef>
+                        <a:spcAft>
+                          <a:spcPts val="0"/>
+                        </a:spcAft>
+                        <a:buClrTx/>
+                        <a:buSzTx/>
+                        <a:buFontTx/>
+                        <a:buNone/>
+                        <a:tabLst/>
+                        <a:defRPr/>
+                      </a:pPr>
+                      <a:r>
+                        <a:rPr lang="en-CA" b="0" dirty="0">
+                          <a:effectLst/>
+                        </a:rPr>
+                        <a:t>0.910</a:t>
+                      </a:r>
+                      <a:endParaRPr lang="en-US" dirty="0"/>
+                    </a:p>
+                  </a:txBody>
+                  <a:tcPr/>
+                </a:tc>
+                <a:tc>
+                  <a:txBody>
+                    <a:bodyPr/>
+                    <a:lstStyle/>
+                    <a:p>
+                      <a:pPr algn="ctr"/>
+                      <a:endParaRPr lang="en-US" dirty="0"/>
+                    </a:p>
+                  </a:txBody>
+                  <a:tcPr/>
+                </a:tc>
+                <a:tc>
+                  <a:txBody>
+                    <a:bodyPr/>
+                    <a:lstStyle/>
+                    <a:p>
+                      <a:pPr marL="0" indent="0" algn="ctr">
+                        <a:lnSpc>
+                          <a:spcPct val="100000"/>
+                        </a:lnSpc>
+                        <a:buNone/>
+                      </a:pPr>
+                      <a:endParaRPr lang="en-CA" b="0" i="0" dirty="0">
+                        <a:effectLst/>
+                      </a:endParaRPr>
+                    </a:p>
+                  </a:txBody>
+                  <a:tcPr/>
+                </a:tc>
+                <a:tc>
+                  <a:txBody>
+                    <a:bodyPr/>
+                    <a:lstStyle/>
+                    <a:p>
+                      <a:pPr marL="0" indent="0" algn="ctr">
+                        <a:lnSpc>
+                          <a:spcPct val="100000"/>
+                        </a:lnSpc>
+                        <a:buNone/>
+                      </a:pPr>
+                      <a:r>
+                        <a:rPr lang="en-CA" b="0" dirty="0">
+                          <a:effectLst/>
+                        </a:rPr>
+                        <a:t>0.887</a:t>
+                      </a:r>
+                      <a:endParaRPr lang="en-CA" b="0" i="0" dirty="0">
+                        <a:effectLst/>
+                      </a:endParaRPr>
+                    </a:p>
+                  </a:txBody>
+                  <a:tcPr/>
+                </a:tc>
+                <a:tc>
+                  <a:txBody>
+                    <a:bodyPr/>
+                    <a:lstStyle/>
+                    <a:p>
+                      <a:pPr algn="ctr"/>
+                      <a:endParaRPr lang="en-US" dirty="0"/>
+                    </a:p>
+                  </a:txBody>
+                  <a:tcPr/>
+                </a:tc>
+                <a:tc>
+                  <a:txBody>
+                    <a:bodyPr/>
+                    <a:lstStyle/>
+                    <a:p>
+                      <a:pPr algn="ctr"/>
+                      <a:endParaRPr lang="en-US" dirty="0"/>
+                    </a:p>
+                  </a:txBody>
+                  <a:tcPr/>
+                </a:tc>
+                <a:extLst>
+                  <a:ext uri="{0D108BD9-81ED-4DB2-BD59-A6C34878D82A}">
+                    <a16:rowId xmlns:a16="http://schemas.microsoft.com/office/drawing/2014/main" val="1828819681"/>
+                  </a:ext>
+                </a:extLst>
+              </a:tr>
+              <a:tr h="958704">
+                <a:tc>
+                  <a:txBody>
+                    <a:bodyPr/>
+                    <a:lstStyle/>
+                    <a:p>
+                      <a:pPr algn="ctr">
+                        <a:lnSpc>
+                          <a:spcPct val="100000"/>
+                        </a:lnSpc>
+                      </a:pPr>
+                      <a:r>
+                        <a:rPr lang="en-US" dirty="0"/>
+                        <a:t>F1-Score</a:t>
+                      </a:r>
+                    </a:p>
+                  </a:txBody>
+                  <a:tcPr/>
+                </a:tc>
+                <a:tc>
+                  <a:txBody>
+                    <a:bodyPr/>
+                    <a:lstStyle/>
+                    <a:p>
+                      <a:pPr marL="0" marR="0" lvl="0" indent="0" algn="ctr" defTabSz="914400" rtl="0" eaLnBrk="1" fontAlgn="auto" latinLnBrk="0" hangingPunct="1">
+                        <a:lnSpc>
+                          <a:spcPct val="100000"/>
+                        </a:lnSpc>
+                        <a:spcBef>
+                          <a:spcPts val="0"/>
+                        </a:spcBef>
+                        <a:spcAft>
+                          <a:spcPts val="0"/>
+                        </a:spcAft>
+                        <a:buClrTx/>
+                        <a:buSzTx/>
+                        <a:buFontTx/>
+                        <a:buNone/>
+                        <a:tabLst/>
+                        <a:defRPr/>
+                      </a:pPr>
+                      <a:r>
+                        <a:rPr lang="en-CA" b="0" dirty="0">
+                          <a:effectLst/>
+                        </a:rPr>
+                        <a:t>0.794</a:t>
+                      </a:r>
+                      <a:endParaRPr lang="en-US" dirty="0"/>
+                    </a:p>
+                  </a:txBody>
+                  <a:tcPr/>
+                </a:tc>
+                <a:tc>
+                  <a:txBody>
+                    <a:bodyPr/>
+                    <a:lstStyle/>
+                    <a:p>
+                      <a:pPr algn="ctr"/>
+                      <a:r>
+                        <a:rPr lang="en-US" dirty="0"/>
+                        <a:t>0.784</a:t>
+                      </a:r>
+                    </a:p>
+                  </a:txBody>
+                  <a:tcPr/>
+                </a:tc>
+                <a:tc>
+                  <a:txBody>
+                    <a:bodyPr/>
+                    <a:lstStyle/>
+                    <a:p>
+                      <a:pPr marL="0" marR="0" lvl="0" indent="0" algn="ctr" defTabSz="914400" rtl="0" eaLnBrk="1" fontAlgn="auto" latinLnBrk="0" hangingPunct="1">
+                        <a:lnSpc>
+                          <a:spcPct val="100000"/>
+                        </a:lnSpc>
+                        <a:spcBef>
+                          <a:spcPts val="0"/>
+                        </a:spcBef>
+                        <a:spcAft>
+                          <a:spcPts val="0"/>
+                        </a:spcAft>
+                        <a:buClrTx/>
+                        <a:buSzTx/>
+                        <a:buFontTx/>
+                        <a:buNone/>
+                        <a:tabLst/>
+                        <a:defRPr/>
+                      </a:pPr>
+                      <a:endParaRPr lang="en-US" dirty="0"/>
+                    </a:p>
+                  </a:txBody>
+                  <a:tcPr/>
+                </a:tc>
+                <a:tc>
+                  <a:txBody>
+                    <a:bodyPr/>
+                    <a:lstStyle/>
+                    <a:p>
+                      <a:pPr marL="0" marR="0" lvl="0" indent="0" algn="ctr" defTabSz="914400" rtl="0" eaLnBrk="1" fontAlgn="auto" latinLnBrk="0" hangingPunct="1">
+                        <a:lnSpc>
+                          <a:spcPct val="100000"/>
+                        </a:lnSpc>
+                        <a:spcBef>
+                          <a:spcPts val="0"/>
+                        </a:spcBef>
+                        <a:spcAft>
+                          <a:spcPts val="0"/>
+                        </a:spcAft>
+                        <a:buClrTx/>
+                        <a:buSzTx/>
+                        <a:buFontTx/>
+                        <a:buNone/>
+                        <a:tabLst/>
+                        <a:defRPr/>
+                      </a:pPr>
+                      <a:r>
+                        <a:rPr lang="en-CA" b="0" dirty="0">
+                          <a:effectLst/>
+                        </a:rPr>
+                        <a:t> 0.763</a:t>
+                      </a:r>
+                      <a:endParaRPr lang="en-US" dirty="0"/>
+                    </a:p>
+                  </a:txBody>
+                  <a:tcPr/>
+                </a:tc>
+                <a:tc>
+                  <a:txBody>
+                    <a:bodyPr/>
+                    <a:lstStyle/>
+                    <a:p>
+                      <a:pPr algn="ctr"/>
+                      <a:r>
+                        <a:rPr lang="en-US" dirty="0"/>
+                        <a:t>0.773</a:t>
+                      </a:r>
+                    </a:p>
+                  </a:txBody>
+                  <a:tcPr/>
+                </a:tc>
+                <a:tc>
+                  <a:txBody>
+                    <a:bodyPr/>
+                    <a:lstStyle/>
+                    <a:p>
+                      <a:pPr algn="ctr"/>
+                      <a:endParaRPr lang="en-US" dirty="0"/>
+                    </a:p>
+                  </a:txBody>
+                  <a:tcPr/>
+                </a:tc>
+                <a:extLst>
+                  <a:ext uri="{0D108BD9-81ED-4DB2-BD59-A6C34878D82A}">
+                    <a16:rowId xmlns:a16="http://schemas.microsoft.com/office/drawing/2014/main" val="1081092358"/>
+                  </a:ext>
+                </a:extLst>
+              </a:tr>
+            </a:tbl>
+          </a:graphicData>
+        </a:graphic>
+      </p:graphicFrame>
+    </p:spTree>
+    <p:extLst>
+      <p:ext uri="{BB962C8B-B14F-4D97-AF65-F5344CB8AC3E}">
+        <p14:creationId xmlns:p14="http://schemas.microsoft.com/office/powerpoint/2010/main" val="1919104070"/>
       </p:ext>
     </p:extLst>
   </p:cSld>

</xml_diff>

<commit_message>
Add notebook updated with the EDA finished for now;
</commit_message>
<xml_diff>
--- a/Presentation.pptx
+++ b/Presentation.pptx
@@ -12,14 +12,16 @@
     <p:sldId id="262" r:id="rId6"/>
     <p:sldId id="274" r:id="rId7"/>
     <p:sldId id="265" r:id="rId8"/>
-    <p:sldId id="264" r:id="rId9"/>
+    <p:sldId id="263" r:id="rId9"/>
     <p:sldId id="272" r:id="rId10"/>
-    <p:sldId id="263" r:id="rId11"/>
-    <p:sldId id="273" r:id="rId12"/>
-    <p:sldId id="271" r:id="rId13"/>
-    <p:sldId id="267" r:id="rId14"/>
-    <p:sldId id="270" r:id="rId15"/>
-    <p:sldId id="269" r:id="rId16"/>
+    <p:sldId id="275" r:id="rId11"/>
+    <p:sldId id="264" r:id="rId12"/>
+    <p:sldId id="273" r:id="rId13"/>
+    <p:sldId id="271" r:id="rId14"/>
+    <p:sldId id="276" r:id="rId15"/>
+    <p:sldId id="267" r:id="rId16"/>
+    <p:sldId id="270" r:id="rId17"/>
+    <p:sldId id="269" r:id="rId18"/>
   </p:sldIdLst>
   <p:sldSz cx="12192000" cy="6858000"/>
   <p:notesSz cx="6858000" cy="9144000"/>
@@ -130,20 +132,26 @@
             <p14:sldId id="262"/>
             <p14:sldId id="274"/>
             <p14:sldId id="265"/>
+            <p14:sldId id="263"/>
+            <p14:sldId id="272"/>
+            <p14:sldId id="275"/>
             <p14:sldId id="264"/>
-            <p14:sldId id="272"/>
-            <p14:sldId id="263"/>
             <p14:sldId id="273"/>
             <p14:sldId id="271"/>
+          </p14:sldIdLst>
+        </p14:section>
+        <p14:section name="ML Models" id="{C32284C8-BCB6-D64E-99B2-12EB62CDFCF4}">
+          <p14:sldIdLst>
+            <p14:sldId id="276"/>
             <p14:sldId id="267"/>
             <p14:sldId id="270"/>
             <p14:sldId id="269"/>
           </p14:sldIdLst>
         </p14:section>
-        <p14:section name="ML Models" id="{C32284C8-BCB6-D64E-99B2-12EB62CDFCF4}">
-          <p14:sldIdLst/>
-        </p14:section>
       </p14:sectionLst>
+    </p:ext>
+    <p:ext uri="{EFAFB233-063F-42B5-8137-9DF3F51BA10A}">
+      <p15:sldGuideLst xmlns:p15="http://schemas.microsoft.com/office/powerpoint/2012/main"/>
     </p:ext>
   </p:extLst>
 </p:presentation>
@@ -7761,7 +7769,590 @@
           <p:cNvPr id="2" name="Title 1">
             <a:extLst>
               <a:ext uri="{FF2B5EF4-FFF2-40B4-BE49-F238E27FC236}">
-                <a16:creationId xmlns:a16="http://schemas.microsoft.com/office/drawing/2014/main" id="{833D164F-52B3-35AB-FECD-68862BF9FA71}"/>
+                <a16:creationId xmlns:a16="http://schemas.microsoft.com/office/drawing/2014/main" id="{93BC6E54-0F74-1CA3-5E66-C08B1C16BD75}"/>
+              </a:ext>
+            </a:extLst>
+          </p:cNvPr>
+          <p:cNvSpPr>
+            <a:spLocks noGrp="1"/>
+          </p:cNvSpPr>
+          <p:nvPr>
+            <p:ph type="title"/>
+          </p:nvPr>
+        </p:nvSpPr>
+        <p:spPr/>
+        <p:txBody>
+          <a:bodyPr/>
+          <a:lstStyle/>
+          <a:p>
+            <a:r>
+              <a:rPr lang="en-US" dirty="0"/>
+              <a:t>Loan status per group (2)</a:t>
+            </a:r>
+          </a:p>
+        </p:txBody>
+      </p:sp>
+      <p:pic>
+        <p:nvPicPr>
+          <p:cNvPr id="5" name="Content Placeholder 4">
+            <a:extLst>
+              <a:ext uri="{FF2B5EF4-FFF2-40B4-BE49-F238E27FC236}">
+                <a16:creationId xmlns:a16="http://schemas.microsoft.com/office/drawing/2014/main" id="{674783CF-A4A8-37AB-9D9D-03F878284B11}"/>
+              </a:ext>
+            </a:extLst>
+          </p:cNvPr>
+          <p:cNvPicPr>
+            <a:picLocks noGrp="1" noChangeAspect="1"/>
+          </p:cNvPicPr>
+          <p:nvPr>
+            <p:ph idx="1"/>
+          </p:nvPr>
+        </p:nvPicPr>
+        <p:blipFill>
+          <a:blip r:embed="rId2"/>
+          <a:stretch>
+            <a:fillRect/>
+          </a:stretch>
+        </p:blipFill>
+        <p:spPr>
+          <a:xfrm>
+            <a:off x="5651500" y="1268176"/>
+            <a:ext cx="5686425" cy="4312122"/>
+          </a:xfrm>
+          <a:prstGeom prst="rect">
+            <a:avLst/>
+          </a:prstGeom>
+        </p:spPr>
+      </p:pic>
+      <p:sp>
+        <p:nvSpPr>
+          <p:cNvPr id="4" name="Text Placeholder 3">
+            <a:extLst>
+              <a:ext uri="{FF2B5EF4-FFF2-40B4-BE49-F238E27FC236}">
+                <a16:creationId xmlns:a16="http://schemas.microsoft.com/office/drawing/2014/main" id="{868B2F95-23C9-9B8C-2670-9DDF64204FA4}"/>
+              </a:ext>
+            </a:extLst>
+          </p:cNvPr>
+          <p:cNvSpPr>
+            <a:spLocks noGrp="1"/>
+          </p:cNvSpPr>
+          <p:nvPr>
+            <p:ph type="body" sz="half" idx="2"/>
+          </p:nvPr>
+        </p:nvSpPr>
+        <p:spPr/>
+        <p:txBody>
+          <a:bodyPr/>
+          <a:lstStyle/>
+          <a:p>
+            <a:pPr algn="just"/>
+            <a:r>
+              <a:rPr lang="en-CA" dirty="0"/>
+              <a:t>B</a:t>
+            </a:r>
+            <a:r>
+              <a:rPr lang="en-CA" b="0" dirty="0">
+                <a:effectLst/>
+              </a:rPr>
+              <a:t>y living in a semiurban or urban area (values very closer to each other), the applicant/co-applicant is more likely to be approved to receive a loan.</a:t>
+            </a:r>
+          </a:p>
+          <a:p>
+            <a:endParaRPr lang="en-US" dirty="0"/>
+          </a:p>
+        </p:txBody>
+      </p:sp>
+    </p:spTree>
+    <p:extLst>
+      <p:ext uri="{BB962C8B-B14F-4D97-AF65-F5344CB8AC3E}">
+        <p14:creationId xmlns:p14="http://schemas.microsoft.com/office/powerpoint/2010/main" val="158652873"/>
+      </p:ext>
+    </p:extLst>
+  </p:cSld>
+  <p:clrMapOvr>
+    <a:masterClrMapping/>
+  </p:clrMapOvr>
+</p:sld>
+</file>
+
+<file path=ppt/slides/slide11.xml><?xml version="1.0" encoding="utf-8"?>
+<p:sld xmlns:a="http://schemas.openxmlformats.org/drawingml/2006/main" xmlns:r="http://schemas.openxmlformats.org/officeDocument/2006/relationships" xmlns:p="http://schemas.openxmlformats.org/presentationml/2006/main">
+  <p:cSld>
+    <p:bg>
+      <p:bgPr>
+        <a:solidFill>
+          <a:schemeClr val="bg1"/>
+        </a:solidFill>
+        <a:effectLst/>
+      </p:bgPr>
+    </p:bg>
+    <p:spTree>
+      <p:nvGrpSpPr>
+        <p:cNvPr id="1" name=""/>
+        <p:cNvGrpSpPr/>
+        <p:nvPr/>
+      </p:nvGrpSpPr>
+      <p:grpSpPr>
+        <a:xfrm>
+          <a:off x="0" y="0"/>
+          <a:ext cx="0" cy="0"/>
+          <a:chOff x="0" y="0"/>
+          <a:chExt cx="0" cy="0"/>
+        </a:xfrm>
+      </p:grpSpPr>
+      <p:sp>
+        <p:nvSpPr>
+          <p:cNvPr id="25" name="Rectangle 10">
+            <a:extLst>
+              <a:ext uri="{FF2B5EF4-FFF2-40B4-BE49-F238E27FC236}">
+                <a16:creationId xmlns:a16="http://schemas.microsoft.com/office/drawing/2014/main" id="{BD4C0BBB-0042-4603-A226-6117F3FD5B3C}"/>
+              </a:ext>
+              <a:ext uri="{C183D7F6-B498-43B3-948B-1728B52AA6E4}">
+                <adec:decorative xmlns:adec="http://schemas.microsoft.com/office/drawing/2017/decorative" val="1"/>
+              </a:ext>
+            </a:extLst>
+          </p:cNvPr>
+          <p:cNvSpPr>
+            <a:spLocks noGrp="1" noRot="1" noChangeAspect="1" noMove="1" noResize="1" noEditPoints="1" noAdjustHandles="1" noChangeArrowheads="1" noChangeShapeType="1" noTextEdit="1"/>
+          </p:cNvSpPr>
+          <p:nvPr>
+            <p:extLst>
+              <p:ext uri="{386F3935-93C4-4BCD-93E2-E3B085C9AB24}">
+                <p16:designElem xmlns:p16="http://schemas.microsoft.com/office/powerpoint/2015/main" val="1"/>
+              </p:ext>
+            </p:extLst>
+          </p:nvPr>
+        </p:nvSpPr>
+        <p:spPr>
+          <a:xfrm rot="10800000" flipH="1">
+            <a:off x="0" y="6400799"/>
+            <a:ext cx="12192000" cy="456773"/>
+          </a:xfrm>
+          <a:prstGeom prst="rect">
+            <a:avLst/>
+          </a:prstGeom>
+          <a:gradFill>
+            <a:gsLst>
+              <a:gs pos="14000">
+                <a:schemeClr val="accent4">
+                  <a:alpha val="28000"/>
+                </a:schemeClr>
+              </a:gs>
+              <a:gs pos="100000">
+                <a:schemeClr val="accent5">
+                  <a:alpha val="85000"/>
+                </a:schemeClr>
+              </a:gs>
+            </a:gsLst>
+            <a:lin ang="6000000" scaled="0"/>
+          </a:gradFill>
+          <a:ln>
+            <a:noFill/>
+          </a:ln>
+        </p:spPr>
+        <p:style>
+          <a:lnRef idx="2">
+            <a:schemeClr val="accent1">
+              <a:shade val="50000"/>
+            </a:schemeClr>
+          </a:lnRef>
+          <a:fillRef idx="1">
+            <a:schemeClr val="accent1"/>
+          </a:fillRef>
+          <a:effectRef idx="0">
+            <a:schemeClr val="accent1"/>
+          </a:effectRef>
+          <a:fontRef idx="minor">
+            <a:schemeClr val="lt1"/>
+          </a:fontRef>
+        </p:style>
+        <p:txBody>
+          <a:bodyPr rtlCol="0" anchor="ctr"/>
+          <a:lstStyle/>
+          <a:p>
+            <a:pPr algn="ctr"/>
+            <a:endParaRPr lang="en-US"/>
+          </a:p>
+        </p:txBody>
+      </p:sp>
+      <p:sp>
+        <p:nvSpPr>
+          <p:cNvPr id="26" name="Rectangle 12">
+            <a:extLst>
+              <a:ext uri="{FF2B5EF4-FFF2-40B4-BE49-F238E27FC236}">
+                <a16:creationId xmlns:a16="http://schemas.microsoft.com/office/drawing/2014/main" id="{EC44F520-2598-460E-9F91-B02F60830CA2}"/>
+              </a:ext>
+              <a:ext uri="{C183D7F6-B498-43B3-948B-1728B52AA6E4}">
+                <adec:decorative xmlns:adec="http://schemas.microsoft.com/office/drawing/2017/decorative" val="1"/>
+              </a:ext>
+            </a:extLst>
+          </p:cNvPr>
+          <p:cNvSpPr>
+            <a:spLocks noGrp="1" noRot="1" noChangeAspect="1" noMove="1" noResize="1" noEditPoints="1" noAdjustHandles="1" noChangeArrowheads="1" noChangeShapeType="1" noTextEdit="1"/>
+          </p:cNvSpPr>
+          <p:nvPr>
+            <p:extLst>
+              <p:ext uri="{386F3935-93C4-4BCD-93E2-E3B085C9AB24}">
+                <p16:designElem xmlns:p16="http://schemas.microsoft.com/office/powerpoint/2015/main" val="1"/>
+              </p:ext>
+            </p:extLst>
+          </p:nvPr>
+        </p:nvSpPr>
+        <p:spPr>
+          <a:xfrm flipH="1">
+            <a:off x="4038600" y="6400799"/>
+            <a:ext cx="8153398" cy="456772"/>
+          </a:xfrm>
+          <a:prstGeom prst="rect">
+            <a:avLst/>
+          </a:prstGeom>
+          <a:gradFill>
+            <a:gsLst>
+              <a:gs pos="9000">
+                <a:schemeClr val="accent2">
+                  <a:lumMod val="60000"/>
+                  <a:lumOff val="40000"/>
+                  <a:alpha val="55000"/>
+                </a:schemeClr>
+              </a:gs>
+              <a:gs pos="99000">
+                <a:schemeClr val="accent2"/>
+              </a:gs>
+            </a:gsLst>
+            <a:lin ang="14400000" scaled="0"/>
+          </a:gradFill>
+          <a:ln>
+            <a:noFill/>
+          </a:ln>
+        </p:spPr>
+        <p:style>
+          <a:lnRef idx="2">
+            <a:schemeClr val="accent1">
+              <a:shade val="50000"/>
+            </a:schemeClr>
+          </a:lnRef>
+          <a:fillRef idx="1">
+            <a:schemeClr val="accent1"/>
+          </a:fillRef>
+          <a:effectRef idx="0">
+            <a:schemeClr val="accent1"/>
+          </a:effectRef>
+          <a:fontRef idx="minor">
+            <a:schemeClr val="lt1"/>
+          </a:fontRef>
+        </p:style>
+        <p:txBody>
+          <a:bodyPr rtlCol="0" anchor="ctr"/>
+          <a:lstStyle/>
+          <a:p>
+            <a:pPr algn="ctr"/>
+            <a:endParaRPr lang="en-US"/>
+          </a:p>
+        </p:txBody>
+      </p:sp>
+      <p:sp useBgFill="1">
+        <p:nvSpPr>
+          <p:cNvPr id="27" name="Rectangle 14">
+            <a:extLst>
+              <a:ext uri="{FF2B5EF4-FFF2-40B4-BE49-F238E27FC236}">
+                <a16:creationId xmlns:a16="http://schemas.microsoft.com/office/drawing/2014/main" id="{315596D0-7A93-45AB-A289-2A2B141E0BBF}"/>
+              </a:ext>
+              <a:ext uri="{C183D7F6-B498-43B3-948B-1728B52AA6E4}">
+                <adec:decorative xmlns:adec="http://schemas.microsoft.com/office/drawing/2017/decorative" val="1"/>
+              </a:ext>
+            </a:extLst>
+          </p:cNvPr>
+          <p:cNvSpPr>
+            <a:spLocks noGrp="1" noRot="1" noChangeAspect="1" noMove="1" noResize="1" noEditPoints="1" noAdjustHandles="1" noChangeArrowheads="1" noChangeShapeType="1" noTextEdit="1"/>
+          </p:cNvSpPr>
+          <p:nvPr>
+            <p:extLst>
+              <p:ext uri="{386F3935-93C4-4BCD-93E2-E3B085C9AB24}">
+                <p16:designElem xmlns:p16="http://schemas.microsoft.com/office/powerpoint/2015/main" val="1"/>
+              </p:ext>
+            </p:extLst>
+          </p:nvPr>
+        </p:nvSpPr>
+        <p:spPr>
+          <a:xfrm>
+            <a:off x="0" y="0"/>
+            <a:ext cx="12192000" cy="6858000"/>
+          </a:xfrm>
+          <a:prstGeom prst="rect">
+            <a:avLst/>
+          </a:prstGeom>
+          <a:ln w="12700" cap="flat" cmpd="sng" algn="ctr">
+            <a:noFill/>
+            <a:prstDash val="solid"/>
+            <a:miter lim="800000"/>
+          </a:ln>
+          <a:effectLst/>
+          <a:extLst>
+            <a:ext uri="{91240B29-F687-4F45-9708-019B960494DF}">
+              <a14:hiddenLine xmlns:a14="http://schemas.microsoft.com/office/drawing/2010/main" w="12700" cap="flat" cmpd="sng" algn="ctr">
+                <a:solidFill>
+                  <a:schemeClr val="accent1">
+                    <a:shade val="50000"/>
+                  </a:schemeClr>
+                </a:solidFill>
+                <a:prstDash val="solid"/>
+                <a:miter lim="800000"/>
+              </a14:hiddenLine>
+            </a:ext>
+          </a:extLst>
+        </p:spPr>
+        <p:style>
+          <a:lnRef idx="2">
+            <a:schemeClr val="accent1">
+              <a:shade val="50000"/>
+            </a:schemeClr>
+          </a:lnRef>
+          <a:fillRef idx="1">
+            <a:schemeClr val="accent1"/>
+          </a:fillRef>
+          <a:effectRef idx="0">
+            <a:schemeClr val="accent1"/>
+          </a:effectRef>
+          <a:fontRef idx="minor">
+            <a:schemeClr val="lt1"/>
+          </a:fontRef>
+        </p:style>
+        <p:txBody>
+          <a:bodyPr rtlCol="0" anchor="ctr"/>
+          <a:lstStyle/>
+          <a:p>
+            <a:pPr algn="ctr"/>
+            <a:endParaRPr lang="en-US"/>
+          </a:p>
+        </p:txBody>
+      </p:sp>
+      <p:sp>
+        <p:nvSpPr>
+          <p:cNvPr id="28" name="Rectangle 16">
+            <a:extLst>
+              <a:ext uri="{FF2B5EF4-FFF2-40B4-BE49-F238E27FC236}">
+                <a16:creationId xmlns:a16="http://schemas.microsoft.com/office/drawing/2014/main" id="{A90F64BE-B6DF-4D20-9A3E-DAD003896C0E}"/>
+              </a:ext>
+              <a:ext uri="{C183D7F6-B498-43B3-948B-1728B52AA6E4}">
+                <adec:decorative xmlns:adec="http://schemas.microsoft.com/office/drawing/2017/decorative" val="1"/>
+              </a:ext>
+            </a:extLst>
+          </p:cNvPr>
+          <p:cNvSpPr>
+            <a:spLocks noGrp="1" noRot="1" noChangeAspect="1" noMove="1" noResize="1" noEditPoints="1" noAdjustHandles="1" noChangeArrowheads="1" noChangeShapeType="1" noTextEdit="1"/>
+          </p:cNvSpPr>
+          <p:nvPr>
+            <p:extLst>
+              <p:ext uri="{386F3935-93C4-4BCD-93E2-E3B085C9AB24}">
+                <p16:designElem xmlns:p16="http://schemas.microsoft.com/office/powerpoint/2015/main" val="1"/>
+              </p:ext>
+            </p:extLst>
+          </p:nvPr>
+        </p:nvSpPr>
+        <p:spPr>
+          <a:xfrm>
+            <a:off x="-1" y="-8890"/>
+            <a:ext cx="4038601" cy="6866462"/>
+          </a:xfrm>
+          <a:prstGeom prst="rect">
+            <a:avLst/>
+          </a:prstGeom>
+          <a:gradFill>
+            <a:gsLst>
+              <a:gs pos="0">
+                <a:schemeClr val="accent5"/>
+              </a:gs>
+              <a:gs pos="100000">
+                <a:schemeClr val="accent4">
+                  <a:alpha val="55000"/>
+                </a:schemeClr>
+              </a:gs>
+            </a:gsLst>
+            <a:lin ang="18000000" scaled="0"/>
+          </a:gradFill>
+          <a:ln>
+            <a:noFill/>
+          </a:ln>
+        </p:spPr>
+        <p:style>
+          <a:lnRef idx="2">
+            <a:schemeClr val="accent1">
+              <a:shade val="50000"/>
+            </a:schemeClr>
+          </a:lnRef>
+          <a:fillRef idx="1">
+            <a:schemeClr val="accent1"/>
+          </a:fillRef>
+          <a:effectRef idx="0">
+            <a:schemeClr val="accent1"/>
+          </a:effectRef>
+          <a:fontRef idx="minor">
+            <a:schemeClr val="lt1"/>
+          </a:fontRef>
+        </p:style>
+        <p:txBody>
+          <a:bodyPr rtlCol="0" anchor="ctr"/>
+          <a:lstStyle/>
+          <a:p>
+            <a:pPr algn="ctr"/>
+            <a:endParaRPr lang="en-US"/>
+          </a:p>
+        </p:txBody>
+      </p:sp>
+      <p:sp>
+        <p:nvSpPr>
+          <p:cNvPr id="29" name="Rectangle 18">
+            <a:extLst>
+              <a:ext uri="{FF2B5EF4-FFF2-40B4-BE49-F238E27FC236}">
+                <a16:creationId xmlns:a16="http://schemas.microsoft.com/office/drawing/2014/main" id="{3299ACA5-1949-4821-8FA4-95A78A2097AE}"/>
+              </a:ext>
+              <a:ext uri="{C183D7F6-B498-43B3-948B-1728B52AA6E4}">
+                <adec:decorative xmlns:adec="http://schemas.microsoft.com/office/drawing/2017/decorative" val="1"/>
+              </a:ext>
+            </a:extLst>
+          </p:cNvPr>
+          <p:cNvSpPr>
+            <a:spLocks noGrp="1" noRot="1" noChangeAspect="1" noMove="1" noResize="1" noEditPoints="1" noAdjustHandles="1" noChangeArrowheads="1" noChangeShapeType="1" noTextEdit="1"/>
+          </p:cNvSpPr>
+          <p:nvPr>
+            <p:extLst>
+              <p:ext uri="{386F3935-93C4-4BCD-93E2-E3B085C9AB24}">
+                <p16:designElem xmlns:p16="http://schemas.microsoft.com/office/powerpoint/2015/main" val="1"/>
+              </p:ext>
+            </p:extLst>
+          </p:nvPr>
+        </p:nvSpPr>
+        <p:spPr>
+          <a:xfrm rot="16200000" flipH="1">
+            <a:off x="-1185328" y="1633640"/>
+            <a:ext cx="6866462" cy="3581401"/>
+          </a:xfrm>
+          <a:prstGeom prst="rect">
+            <a:avLst/>
+          </a:prstGeom>
+          <a:gradFill>
+            <a:gsLst>
+              <a:gs pos="0">
+                <a:schemeClr val="accent2"/>
+              </a:gs>
+              <a:gs pos="100000">
+                <a:schemeClr val="accent5">
+                  <a:alpha val="13000"/>
+                </a:schemeClr>
+              </a:gs>
+            </a:gsLst>
+            <a:lin ang="13800000" scaled="0"/>
+          </a:gradFill>
+          <a:ln>
+            <a:noFill/>
+          </a:ln>
+        </p:spPr>
+        <p:style>
+          <a:lnRef idx="2">
+            <a:schemeClr val="accent1">
+              <a:shade val="50000"/>
+            </a:schemeClr>
+          </a:lnRef>
+          <a:fillRef idx="1">
+            <a:schemeClr val="accent1"/>
+          </a:fillRef>
+          <a:effectRef idx="0">
+            <a:schemeClr val="accent1"/>
+          </a:effectRef>
+          <a:fontRef idx="minor">
+            <a:schemeClr val="lt1"/>
+          </a:fontRef>
+        </p:style>
+        <p:txBody>
+          <a:bodyPr rtlCol="0" anchor="ctr"/>
+          <a:lstStyle/>
+          <a:p>
+            <a:pPr algn="ctr"/>
+            <a:endParaRPr lang="en-US" dirty="0"/>
+          </a:p>
+        </p:txBody>
+      </p:sp>
+      <p:sp>
+        <p:nvSpPr>
+          <p:cNvPr id="30" name="Rectangle 20">
+            <a:extLst>
+              <a:ext uri="{FF2B5EF4-FFF2-40B4-BE49-F238E27FC236}">
+                <a16:creationId xmlns:a16="http://schemas.microsoft.com/office/drawing/2014/main" id="{85559C2F-075A-49B7-8935-4591245136E5}"/>
+              </a:ext>
+              <a:ext uri="{C183D7F6-B498-43B3-948B-1728B52AA6E4}">
+                <adec:decorative xmlns:adec="http://schemas.microsoft.com/office/drawing/2017/decorative" val="1"/>
+              </a:ext>
+            </a:extLst>
+          </p:cNvPr>
+          <p:cNvSpPr>
+            <a:spLocks noGrp="1" noRot="1" noChangeAspect="1" noMove="1" noResize="1" noEditPoints="1" noAdjustHandles="1" noChangeArrowheads="1" noChangeShapeType="1" noTextEdit="1"/>
+          </p:cNvSpPr>
+          <p:nvPr>
+            <p:extLst>
+              <p:ext uri="{386F3935-93C4-4BCD-93E2-E3B085C9AB24}">
+                <p16:designElem xmlns:p16="http://schemas.microsoft.com/office/powerpoint/2015/main" val="1"/>
+              </p:ext>
+            </p:extLst>
+          </p:nvPr>
+        </p:nvSpPr>
+        <p:spPr>
+          <a:xfrm>
+            <a:off x="0" y="2232044"/>
+            <a:ext cx="4038600" cy="4634418"/>
+          </a:xfrm>
+          <a:prstGeom prst="rect">
+            <a:avLst/>
+          </a:prstGeom>
+          <a:gradFill>
+            <a:gsLst>
+              <a:gs pos="0">
+                <a:schemeClr val="accent5">
+                  <a:alpha val="36000"/>
+                </a:schemeClr>
+              </a:gs>
+              <a:gs pos="67000">
+                <a:schemeClr val="accent5">
+                  <a:alpha val="0"/>
+                </a:schemeClr>
+              </a:gs>
+            </a:gsLst>
+            <a:lin ang="2400000" scaled="0"/>
+          </a:gradFill>
+          <a:ln>
+            <a:noFill/>
+          </a:ln>
+        </p:spPr>
+        <p:style>
+          <a:lnRef idx="2">
+            <a:schemeClr val="accent1">
+              <a:shade val="50000"/>
+            </a:schemeClr>
+          </a:lnRef>
+          <a:fillRef idx="1">
+            <a:schemeClr val="accent1"/>
+          </a:fillRef>
+          <a:effectRef idx="0">
+            <a:schemeClr val="accent1"/>
+          </a:effectRef>
+          <a:fontRef idx="minor">
+            <a:schemeClr val="lt1"/>
+          </a:fontRef>
+        </p:style>
+        <p:txBody>
+          <a:bodyPr rtlCol="0" anchor="ctr"/>
+          <a:lstStyle/>
+          <a:p>
+            <a:pPr algn="ctr"/>
+            <a:endParaRPr lang="en-US" dirty="0"/>
+          </a:p>
+        </p:txBody>
+      </p:sp>
+      <p:sp>
+        <p:nvSpPr>
+          <p:cNvPr id="2" name="Title 1">
+            <a:extLst>
+              <a:ext uri="{FF2B5EF4-FFF2-40B4-BE49-F238E27FC236}">
+                <a16:creationId xmlns:a16="http://schemas.microsoft.com/office/drawing/2014/main" id="{609F77FC-504E-9CE2-B050-D6788F462AC0}"/>
               </a:ext>
             </a:extLst>
           </p:cNvPr>
@@ -7774,29 +8365,68 @@
         </p:nvSpPr>
         <p:spPr>
           <a:xfrm>
-            <a:off x="1048297" y="998999"/>
-            <a:ext cx="3932237" cy="1894511"/>
+            <a:off x="347241" y="2463419"/>
+            <a:ext cx="3331624" cy="3936952"/>
           </a:xfrm>
         </p:spPr>
         <p:txBody>
-          <a:bodyPr>
+          <a:bodyPr vert="horz" lIns="0" tIns="0" rIns="0" bIns="0" rtlCol="0" anchor="t">
             <a:normAutofit/>
           </a:bodyPr>
           <a:lstStyle/>
           <a:p>
+            <a:pPr algn="ctr"/>
             <a:r>
-              <a:rPr lang="en-US" dirty="0"/>
-              <a:t>Average loan amount</a:t>
+              <a:rPr lang="en-US" sz="3200" spc="750" dirty="0">
+                <a:solidFill>
+                  <a:schemeClr val="bg1"/>
+                </a:solidFill>
+              </a:rPr>
+              <a:t>Income by education</a:t>
             </a:r>
+            <a:br>
+              <a:rPr lang="en-US" sz="3200" spc="750" dirty="0">
+                <a:solidFill>
+                  <a:schemeClr val="bg1"/>
+                </a:solidFill>
+              </a:rPr>
+            </a:br>
+            <a:br>
+              <a:rPr lang="en-US" sz="3200" spc="750" dirty="0">
+                <a:solidFill>
+                  <a:schemeClr val="bg1"/>
+                </a:solidFill>
+              </a:rPr>
+            </a:br>
+            <a:r>
+              <a:rPr lang="en-US" sz="1600" b="0" spc="750" dirty="0">
+                <a:solidFill>
+                  <a:schemeClr val="bg1"/>
+                </a:solidFill>
+              </a:rPr>
+              <a:t>group of applicants and co-applicants who have High income are also graduated.</a:t>
+            </a:r>
+            <a:br>
+              <a:rPr lang="en-US" sz="1600" b="0" i="1" spc="750" dirty="0">
+                <a:solidFill>
+                  <a:schemeClr val="bg1"/>
+                </a:solidFill>
+              </a:rPr>
+            </a:br>
+            <a:endParaRPr lang="en-US" sz="1600" b="0" i="1" spc="750" dirty="0">
+              <a:solidFill>
+                <a:schemeClr val="bg1"/>
+              </a:solidFill>
+            </a:endParaRPr>
           </a:p>
         </p:txBody>
       </p:sp>
       <p:pic>
         <p:nvPicPr>
-          <p:cNvPr id="5" name="Picture 4">
-            <a:extLst>
-              <a:ext uri="{FF2B5EF4-FFF2-40B4-BE49-F238E27FC236}">
-                <a16:creationId xmlns:a16="http://schemas.microsoft.com/office/drawing/2014/main" id="{98D3FF54-1812-2584-5F7A-162D98309124}"/>
+          <p:cNvPr id="5" name="Picture 4" descr="Chart, radar chart&#10;&#10;Description automatically generated">
+            <a:extLst>
+              <a:ext uri="{FF2B5EF4-FFF2-40B4-BE49-F238E27FC236}">
+                <a16:creationId xmlns:a16="http://schemas.microsoft.com/office/drawing/2014/main" id="{FFC856EC-1C64-C767-974A-B53557FB7A87}"/>
               </a:ext>
             </a:extLst>
           </p:cNvPr>
@@ -7813,61 +8443,48 @@
         </p:blipFill>
         <p:spPr>
           <a:xfrm>
-            <a:off x="5303837" y="1109441"/>
-            <a:ext cx="6203346" cy="4639117"/>
+            <a:off x="4788090" y="1761402"/>
+            <a:ext cx="3147409" cy="3339426"/>
           </a:xfrm>
           <a:prstGeom prst="rect">
             <a:avLst/>
           </a:prstGeom>
         </p:spPr>
       </p:pic>
-      <p:sp>
-        <p:nvSpPr>
-          <p:cNvPr id="7" name="TextBox 6">
-            <a:extLst>
-              <a:ext uri="{FF2B5EF4-FFF2-40B4-BE49-F238E27FC236}">
-                <a16:creationId xmlns:a16="http://schemas.microsoft.com/office/drawing/2014/main" id="{70E97BB2-6796-5426-152B-9D160E266F1C}"/>
-              </a:ext>
-            </a:extLst>
-          </p:cNvPr>
-          <p:cNvSpPr txBox="1"/>
+      <p:pic>
+        <p:nvPicPr>
+          <p:cNvPr id="6" name="Picture 5" descr="Diagram&#10;&#10;Description automatically generated">
+            <a:extLst>
+              <a:ext uri="{FF2B5EF4-FFF2-40B4-BE49-F238E27FC236}">
+                <a16:creationId xmlns:a16="http://schemas.microsoft.com/office/drawing/2014/main" id="{10DB4394-703E-C7F9-B741-61B0A6B09DDA}"/>
+              </a:ext>
+            </a:extLst>
+          </p:cNvPr>
+          <p:cNvPicPr>
+            <a:picLocks noChangeAspect="1"/>
+          </p:cNvPicPr>
           <p:nvPr/>
-        </p:nvSpPr>
+        </p:nvPicPr>
+        <p:blipFill>
+          <a:blip r:embed="rId3"/>
+          <a:stretch>
+            <a:fillRect/>
+          </a:stretch>
+        </p:blipFill>
         <p:spPr>
           <a:xfrm>
-            <a:off x="1048297" y="3428999"/>
-            <a:ext cx="3809649" cy="1323439"/>
+            <a:off x="8260974" y="1778371"/>
+            <a:ext cx="3181533" cy="3305488"/>
           </a:xfrm>
           <a:prstGeom prst="rect">
             <a:avLst/>
           </a:prstGeom>
-          <a:noFill/>
         </p:spPr>
-        <p:txBody>
-          <a:bodyPr wrap="square">
-            <a:spAutoFit/>
-          </a:bodyPr>
-          <a:lstStyle/>
-          <a:p>
-            <a:r>
-              <a:rPr lang="en-US" sz="2000" dirty="0"/>
-              <a:t>In regards of the </a:t>
-            </a:r>
-            <a:r>
-              <a:rPr lang="en-US" sz="2000" b="1" dirty="0"/>
-              <a:t>loan amount approval</a:t>
-            </a:r>
-            <a:r>
-              <a:rPr lang="en-US" sz="2000" dirty="0"/>
-              <a:t>, we have the same demographics, so we have basically a tie between female and male.</a:t>
-            </a:r>
-          </a:p>
-        </p:txBody>
-      </p:sp>
+      </p:pic>
     </p:spTree>
     <p:extLst>
       <p:ext uri="{BB962C8B-B14F-4D97-AF65-F5344CB8AC3E}">
-        <p14:creationId xmlns:p14="http://schemas.microsoft.com/office/powerpoint/2010/main" val="3612393829"/>
+        <p14:creationId xmlns:p14="http://schemas.microsoft.com/office/powerpoint/2010/main" val="809840982"/>
       </p:ext>
     </p:extLst>
   </p:cSld>
@@ -7877,7 +8494,7 @@
 </p:sld>
 </file>
 
-<file path=ppt/slides/slide11.xml><?xml version="1.0" encoding="utf-8"?>
+<file path=ppt/slides/slide12.xml><?xml version="1.0" encoding="utf-8"?>
 <p:sld xmlns:a="http://schemas.openxmlformats.org/drawingml/2006/main" xmlns:r="http://schemas.openxmlformats.org/officeDocument/2006/relationships" xmlns:p="http://schemas.openxmlformats.org/presentationml/2006/main">
   <p:cSld>
     <p:spTree>
@@ -7992,7 +8609,7 @@
 </p:sld>
 </file>
 
-<file path=ppt/slides/slide12.xml><?xml version="1.0" encoding="utf-8"?>
+<file path=ppt/slides/slide13.xml><?xml version="1.0" encoding="utf-8"?>
 <p:sld xmlns:a="http://schemas.openxmlformats.org/drawingml/2006/main" xmlns:r="http://schemas.openxmlformats.org/officeDocument/2006/relationships" xmlns:p="http://schemas.openxmlformats.org/presentationml/2006/main">
   <p:cSld>
     <p:spTree>
@@ -8114,7 +8731,716 @@
 </p:sld>
 </file>
 
-<file path=ppt/slides/slide13.xml><?xml version="1.0" encoding="utf-8"?>
+<file path=ppt/slides/slide14.xml><?xml version="1.0" encoding="utf-8"?>
+<p:sld xmlns:a="http://schemas.openxmlformats.org/drawingml/2006/main" xmlns:r="http://schemas.openxmlformats.org/officeDocument/2006/relationships" xmlns:p="http://schemas.openxmlformats.org/presentationml/2006/main">
+  <p:cSld>
+    <p:bg>
+      <p:bgPr>
+        <a:solidFill>
+          <a:schemeClr val="bg1"/>
+        </a:solidFill>
+        <a:effectLst/>
+      </p:bgPr>
+    </p:bg>
+    <p:spTree>
+      <p:nvGrpSpPr>
+        <p:cNvPr id="1" name=""/>
+        <p:cNvGrpSpPr/>
+        <p:nvPr/>
+      </p:nvGrpSpPr>
+      <p:grpSpPr>
+        <a:xfrm>
+          <a:off x="0" y="0"/>
+          <a:ext cx="0" cy="0"/>
+          <a:chOff x="0" y="0"/>
+          <a:chExt cx="0" cy="0"/>
+        </a:xfrm>
+      </p:grpSpPr>
+      <p:sp>
+        <p:nvSpPr>
+          <p:cNvPr id="13" name="Rectangle 12">
+            <a:extLst>
+              <a:ext uri="{FF2B5EF4-FFF2-40B4-BE49-F238E27FC236}">
+                <a16:creationId xmlns:a16="http://schemas.microsoft.com/office/drawing/2014/main" id="{BD4C0BBB-0042-4603-A226-6117F3FD5B3C}"/>
+              </a:ext>
+              <a:ext uri="{C183D7F6-B498-43B3-948B-1728B52AA6E4}">
+                <adec:decorative xmlns:adec="http://schemas.microsoft.com/office/drawing/2017/decorative" val="1"/>
+              </a:ext>
+            </a:extLst>
+          </p:cNvPr>
+          <p:cNvSpPr>
+            <a:spLocks noGrp="1" noRot="1" noChangeAspect="1" noMove="1" noResize="1" noEditPoints="1" noAdjustHandles="1" noChangeArrowheads="1" noChangeShapeType="1" noTextEdit="1"/>
+          </p:cNvSpPr>
+          <p:nvPr>
+            <p:extLst>
+              <p:ext uri="{386F3935-93C4-4BCD-93E2-E3B085C9AB24}">
+                <p16:designElem xmlns:p16="http://schemas.microsoft.com/office/powerpoint/2015/main" val="1"/>
+              </p:ext>
+            </p:extLst>
+          </p:nvPr>
+        </p:nvSpPr>
+        <p:spPr>
+          <a:xfrm rot="10800000" flipH="1">
+            <a:off x="0" y="6400799"/>
+            <a:ext cx="12192000" cy="456773"/>
+          </a:xfrm>
+          <a:prstGeom prst="rect">
+            <a:avLst/>
+          </a:prstGeom>
+          <a:gradFill>
+            <a:gsLst>
+              <a:gs pos="14000">
+                <a:schemeClr val="accent4">
+                  <a:alpha val="28000"/>
+                </a:schemeClr>
+              </a:gs>
+              <a:gs pos="100000">
+                <a:schemeClr val="accent5">
+                  <a:alpha val="85000"/>
+                </a:schemeClr>
+              </a:gs>
+            </a:gsLst>
+            <a:lin ang="6000000" scaled="0"/>
+          </a:gradFill>
+          <a:ln>
+            <a:noFill/>
+          </a:ln>
+        </p:spPr>
+        <p:style>
+          <a:lnRef idx="2">
+            <a:schemeClr val="accent1">
+              <a:shade val="50000"/>
+            </a:schemeClr>
+          </a:lnRef>
+          <a:fillRef idx="1">
+            <a:schemeClr val="accent1"/>
+          </a:fillRef>
+          <a:effectRef idx="0">
+            <a:schemeClr val="accent1"/>
+          </a:effectRef>
+          <a:fontRef idx="minor">
+            <a:schemeClr val="lt1"/>
+          </a:fontRef>
+        </p:style>
+        <p:txBody>
+          <a:bodyPr rtlCol="0" anchor="ctr"/>
+          <a:lstStyle/>
+          <a:p>
+            <a:pPr algn="ctr"/>
+            <a:endParaRPr lang="en-US"/>
+          </a:p>
+        </p:txBody>
+      </p:sp>
+      <p:sp>
+        <p:nvSpPr>
+          <p:cNvPr id="15" name="Rectangle 14">
+            <a:extLst>
+              <a:ext uri="{FF2B5EF4-FFF2-40B4-BE49-F238E27FC236}">
+                <a16:creationId xmlns:a16="http://schemas.microsoft.com/office/drawing/2014/main" id="{EC44F520-2598-460E-9F91-B02F60830CA2}"/>
+              </a:ext>
+              <a:ext uri="{C183D7F6-B498-43B3-948B-1728B52AA6E4}">
+                <adec:decorative xmlns:adec="http://schemas.microsoft.com/office/drawing/2017/decorative" val="1"/>
+              </a:ext>
+            </a:extLst>
+          </p:cNvPr>
+          <p:cNvSpPr>
+            <a:spLocks noGrp="1" noRot="1" noChangeAspect="1" noMove="1" noResize="1" noEditPoints="1" noAdjustHandles="1" noChangeArrowheads="1" noChangeShapeType="1" noTextEdit="1"/>
+          </p:cNvSpPr>
+          <p:nvPr>
+            <p:extLst>
+              <p:ext uri="{386F3935-93C4-4BCD-93E2-E3B085C9AB24}">
+                <p16:designElem xmlns:p16="http://schemas.microsoft.com/office/powerpoint/2015/main" val="1"/>
+              </p:ext>
+            </p:extLst>
+          </p:nvPr>
+        </p:nvSpPr>
+        <p:spPr>
+          <a:xfrm flipH="1">
+            <a:off x="4038600" y="6400799"/>
+            <a:ext cx="8153398" cy="456772"/>
+          </a:xfrm>
+          <a:prstGeom prst="rect">
+            <a:avLst/>
+          </a:prstGeom>
+          <a:gradFill>
+            <a:gsLst>
+              <a:gs pos="9000">
+                <a:schemeClr val="accent2">
+                  <a:lumMod val="60000"/>
+                  <a:lumOff val="40000"/>
+                  <a:alpha val="55000"/>
+                </a:schemeClr>
+              </a:gs>
+              <a:gs pos="99000">
+                <a:schemeClr val="accent2"/>
+              </a:gs>
+            </a:gsLst>
+            <a:lin ang="14400000" scaled="0"/>
+          </a:gradFill>
+          <a:ln>
+            <a:noFill/>
+          </a:ln>
+        </p:spPr>
+        <p:style>
+          <a:lnRef idx="2">
+            <a:schemeClr val="accent1">
+              <a:shade val="50000"/>
+            </a:schemeClr>
+          </a:lnRef>
+          <a:fillRef idx="1">
+            <a:schemeClr val="accent1"/>
+          </a:fillRef>
+          <a:effectRef idx="0">
+            <a:schemeClr val="accent1"/>
+          </a:effectRef>
+          <a:fontRef idx="minor">
+            <a:schemeClr val="lt1"/>
+          </a:fontRef>
+        </p:style>
+        <p:txBody>
+          <a:bodyPr rtlCol="0" anchor="ctr"/>
+          <a:lstStyle/>
+          <a:p>
+            <a:pPr algn="ctr"/>
+            <a:endParaRPr lang="en-US"/>
+          </a:p>
+        </p:txBody>
+      </p:sp>
+      <p:sp useBgFill="1">
+        <p:nvSpPr>
+          <p:cNvPr id="17" name="Rectangle 16">
+            <a:extLst>
+              <a:ext uri="{FF2B5EF4-FFF2-40B4-BE49-F238E27FC236}">
+                <a16:creationId xmlns:a16="http://schemas.microsoft.com/office/drawing/2014/main" id="{7404E292-5FAB-47E8-A663-A07530CED8FF}"/>
+              </a:ext>
+              <a:ext uri="{C183D7F6-B498-43B3-948B-1728B52AA6E4}">
+                <adec:decorative xmlns:adec="http://schemas.microsoft.com/office/drawing/2017/decorative" val="1"/>
+              </a:ext>
+            </a:extLst>
+          </p:cNvPr>
+          <p:cNvSpPr>
+            <a:spLocks noGrp="1" noRot="1" noChangeAspect="1" noMove="1" noResize="1" noEditPoints="1" noAdjustHandles="1" noChangeArrowheads="1" noChangeShapeType="1" noTextEdit="1"/>
+          </p:cNvSpPr>
+          <p:nvPr>
+            <p:extLst>
+              <p:ext uri="{386F3935-93C4-4BCD-93E2-E3B085C9AB24}">
+                <p16:designElem xmlns:p16="http://schemas.microsoft.com/office/powerpoint/2015/main" val="1"/>
+              </p:ext>
+            </p:extLst>
+          </p:nvPr>
+        </p:nvSpPr>
+        <p:spPr>
+          <a:xfrm>
+            <a:off x="0" y="0"/>
+            <a:ext cx="12192000" cy="6858000"/>
+          </a:xfrm>
+          <a:prstGeom prst="rect">
+            <a:avLst/>
+          </a:prstGeom>
+          <a:ln w="12700" cap="flat" cmpd="sng" algn="ctr">
+            <a:noFill/>
+            <a:prstDash val="solid"/>
+            <a:miter lim="800000"/>
+          </a:ln>
+          <a:effectLst/>
+          <a:extLst>
+            <a:ext uri="{91240B29-F687-4F45-9708-019B960494DF}">
+              <a14:hiddenLine xmlns:a14="http://schemas.microsoft.com/office/drawing/2010/main" w="12700" cap="flat" cmpd="sng" algn="ctr">
+                <a:solidFill>
+                  <a:schemeClr val="accent1">
+                    <a:shade val="50000"/>
+                  </a:schemeClr>
+                </a:solidFill>
+                <a:prstDash val="solid"/>
+                <a:miter lim="800000"/>
+              </a14:hiddenLine>
+            </a:ext>
+          </a:extLst>
+        </p:spPr>
+        <p:style>
+          <a:lnRef idx="2">
+            <a:schemeClr val="accent1">
+              <a:shade val="50000"/>
+            </a:schemeClr>
+          </a:lnRef>
+          <a:fillRef idx="1">
+            <a:schemeClr val="accent1"/>
+          </a:fillRef>
+          <a:effectRef idx="0">
+            <a:schemeClr val="accent1"/>
+          </a:effectRef>
+          <a:fontRef idx="minor">
+            <a:schemeClr val="lt1"/>
+          </a:fontRef>
+        </p:style>
+        <p:txBody>
+          <a:bodyPr rtlCol="0" anchor="ctr"/>
+          <a:lstStyle/>
+          <a:p>
+            <a:pPr algn="ctr"/>
+            <a:endParaRPr lang="en-US"/>
+          </a:p>
+        </p:txBody>
+      </p:sp>
+      <p:sp>
+        <p:nvSpPr>
+          <p:cNvPr id="19" name="Rectangle 18">
+            <a:extLst>
+              <a:ext uri="{FF2B5EF4-FFF2-40B4-BE49-F238E27FC236}">
+                <a16:creationId xmlns:a16="http://schemas.microsoft.com/office/drawing/2014/main" id="{D80FF8ED-64CE-400C-A4D5-9F943FC264DE}"/>
+              </a:ext>
+              <a:ext uri="{C183D7F6-B498-43B3-948B-1728B52AA6E4}">
+                <adec:decorative xmlns:adec="http://schemas.microsoft.com/office/drawing/2017/decorative" val="1"/>
+              </a:ext>
+            </a:extLst>
+          </p:cNvPr>
+          <p:cNvSpPr>
+            <a:spLocks noGrp="1" noRot="1" noChangeAspect="1" noMove="1" noResize="1" noEditPoints="1" noAdjustHandles="1" noChangeArrowheads="1" noChangeShapeType="1" noTextEdit="1"/>
+          </p:cNvSpPr>
+          <p:nvPr>
+            <p:extLst>
+              <p:ext uri="{386F3935-93C4-4BCD-93E2-E3B085C9AB24}">
+                <p16:designElem xmlns:p16="http://schemas.microsoft.com/office/powerpoint/2015/main" val="1"/>
+              </p:ext>
+            </p:extLst>
+          </p:nvPr>
+        </p:nvSpPr>
+        <p:spPr>
+          <a:xfrm rot="10800000" flipH="1">
+            <a:off x="0" y="0"/>
+            <a:ext cx="12191999" cy="6858000"/>
+          </a:xfrm>
+          <a:prstGeom prst="rect">
+            <a:avLst/>
+          </a:prstGeom>
+          <a:gradFill>
+            <a:gsLst>
+              <a:gs pos="0">
+                <a:schemeClr val="accent5">
+                  <a:alpha val="75000"/>
+                </a:schemeClr>
+              </a:gs>
+              <a:gs pos="100000">
+                <a:schemeClr val="accent2">
+                  <a:lumMod val="60000"/>
+                  <a:lumOff val="40000"/>
+                </a:schemeClr>
+              </a:gs>
+            </a:gsLst>
+            <a:lin ang="13800000" scaled="0"/>
+          </a:gradFill>
+          <a:ln>
+            <a:noFill/>
+          </a:ln>
+        </p:spPr>
+        <p:style>
+          <a:lnRef idx="2">
+            <a:schemeClr val="accent1">
+              <a:shade val="50000"/>
+            </a:schemeClr>
+          </a:lnRef>
+          <a:fillRef idx="1">
+            <a:schemeClr val="accent1"/>
+          </a:fillRef>
+          <a:effectRef idx="0">
+            <a:schemeClr val="accent1"/>
+          </a:effectRef>
+          <a:fontRef idx="minor">
+            <a:schemeClr val="lt1"/>
+          </a:fontRef>
+        </p:style>
+        <p:txBody>
+          <a:bodyPr rtlCol="0" anchor="ctr"/>
+          <a:lstStyle/>
+          <a:p>
+            <a:pPr algn="ctr"/>
+            <a:endParaRPr lang="en-US"/>
+          </a:p>
+        </p:txBody>
+      </p:sp>
+      <p:sp>
+        <p:nvSpPr>
+          <p:cNvPr id="21" name="Rectangle 20">
+            <a:extLst>
+              <a:ext uri="{FF2B5EF4-FFF2-40B4-BE49-F238E27FC236}">
+                <a16:creationId xmlns:a16="http://schemas.microsoft.com/office/drawing/2014/main" id="{568868AD-100D-45F3-B11E-8A2936712B9E}"/>
+              </a:ext>
+              <a:ext uri="{C183D7F6-B498-43B3-948B-1728B52AA6E4}">
+                <adec:decorative xmlns:adec="http://schemas.microsoft.com/office/drawing/2017/decorative" val="1"/>
+              </a:ext>
+            </a:extLst>
+          </p:cNvPr>
+          <p:cNvSpPr>
+            <a:spLocks noGrp="1" noRot="1" noChangeAspect="1" noMove="1" noResize="1" noEditPoints="1" noAdjustHandles="1" noChangeArrowheads="1" noChangeShapeType="1" noTextEdit="1"/>
+          </p:cNvSpPr>
+          <p:nvPr>
+            <p:extLst>
+              <p:ext uri="{386F3935-93C4-4BCD-93E2-E3B085C9AB24}">
+                <p16:designElem xmlns:p16="http://schemas.microsoft.com/office/powerpoint/2015/main" val="1"/>
+              </p:ext>
+            </p:extLst>
+          </p:nvPr>
+        </p:nvSpPr>
+        <p:spPr>
+          <a:xfrm rot="10800000">
+            <a:off x="0" y="0"/>
+            <a:ext cx="12191999" cy="6858000"/>
+          </a:xfrm>
+          <a:prstGeom prst="rect">
+            <a:avLst/>
+          </a:prstGeom>
+          <a:gradFill>
+            <a:gsLst>
+              <a:gs pos="49000">
+                <a:schemeClr val="accent5">
+                  <a:alpha val="50000"/>
+                </a:schemeClr>
+              </a:gs>
+              <a:gs pos="100000">
+                <a:schemeClr val="accent2">
+                  <a:alpha val="74000"/>
+                </a:schemeClr>
+              </a:gs>
+            </a:gsLst>
+            <a:lin ang="15000000" scaled="0"/>
+          </a:gradFill>
+          <a:ln>
+            <a:noFill/>
+          </a:ln>
+        </p:spPr>
+        <p:style>
+          <a:lnRef idx="2">
+            <a:schemeClr val="accent1">
+              <a:shade val="50000"/>
+            </a:schemeClr>
+          </a:lnRef>
+          <a:fillRef idx="1">
+            <a:schemeClr val="accent1"/>
+          </a:fillRef>
+          <a:effectRef idx="0">
+            <a:schemeClr val="accent1"/>
+          </a:effectRef>
+          <a:fontRef idx="minor">
+            <a:schemeClr val="lt1"/>
+          </a:fontRef>
+        </p:style>
+        <p:txBody>
+          <a:bodyPr rtlCol="0" anchor="ctr"/>
+          <a:lstStyle/>
+          <a:p>
+            <a:pPr algn="ctr"/>
+            <a:endParaRPr lang="en-US"/>
+          </a:p>
+        </p:txBody>
+      </p:sp>
+      <p:sp>
+        <p:nvSpPr>
+          <p:cNvPr id="23" name="Rectangle 22">
+            <a:extLst>
+              <a:ext uri="{FF2B5EF4-FFF2-40B4-BE49-F238E27FC236}">
+                <a16:creationId xmlns:a16="http://schemas.microsoft.com/office/drawing/2014/main" id="{714742CC-05F9-44AC-AF98-AB6EF810E47D}"/>
+              </a:ext>
+              <a:ext uri="{C183D7F6-B498-43B3-948B-1728B52AA6E4}">
+                <adec:decorative xmlns:adec="http://schemas.microsoft.com/office/drawing/2017/decorative" val="1"/>
+              </a:ext>
+            </a:extLst>
+          </p:cNvPr>
+          <p:cNvSpPr>
+            <a:spLocks noGrp="1" noRot="1" noChangeAspect="1" noMove="1" noResize="1" noEditPoints="1" noAdjustHandles="1" noChangeArrowheads="1" noChangeShapeType="1" noTextEdit="1"/>
+          </p:cNvSpPr>
+          <p:nvPr>
+            <p:extLst>
+              <p:ext uri="{386F3935-93C4-4BCD-93E2-E3B085C9AB24}">
+                <p16:designElem xmlns:p16="http://schemas.microsoft.com/office/powerpoint/2015/main" val="1"/>
+              </p:ext>
+            </p:extLst>
+          </p:nvPr>
+        </p:nvSpPr>
+        <p:spPr>
+          <a:xfrm rot="10800000" flipH="1">
+            <a:off x="-2" y="0"/>
+            <a:ext cx="6096001" cy="6858000"/>
+          </a:xfrm>
+          <a:prstGeom prst="rect">
+            <a:avLst/>
+          </a:prstGeom>
+          <a:gradFill>
+            <a:gsLst>
+              <a:gs pos="0">
+                <a:schemeClr val="accent2">
+                  <a:alpha val="17000"/>
+                </a:schemeClr>
+              </a:gs>
+              <a:gs pos="85000">
+                <a:schemeClr val="accent4">
+                  <a:alpha val="40000"/>
+                </a:schemeClr>
+              </a:gs>
+            </a:gsLst>
+            <a:lin ang="14400000" scaled="0"/>
+          </a:gradFill>
+          <a:ln>
+            <a:noFill/>
+          </a:ln>
+        </p:spPr>
+        <p:style>
+          <a:lnRef idx="2">
+            <a:schemeClr val="accent1">
+              <a:shade val="50000"/>
+            </a:schemeClr>
+          </a:lnRef>
+          <a:fillRef idx="1">
+            <a:schemeClr val="accent1"/>
+          </a:fillRef>
+          <a:effectRef idx="0">
+            <a:schemeClr val="accent1"/>
+          </a:effectRef>
+          <a:fontRef idx="minor">
+            <a:schemeClr val="lt1"/>
+          </a:fontRef>
+        </p:style>
+        <p:txBody>
+          <a:bodyPr rtlCol="0" anchor="ctr"/>
+          <a:lstStyle/>
+          <a:p>
+            <a:pPr algn="ctr"/>
+            <a:endParaRPr lang="en-US"/>
+          </a:p>
+        </p:txBody>
+      </p:sp>
+      <p:sp>
+        <p:nvSpPr>
+          <p:cNvPr id="25" name="Freeform: Shape 13">
+            <a:extLst>
+              <a:ext uri="{FF2B5EF4-FFF2-40B4-BE49-F238E27FC236}">
+                <a16:creationId xmlns:a16="http://schemas.microsoft.com/office/drawing/2014/main" id="{853C77DB-C7E3-4B1F-9AD0-1EB2982A8659}"/>
+              </a:ext>
+              <a:ext uri="{C183D7F6-B498-43B3-948B-1728B52AA6E4}">
+                <adec:decorative xmlns:adec="http://schemas.microsoft.com/office/drawing/2017/decorative" val="1"/>
+              </a:ext>
+            </a:extLst>
+          </p:cNvPr>
+          <p:cNvSpPr>
+            <a:spLocks noGrp="1" noRot="1" noChangeAspect="1" noMove="1" noResize="1" noEditPoints="1" noAdjustHandles="1" noChangeArrowheads="1" noChangeShapeType="1" noTextEdit="1"/>
+          </p:cNvSpPr>
+          <p:nvPr>
+            <p:extLst>
+              <p:ext uri="{386F3935-93C4-4BCD-93E2-E3B085C9AB24}">
+                <p16:designElem xmlns:p16="http://schemas.microsoft.com/office/powerpoint/2015/main" val="1"/>
+              </p:ext>
+            </p:extLst>
+          </p:nvPr>
+        </p:nvSpPr>
+        <p:spPr>
+          <a:xfrm rot="5400000" flipH="1">
+            <a:off x="3460656" y="-2569189"/>
+            <a:ext cx="5115722" cy="10255626"/>
+          </a:xfrm>
+          <a:custGeom>
+            <a:avLst/>
+            <a:gdLst>
+              <a:gd name="connsiteX0" fmla="*/ 2065105 w 2065105"/>
+              <a:gd name="connsiteY0" fmla="*/ 0 h 4139967"/>
+              <a:gd name="connsiteX1" fmla="*/ 2065105 w 2065105"/>
+              <a:gd name="connsiteY1" fmla="*/ 4139967 h 4139967"/>
+              <a:gd name="connsiteX2" fmla="*/ 1858573 w 2065105"/>
+              <a:gd name="connsiteY2" fmla="*/ 4129538 h 4139967"/>
+              <a:gd name="connsiteX3" fmla="*/ 0 w 2065105"/>
+              <a:gd name="connsiteY3" fmla="*/ 2069983 h 4139967"/>
+              <a:gd name="connsiteX4" fmla="*/ 1858573 w 2065105"/>
+              <a:gd name="connsiteY4" fmla="*/ 10428 h 4139967"/>
+            </a:gdLst>
+            <a:ahLst/>
+            <a:cxnLst>
+              <a:cxn ang="0">
+                <a:pos x="connsiteX0" y="connsiteY0"/>
+              </a:cxn>
+              <a:cxn ang="0">
+                <a:pos x="connsiteX1" y="connsiteY1"/>
+              </a:cxn>
+              <a:cxn ang="0">
+                <a:pos x="connsiteX2" y="connsiteY2"/>
+              </a:cxn>
+              <a:cxn ang="0">
+                <a:pos x="connsiteX3" y="connsiteY3"/>
+              </a:cxn>
+              <a:cxn ang="0">
+                <a:pos x="connsiteX4" y="connsiteY4"/>
+              </a:cxn>
+            </a:cxnLst>
+            <a:rect l="l" t="t" r="r" b="b"/>
+            <a:pathLst>
+              <a:path w="2065105" h="4139967">
+                <a:moveTo>
+                  <a:pt x="2065105" y="0"/>
+                </a:moveTo>
+                <a:lnTo>
+                  <a:pt x="2065105" y="4139967"/>
+                </a:lnTo>
+                <a:lnTo>
+                  <a:pt x="1858573" y="4129538"/>
+                </a:lnTo>
+                <a:cubicBezTo>
+                  <a:pt x="814640" y="4023521"/>
+                  <a:pt x="0" y="3141887"/>
+                  <a:pt x="0" y="2069983"/>
+                </a:cubicBezTo>
+                <a:cubicBezTo>
+                  <a:pt x="0" y="998079"/>
+                  <a:pt x="814640" y="116446"/>
+                  <a:pt x="1858573" y="10428"/>
+                </a:cubicBezTo>
+                <a:close/>
+              </a:path>
+            </a:pathLst>
+          </a:custGeom>
+          <a:gradFill flip="none" rotWithShape="1">
+            <a:gsLst>
+              <a:gs pos="7000">
+                <a:schemeClr val="accent4">
+                  <a:lumMod val="60000"/>
+                  <a:lumOff val="40000"/>
+                  <a:alpha val="3000"/>
+                </a:schemeClr>
+              </a:gs>
+              <a:gs pos="100000">
+                <a:schemeClr val="accent4">
+                  <a:lumMod val="60000"/>
+                  <a:lumOff val="40000"/>
+                  <a:alpha val="37000"/>
+                </a:schemeClr>
+              </a:gs>
+            </a:gsLst>
+            <a:lin ang="2700000" scaled="1"/>
+            <a:tileRect/>
+          </a:gradFill>
+          <a:ln>
+            <a:noFill/>
+          </a:ln>
+        </p:spPr>
+        <p:style>
+          <a:lnRef idx="2">
+            <a:schemeClr val="accent1">
+              <a:shade val="50000"/>
+            </a:schemeClr>
+          </a:lnRef>
+          <a:fillRef idx="1">
+            <a:schemeClr val="accent1"/>
+          </a:fillRef>
+          <a:effectRef idx="0">
+            <a:schemeClr val="accent1"/>
+          </a:effectRef>
+          <a:fontRef idx="minor">
+            <a:schemeClr val="lt1"/>
+          </a:fontRef>
+        </p:style>
+        <p:txBody>
+          <a:bodyPr rtlCol="0" anchor="ctr"/>
+          <a:lstStyle/>
+          <a:p>
+            <a:pPr algn="ctr"/>
+            <a:endParaRPr lang="en-US"/>
+          </a:p>
+        </p:txBody>
+      </p:sp>
+      <p:sp>
+        <p:nvSpPr>
+          <p:cNvPr id="7" name="Title 6">
+            <a:extLst>
+              <a:ext uri="{FF2B5EF4-FFF2-40B4-BE49-F238E27FC236}">
+                <a16:creationId xmlns:a16="http://schemas.microsoft.com/office/drawing/2014/main" id="{0AAC68A5-044C-869C-9FAD-049E83F3B455}"/>
+              </a:ext>
+            </a:extLst>
+          </p:cNvPr>
+          <p:cNvSpPr>
+            <a:spLocks noGrp="1"/>
+          </p:cNvSpPr>
+          <p:nvPr>
+            <p:ph type="title"/>
+          </p:nvPr>
+        </p:nvSpPr>
+        <p:spPr>
+          <a:xfrm>
+            <a:off x="1524000" y="1104445"/>
+            <a:ext cx="9144000" cy="2826182"/>
+          </a:xfrm>
+        </p:spPr>
+        <p:txBody>
+          <a:bodyPr vert="horz" lIns="0" tIns="0" rIns="0" bIns="0" rtlCol="0" anchor="ctr">
+            <a:normAutofit/>
+          </a:bodyPr>
+          <a:lstStyle/>
+          <a:p>
+            <a:pPr algn="ctr"/>
+            <a:r>
+              <a:rPr lang="en-US" dirty="0">
+                <a:solidFill>
+                  <a:schemeClr val="bg1"/>
+                </a:solidFill>
+              </a:rPr>
+              <a:t>Machine learning models</a:t>
+            </a:r>
+          </a:p>
+        </p:txBody>
+      </p:sp>
+      <p:sp>
+        <p:nvSpPr>
+          <p:cNvPr id="8" name="Text Placeholder 7">
+            <a:extLst>
+              <a:ext uri="{FF2B5EF4-FFF2-40B4-BE49-F238E27FC236}">
+                <a16:creationId xmlns:a16="http://schemas.microsoft.com/office/drawing/2014/main" id="{4CFE2D43-FF5E-2A0B-E838-60A7D7B25149}"/>
+              </a:ext>
+            </a:extLst>
+          </p:cNvPr>
+          <p:cNvSpPr>
+            <a:spLocks noGrp="1"/>
+          </p:cNvSpPr>
+          <p:nvPr>
+            <p:ph type="body" idx="1"/>
+          </p:nvPr>
+        </p:nvSpPr>
+        <p:spPr>
+          <a:xfrm>
+            <a:off x="2022582" y="5369289"/>
+            <a:ext cx="8138765" cy="756919"/>
+          </a:xfrm>
+        </p:spPr>
+        <p:txBody>
+          <a:bodyPr vert="horz" lIns="0" tIns="0" rIns="0" bIns="0" rtlCol="0" anchor="ctr">
+            <a:normAutofit/>
+          </a:bodyPr>
+          <a:lstStyle/>
+          <a:p>
+            <a:pPr algn="ctr">
+              <a:lnSpc>
+                <a:spcPct val="150000"/>
+              </a:lnSpc>
+            </a:pPr>
+            <a:r>
+              <a:rPr lang="en-US" sz="1400" b="1" dirty="0">
+                <a:solidFill>
+                  <a:schemeClr val="bg1"/>
+                </a:solidFill>
+              </a:rPr>
+              <a:t>Base line models x pipeline</a:t>
+            </a:r>
+          </a:p>
+        </p:txBody>
+      </p:sp>
+    </p:spTree>
+    <p:extLst>
+      <p:ext uri="{BB962C8B-B14F-4D97-AF65-F5344CB8AC3E}">
+        <p14:creationId xmlns:p14="http://schemas.microsoft.com/office/powerpoint/2010/main" val="1413929642"/>
+      </p:ext>
+    </p:extLst>
+  </p:cSld>
+  <p:clrMapOvr>
+    <a:masterClrMapping/>
+  </p:clrMapOvr>
+</p:sld>
+</file>
+
+<file path=ppt/slides/slide15.xml><?xml version="1.0" encoding="utf-8"?>
 <p:sld xmlns:a="http://schemas.openxmlformats.org/drawingml/2006/main" xmlns:r="http://schemas.openxmlformats.org/officeDocument/2006/relationships" xmlns:p="http://schemas.openxmlformats.org/presentationml/2006/main">
   <p:cSld>
     <p:spTree>
@@ -9404,7 +10730,7 @@
 </p:sld>
 </file>
 
-<file path=ppt/slides/slide14.xml><?xml version="1.0" encoding="utf-8"?>
+<file path=ppt/slides/slide16.xml><?xml version="1.0" encoding="utf-8"?>
 <p:sld xmlns:a="http://schemas.openxmlformats.org/drawingml/2006/main" xmlns:r="http://schemas.openxmlformats.org/officeDocument/2006/relationships" xmlns:p="http://schemas.openxmlformats.org/presentationml/2006/main">
   <p:cSld>
     <p:spTree>
@@ -9474,21 +10800,21 @@
             <a:pPr algn="just"/>
             <a:r>
               <a:rPr lang="en-US" dirty="0"/>
-              <a:t>To spend more time during the EDA as this is a fundamental step to test the hypothesis and evaluate the features to be engineered of our model;</a:t>
+              <a:t>Not enough time to spend during the EDA, but I consider this is a fundamental step to test the hypothesis and evaluate the features to be engineered of our model;</a:t>
             </a:r>
           </a:p>
           <a:p>
             <a:pPr algn="just"/>
             <a:r>
               <a:rPr lang="en-US" dirty="0"/>
-              <a:t>Understand better about the metrics to be evaluated;</a:t>
+              <a:t>Understand better about the metrics to be evaluated and which models to be chosen as your base line models;</a:t>
             </a:r>
           </a:p>
           <a:p>
             <a:pPr algn="just"/>
             <a:r>
               <a:rPr lang="en-US" dirty="0"/>
-              <a:t>Combine different models in a same pipeline.</a:t>
+              <a:t>How to combine different models in a same pipeline and choose estimators (still in progress).</a:t>
             </a:r>
           </a:p>
         </p:txBody>
@@ -9506,7 +10832,7 @@
 </p:sld>
 </file>
 
-<file path=ppt/slides/slide15.xml><?xml version="1.0" encoding="utf-8"?>
+<file path=ppt/slides/slide17.xml><?xml version="1.0" encoding="utf-8"?>
 <p:sld xmlns:a="http://schemas.openxmlformats.org/drawingml/2006/main" xmlns:r="http://schemas.openxmlformats.org/officeDocument/2006/relationships" xmlns:p="http://schemas.openxmlformats.org/presentationml/2006/main">
   <p:cSld>
     <p:spTree>
@@ -10507,7 +11833,7 @@
           <a:p>
             <a:r>
               <a:rPr lang="en-US" dirty="0"/>
-              <a:t>Boxplot of income</a:t>
+              <a:t>Boxplot of applicant and co-applicant income</a:t>
             </a:r>
           </a:p>
         </p:txBody>
@@ -11190,14 +12516,6 @@
 <file path=ppt/slides/slide8.xml><?xml version="1.0" encoding="utf-8"?>
 <p:sld xmlns:a="http://schemas.openxmlformats.org/drawingml/2006/main" xmlns:r="http://schemas.openxmlformats.org/officeDocument/2006/relationships" xmlns:p="http://schemas.openxmlformats.org/presentationml/2006/main">
   <p:cSld>
-    <p:bg>
-      <p:bgPr>
-        <a:solidFill>
-          <a:schemeClr val="bg1"/>
-        </a:solidFill>
-        <a:effectLst/>
-      </p:bgPr>
-    </p:bg>
     <p:spTree>
       <p:nvGrpSpPr>
         <p:cNvPr id="1" name=""/>
@@ -11214,457 +12532,10 @@
       </p:grpSpPr>
       <p:sp>
         <p:nvSpPr>
-          <p:cNvPr id="25" name="Rectangle 10">
-            <a:extLst>
-              <a:ext uri="{FF2B5EF4-FFF2-40B4-BE49-F238E27FC236}">
-                <a16:creationId xmlns:a16="http://schemas.microsoft.com/office/drawing/2014/main" id="{BD4C0BBB-0042-4603-A226-6117F3FD5B3C}"/>
-              </a:ext>
-              <a:ext uri="{C183D7F6-B498-43B3-948B-1728B52AA6E4}">
-                <adec:decorative xmlns:adec="http://schemas.microsoft.com/office/drawing/2017/decorative" val="1"/>
-              </a:ext>
-            </a:extLst>
-          </p:cNvPr>
-          <p:cNvSpPr>
-            <a:spLocks noGrp="1" noRot="1" noChangeAspect="1" noMove="1" noResize="1" noEditPoints="1" noAdjustHandles="1" noChangeArrowheads="1" noChangeShapeType="1" noTextEdit="1"/>
-          </p:cNvSpPr>
-          <p:nvPr>
-            <p:extLst>
-              <p:ext uri="{386F3935-93C4-4BCD-93E2-E3B085C9AB24}">
-                <p16:designElem xmlns:p16="http://schemas.microsoft.com/office/powerpoint/2015/main" val="1"/>
-              </p:ext>
-            </p:extLst>
-          </p:nvPr>
-        </p:nvSpPr>
-        <p:spPr>
-          <a:xfrm rot="10800000" flipH="1">
-            <a:off x="0" y="6400799"/>
-            <a:ext cx="12192000" cy="456773"/>
-          </a:xfrm>
-          <a:prstGeom prst="rect">
-            <a:avLst/>
-          </a:prstGeom>
-          <a:gradFill>
-            <a:gsLst>
-              <a:gs pos="14000">
-                <a:schemeClr val="accent4">
-                  <a:alpha val="28000"/>
-                </a:schemeClr>
-              </a:gs>
-              <a:gs pos="100000">
-                <a:schemeClr val="accent5">
-                  <a:alpha val="85000"/>
-                </a:schemeClr>
-              </a:gs>
-            </a:gsLst>
-            <a:lin ang="6000000" scaled="0"/>
-          </a:gradFill>
-          <a:ln>
-            <a:noFill/>
-          </a:ln>
-        </p:spPr>
-        <p:style>
-          <a:lnRef idx="2">
-            <a:schemeClr val="accent1">
-              <a:shade val="50000"/>
-            </a:schemeClr>
-          </a:lnRef>
-          <a:fillRef idx="1">
-            <a:schemeClr val="accent1"/>
-          </a:fillRef>
-          <a:effectRef idx="0">
-            <a:schemeClr val="accent1"/>
-          </a:effectRef>
-          <a:fontRef idx="minor">
-            <a:schemeClr val="lt1"/>
-          </a:fontRef>
-        </p:style>
-        <p:txBody>
-          <a:bodyPr rtlCol="0" anchor="ctr"/>
-          <a:lstStyle/>
-          <a:p>
-            <a:pPr algn="ctr"/>
-            <a:endParaRPr lang="en-US"/>
-          </a:p>
-        </p:txBody>
-      </p:sp>
-      <p:sp>
-        <p:nvSpPr>
-          <p:cNvPr id="26" name="Rectangle 12">
-            <a:extLst>
-              <a:ext uri="{FF2B5EF4-FFF2-40B4-BE49-F238E27FC236}">
-                <a16:creationId xmlns:a16="http://schemas.microsoft.com/office/drawing/2014/main" id="{EC44F520-2598-460E-9F91-B02F60830CA2}"/>
-              </a:ext>
-              <a:ext uri="{C183D7F6-B498-43B3-948B-1728B52AA6E4}">
-                <adec:decorative xmlns:adec="http://schemas.microsoft.com/office/drawing/2017/decorative" val="1"/>
-              </a:ext>
-            </a:extLst>
-          </p:cNvPr>
-          <p:cNvSpPr>
-            <a:spLocks noGrp="1" noRot="1" noChangeAspect="1" noMove="1" noResize="1" noEditPoints="1" noAdjustHandles="1" noChangeArrowheads="1" noChangeShapeType="1" noTextEdit="1"/>
-          </p:cNvSpPr>
-          <p:nvPr>
-            <p:extLst>
-              <p:ext uri="{386F3935-93C4-4BCD-93E2-E3B085C9AB24}">
-                <p16:designElem xmlns:p16="http://schemas.microsoft.com/office/powerpoint/2015/main" val="1"/>
-              </p:ext>
-            </p:extLst>
-          </p:nvPr>
-        </p:nvSpPr>
-        <p:spPr>
-          <a:xfrm flipH="1">
-            <a:off x="4038600" y="6400799"/>
-            <a:ext cx="8153398" cy="456772"/>
-          </a:xfrm>
-          <a:prstGeom prst="rect">
-            <a:avLst/>
-          </a:prstGeom>
-          <a:gradFill>
-            <a:gsLst>
-              <a:gs pos="9000">
-                <a:schemeClr val="accent2">
-                  <a:lumMod val="60000"/>
-                  <a:lumOff val="40000"/>
-                  <a:alpha val="55000"/>
-                </a:schemeClr>
-              </a:gs>
-              <a:gs pos="99000">
-                <a:schemeClr val="accent2"/>
-              </a:gs>
-            </a:gsLst>
-            <a:lin ang="14400000" scaled="0"/>
-          </a:gradFill>
-          <a:ln>
-            <a:noFill/>
-          </a:ln>
-        </p:spPr>
-        <p:style>
-          <a:lnRef idx="2">
-            <a:schemeClr val="accent1">
-              <a:shade val="50000"/>
-            </a:schemeClr>
-          </a:lnRef>
-          <a:fillRef idx="1">
-            <a:schemeClr val="accent1"/>
-          </a:fillRef>
-          <a:effectRef idx="0">
-            <a:schemeClr val="accent1"/>
-          </a:effectRef>
-          <a:fontRef idx="minor">
-            <a:schemeClr val="lt1"/>
-          </a:fontRef>
-        </p:style>
-        <p:txBody>
-          <a:bodyPr rtlCol="0" anchor="ctr"/>
-          <a:lstStyle/>
-          <a:p>
-            <a:pPr algn="ctr"/>
-            <a:endParaRPr lang="en-US"/>
-          </a:p>
-        </p:txBody>
-      </p:sp>
-      <p:sp useBgFill="1">
-        <p:nvSpPr>
-          <p:cNvPr id="27" name="Rectangle 14">
-            <a:extLst>
-              <a:ext uri="{FF2B5EF4-FFF2-40B4-BE49-F238E27FC236}">
-                <a16:creationId xmlns:a16="http://schemas.microsoft.com/office/drawing/2014/main" id="{315596D0-7A93-45AB-A289-2A2B141E0BBF}"/>
-              </a:ext>
-              <a:ext uri="{C183D7F6-B498-43B3-948B-1728B52AA6E4}">
-                <adec:decorative xmlns:adec="http://schemas.microsoft.com/office/drawing/2017/decorative" val="1"/>
-              </a:ext>
-            </a:extLst>
-          </p:cNvPr>
-          <p:cNvSpPr>
-            <a:spLocks noGrp="1" noRot="1" noChangeAspect="1" noMove="1" noResize="1" noEditPoints="1" noAdjustHandles="1" noChangeArrowheads="1" noChangeShapeType="1" noTextEdit="1"/>
-          </p:cNvSpPr>
-          <p:nvPr>
-            <p:extLst>
-              <p:ext uri="{386F3935-93C4-4BCD-93E2-E3B085C9AB24}">
-                <p16:designElem xmlns:p16="http://schemas.microsoft.com/office/powerpoint/2015/main" val="1"/>
-              </p:ext>
-            </p:extLst>
-          </p:nvPr>
-        </p:nvSpPr>
-        <p:spPr>
-          <a:xfrm>
-            <a:off x="0" y="0"/>
-            <a:ext cx="12192000" cy="6858000"/>
-          </a:xfrm>
-          <a:prstGeom prst="rect">
-            <a:avLst/>
-          </a:prstGeom>
-          <a:ln w="12700" cap="flat" cmpd="sng" algn="ctr">
-            <a:noFill/>
-            <a:prstDash val="solid"/>
-            <a:miter lim="800000"/>
-          </a:ln>
-          <a:effectLst/>
-          <a:extLst>
-            <a:ext uri="{91240B29-F687-4F45-9708-019B960494DF}">
-              <a14:hiddenLine xmlns:a14="http://schemas.microsoft.com/office/drawing/2010/main" w="12700" cap="flat" cmpd="sng" algn="ctr">
-                <a:solidFill>
-                  <a:schemeClr val="accent1">
-                    <a:shade val="50000"/>
-                  </a:schemeClr>
-                </a:solidFill>
-                <a:prstDash val="solid"/>
-                <a:miter lim="800000"/>
-              </a14:hiddenLine>
-            </a:ext>
-          </a:extLst>
-        </p:spPr>
-        <p:style>
-          <a:lnRef idx="2">
-            <a:schemeClr val="accent1">
-              <a:shade val="50000"/>
-            </a:schemeClr>
-          </a:lnRef>
-          <a:fillRef idx="1">
-            <a:schemeClr val="accent1"/>
-          </a:fillRef>
-          <a:effectRef idx="0">
-            <a:schemeClr val="accent1"/>
-          </a:effectRef>
-          <a:fontRef idx="minor">
-            <a:schemeClr val="lt1"/>
-          </a:fontRef>
-        </p:style>
-        <p:txBody>
-          <a:bodyPr rtlCol="0" anchor="ctr"/>
-          <a:lstStyle/>
-          <a:p>
-            <a:pPr algn="ctr"/>
-            <a:endParaRPr lang="en-US"/>
-          </a:p>
-        </p:txBody>
-      </p:sp>
-      <p:sp>
-        <p:nvSpPr>
-          <p:cNvPr id="28" name="Rectangle 16">
-            <a:extLst>
-              <a:ext uri="{FF2B5EF4-FFF2-40B4-BE49-F238E27FC236}">
-                <a16:creationId xmlns:a16="http://schemas.microsoft.com/office/drawing/2014/main" id="{A90F64BE-B6DF-4D20-9A3E-DAD003896C0E}"/>
-              </a:ext>
-              <a:ext uri="{C183D7F6-B498-43B3-948B-1728B52AA6E4}">
-                <adec:decorative xmlns:adec="http://schemas.microsoft.com/office/drawing/2017/decorative" val="1"/>
-              </a:ext>
-            </a:extLst>
-          </p:cNvPr>
-          <p:cNvSpPr>
-            <a:spLocks noGrp="1" noRot="1" noChangeAspect="1" noMove="1" noResize="1" noEditPoints="1" noAdjustHandles="1" noChangeArrowheads="1" noChangeShapeType="1" noTextEdit="1"/>
-          </p:cNvSpPr>
-          <p:nvPr>
-            <p:extLst>
-              <p:ext uri="{386F3935-93C4-4BCD-93E2-E3B085C9AB24}">
-                <p16:designElem xmlns:p16="http://schemas.microsoft.com/office/powerpoint/2015/main" val="1"/>
-              </p:ext>
-            </p:extLst>
-          </p:nvPr>
-        </p:nvSpPr>
-        <p:spPr>
-          <a:xfrm>
-            <a:off x="-1" y="-8890"/>
-            <a:ext cx="4038601" cy="6866462"/>
-          </a:xfrm>
-          <a:prstGeom prst="rect">
-            <a:avLst/>
-          </a:prstGeom>
-          <a:gradFill>
-            <a:gsLst>
-              <a:gs pos="0">
-                <a:schemeClr val="accent5"/>
-              </a:gs>
-              <a:gs pos="100000">
-                <a:schemeClr val="accent4">
-                  <a:alpha val="55000"/>
-                </a:schemeClr>
-              </a:gs>
-            </a:gsLst>
-            <a:lin ang="18000000" scaled="0"/>
-          </a:gradFill>
-          <a:ln>
-            <a:noFill/>
-          </a:ln>
-        </p:spPr>
-        <p:style>
-          <a:lnRef idx="2">
-            <a:schemeClr val="accent1">
-              <a:shade val="50000"/>
-            </a:schemeClr>
-          </a:lnRef>
-          <a:fillRef idx="1">
-            <a:schemeClr val="accent1"/>
-          </a:fillRef>
-          <a:effectRef idx="0">
-            <a:schemeClr val="accent1"/>
-          </a:effectRef>
-          <a:fontRef idx="minor">
-            <a:schemeClr val="lt1"/>
-          </a:fontRef>
-        </p:style>
-        <p:txBody>
-          <a:bodyPr rtlCol="0" anchor="ctr"/>
-          <a:lstStyle/>
-          <a:p>
-            <a:pPr algn="ctr"/>
-            <a:endParaRPr lang="en-US"/>
-          </a:p>
-        </p:txBody>
-      </p:sp>
-      <p:sp>
-        <p:nvSpPr>
-          <p:cNvPr id="29" name="Rectangle 18">
-            <a:extLst>
-              <a:ext uri="{FF2B5EF4-FFF2-40B4-BE49-F238E27FC236}">
-                <a16:creationId xmlns:a16="http://schemas.microsoft.com/office/drawing/2014/main" id="{3299ACA5-1949-4821-8FA4-95A78A2097AE}"/>
-              </a:ext>
-              <a:ext uri="{C183D7F6-B498-43B3-948B-1728B52AA6E4}">
-                <adec:decorative xmlns:adec="http://schemas.microsoft.com/office/drawing/2017/decorative" val="1"/>
-              </a:ext>
-            </a:extLst>
-          </p:cNvPr>
-          <p:cNvSpPr>
-            <a:spLocks noGrp="1" noRot="1" noChangeAspect="1" noMove="1" noResize="1" noEditPoints="1" noAdjustHandles="1" noChangeArrowheads="1" noChangeShapeType="1" noTextEdit="1"/>
-          </p:cNvSpPr>
-          <p:nvPr>
-            <p:extLst>
-              <p:ext uri="{386F3935-93C4-4BCD-93E2-E3B085C9AB24}">
-                <p16:designElem xmlns:p16="http://schemas.microsoft.com/office/powerpoint/2015/main" val="1"/>
-              </p:ext>
-            </p:extLst>
-          </p:nvPr>
-        </p:nvSpPr>
-        <p:spPr>
-          <a:xfrm rot="16200000" flipH="1">
-            <a:off x="-1185328" y="1633640"/>
-            <a:ext cx="6866462" cy="3581401"/>
-          </a:xfrm>
-          <a:prstGeom prst="rect">
-            <a:avLst/>
-          </a:prstGeom>
-          <a:gradFill>
-            <a:gsLst>
-              <a:gs pos="0">
-                <a:schemeClr val="accent2"/>
-              </a:gs>
-              <a:gs pos="100000">
-                <a:schemeClr val="accent5">
-                  <a:alpha val="13000"/>
-                </a:schemeClr>
-              </a:gs>
-            </a:gsLst>
-            <a:lin ang="13800000" scaled="0"/>
-          </a:gradFill>
-          <a:ln>
-            <a:noFill/>
-          </a:ln>
-        </p:spPr>
-        <p:style>
-          <a:lnRef idx="2">
-            <a:schemeClr val="accent1">
-              <a:shade val="50000"/>
-            </a:schemeClr>
-          </a:lnRef>
-          <a:fillRef idx="1">
-            <a:schemeClr val="accent1"/>
-          </a:fillRef>
-          <a:effectRef idx="0">
-            <a:schemeClr val="accent1"/>
-          </a:effectRef>
-          <a:fontRef idx="minor">
-            <a:schemeClr val="lt1"/>
-          </a:fontRef>
-        </p:style>
-        <p:txBody>
-          <a:bodyPr rtlCol="0" anchor="ctr"/>
-          <a:lstStyle/>
-          <a:p>
-            <a:pPr algn="ctr"/>
-            <a:endParaRPr lang="en-US" dirty="0"/>
-          </a:p>
-        </p:txBody>
-      </p:sp>
-      <p:sp>
-        <p:nvSpPr>
-          <p:cNvPr id="30" name="Rectangle 20">
-            <a:extLst>
-              <a:ext uri="{FF2B5EF4-FFF2-40B4-BE49-F238E27FC236}">
-                <a16:creationId xmlns:a16="http://schemas.microsoft.com/office/drawing/2014/main" id="{85559C2F-075A-49B7-8935-4591245136E5}"/>
-              </a:ext>
-              <a:ext uri="{C183D7F6-B498-43B3-948B-1728B52AA6E4}">
-                <adec:decorative xmlns:adec="http://schemas.microsoft.com/office/drawing/2017/decorative" val="1"/>
-              </a:ext>
-            </a:extLst>
-          </p:cNvPr>
-          <p:cNvSpPr>
-            <a:spLocks noGrp="1" noRot="1" noChangeAspect="1" noMove="1" noResize="1" noEditPoints="1" noAdjustHandles="1" noChangeArrowheads="1" noChangeShapeType="1" noTextEdit="1"/>
-          </p:cNvSpPr>
-          <p:nvPr>
-            <p:extLst>
-              <p:ext uri="{386F3935-93C4-4BCD-93E2-E3B085C9AB24}">
-                <p16:designElem xmlns:p16="http://schemas.microsoft.com/office/powerpoint/2015/main" val="1"/>
-              </p:ext>
-            </p:extLst>
-          </p:nvPr>
-        </p:nvSpPr>
-        <p:spPr>
-          <a:xfrm>
-            <a:off x="0" y="2232044"/>
-            <a:ext cx="4038600" cy="4634418"/>
-          </a:xfrm>
-          <a:prstGeom prst="rect">
-            <a:avLst/>
-          </a:prstGeom>
-          <a:gradFill>
-            <a:gsLst>
-              <a:gs pos="0">
-                <a:schemeClr val="accent5">
-                  <a:alpha val="36000"/>
-                </a:schemeClr>
-              </a:gs>
-              <a:gs pos="67000">
-                <a:schemeClr val="accent5">
-                  <a:alpha val="0"/>
-                </a:schemeClr>
-              </a:gs>
-            </a:gsLst>
-            <a:lin ang="2400000" scaled="0"/>
-          </a:gradFill>
-          <a:ln>
-            <a:noFill/>
-          </a:ln>
-        </p:spPr>
-        <p:style>
-          <a:lnRef idx="2">
-            <a:schemeClr val="accent1">
-              <a:shade val="50000"/>
-            </a:schemeClr>
-          </a:lnRef>
-          <a:fillRef idx="1">
-            <a:schemeClr val="accent1"/>
-          </a:fillRef>
-          <a:effectRef idx="0">
-            <a:schemeClr val="accent1"/>
-          </a:effectRef>
-          <a:fontRef idx="minor">
-            <a:schemeClr val="lt1"/>
-          </a:fontRef>
-        </p:style>
-        <p:txBody>
-          <a:bodyPr rtlCol="0" anchor="ctr"/>
-          <a:lstStyle/>
-          <a:p>
-            <a:pPr algn="ctr"/>
-            <a:endParaRPr lang="en-US" dirty="0"/>
-          </a:p>
-        </p:txBody>
-      </p:sp>
-      <p:sp>
-        <p:nvSpPr>
           <p:cNvPr id="2" name="Title 1">
             <a:extLst>
               <a:ext uri="{FF2B5EF4-FFF2-40B4-BE49-F238E27FC236}">
-                <a16:creationId xmlns:a16="http://schemas.microsoft.com/office/drawing/2014/main" id="{609F77FC-504E-9CE2-B050-D6788F462AC0}"/>
+                <a16:creationId xmlns:a16="http://schemas.microsoft.com/office/drawing/2014/main" id="{833D164F-52B3-35AB-FECD-68862BF9FA71}"/>
               </a:ext>
             </a:extLst>
           </p:cNvPr>
@@ -11677,68 +12548,65 @@
         </p:nvSpPr>
         <p:spPr>
           <a:xfrm>
-            <a:off x="347241" y="2463419"/>
-            <a:ext cx="3331624" cy="3936952"/>
+            <a:off x="1048297" y="998999"/>
+            <a:ext cx="3932237" cy="1894511"/>
           </a:xfrm>
         </p:spPr>
         <p:txBody>
-          <a:bodyPr vert="horz" lIns="0" tIns="0" rIns="0" bIns="0" rtlCol="0" anchor="t">
+          <a:bodyPr>
             <a:normAutofit/>
           </a:bodyPr>
           <a:lstStyle/>
           <a:p>
-            <a:pPr algn="ctr"/>
             <a:r>
-              <a:rPr lang="en-US" sz="3200" spc="750" dirty="0">
-                <a:solidFill>
-                  <a:schemeClr val="bg1"/>
-                </a:solidFill>
-              </a:rPr>
-              <a:t>Income by education</a:t>
+              <a:rPr lang="en-US" dirty="0"/>
+              <a:t>loan amount per group</a:t>
             </a:r>
-            <a:br>
-              <a:rPr lang="en-US" sz="3200" spc="750" dirty="0">
-                <a:solidFill>
-                  <a:schemeClr val="bg1"/>
-                </a:solidFill>
-              </a:rPr>
-            </a:br>
-            <a:br>
-              <a:rPr lang="en-US" sz="3200" spc="750" dirty="0">
-                <a:solidFill>
-                  <a:schemeClr val="bg1"/>
-                </a:solidFill>
-              </a:rPr>
-            </a:br>
+          </a:p>
+        </p:txBody>
+      </p:sp>
+      <p:sp>
+        <p:nvSpPr>
+          <p:cNvPr id="7" name="TextBox 6">
+            <a:extLst>
+              <a:ext uri="{FF2B5EF4-FFF2-40B4-BE49-F238E27FC236}">
+                <a16:creationId xmlns:a16="http://schemas.microsoft.com/office/drawing/2014/main" id="{70E97BB2-6796-5426-152B-9D160E266F1C}"/>
+              </a:ext>
+            </a:extLst>
+          </p:cNvPr>
+          <p:cNvSpPr txBox="1"/>
+          <p:nvPr/>
+        </p:nvSpPr>
+        <p:spPr>
+          <a:xfrm>
+            <a:off x="1048297" y="3428999"/>
+            <a:ext cx="3809649" cy="1631216"/>
+          </a:xfrm>
+          <a:prstGeom prst="rect">
+            <a:avLst/>
+          </a:prstGeom>
+          <a:noFill/>
+        </p:spPr>
+        <p:txBody>
+          <a:bodyPr wrap="square">
+            <a:spAutoFit/>
+          </a:bodyPr>
+          <a:lstStyle/>
+          <a:p>
+            <a:pPr algn="just"/>
             <a:r>
-              <a:rPr lang="en-US" sz="1600" b="0" spc="750" dirty="0">
-                <a:solidFill>
-                  <a:schemeClr val="bg1"/>
-                </a:solidFill>
-              </a:rPr>
-              <a:t>group of applicants and co-applicants who have High income are also graduated.</a:t>
+              <a:rPr lang="en-US" sz="2000" dirty="0"/>
+              <a:t>75% of the loan amount was given to applicants and co-applicants who are male, not self-employed and not graduated (with a higher income).</a:t>
             </a:r>
-            <a:br>
-              <a:rPr lang="en-US" sz="1600" b="0" i="1" spc="750" dirty="0">
-                <a:solidFill>
-                  <a:schemeClr val="bg1"/>
-                </a:solidFill>
-              </a:rPr>
-            </a:br>
-            <a:endParaRPr lang="en-US" sz="1600" b="0" i="1" spc="750" dirty="0">
-              <a:solidFill>
-                <a:schemeClr val="bg1"/>
-              </a:solidFill>
-            </a:endParaRPr>
           </a:p>
         </p:txBody>
       </p:sp>
       <p:pic>
         <p:nvPicPr>
-          <p:cNvPr id="5" name="Picture 4" descr="Chart, radar chart&#10;&#10;Description automatically generated">
-            <a:extLst>
-              <a:ext uri="{FF2B5EF4-FFF2-40B4-BE49-F238E27FC236}">
-                <a16:creationId xmlns:a16="http://schemas.microsoft.com/office/drawing/2014/main" id="{FFC856EC-1C64-C767-974A-B53557FB7A87}"/>
+          <p:cNvPr id="3" name="Picture 2">
+            <a:extLst>
+              <a:ext uri="{FF2B5EF4-FFF2-40B4-BE49-F238E27FC236}">
+                <a16:creationId xmlns:a16="http://schemas.microsoft.com/office/drawing/2014/main" id="{FFAE4D28-3114-C145-8B06-722BC3C5B165}"/>
               </a:ext>
             </a:extLst>
           </p:cNvPr>
@@ -11755,38 +12623,8 @@
         </p:blipFill>
         <p:spPr>
           <a:xfrm>
-            <a:off x="4788090" y="1761402"/>
-            <a:ext cx="3147409" cy="3339426"/>
-          </a:xfrm>
-          <a:prstGeom prst="rect">
-            <a:avLst/>
-          </a:prstGeom>
-        </p:spPr>
-      </p:pic>
-      <p:pic>
-        <p:nvPicPr>
-          <p:cNvPr id="6" name="Picture 5" descr="Diagram&#10;&#10;Description automatically generated">
-            <a:extLst>
-              <a:ext uri="{FF2B5EF4-FFF2-40B4-BE49-F238E27FC236}">
-                <a16:creationId xmlns:a16="http://schemas.microsoft.com/office/drawing/2014/main" id="{10DB4394-703E-C7F9-B741-61B0A6B09DDA}"/>
-              </a:ext>
-            </a:extLst>
-          </p:cNvPr>
-          <p:cNvPicPr>
-            <a:picLocks noChangeAspect="1"/>
-          </p:cNvPicPr>
-          <p:nvPr/>
-        </p:nvPicPr>
-        <p:blipFill>
-          <a:blip r:embed="rId3"/>
-          <a:stretch>
-            <a:fillRect/>
-          </a:stretch>
-        </p:blipFill>
-        <p:spPr>
-          <a:xfrm>
-            <a:off x="8260974" y="1778371"/>
-            <a:ext cx="3181533" cy="3305488"/>
+            <a:off x="5817010" y="1227802"/>
+            <a:ext cx="5788332" cy="4402393"/>
           </a:xfrm>
           <a:prstGeom prst="rect">
             <a:avLst/>
@@ -11796,7 +12634,7 @@
     </p:spTree>
     <p:extLst>
       <p:ext uri="{BB962C8B-B14F-4D97-AF65-F5344CB8AC3E}">
-        <p14:creationId xmlns:p14="http://schemas.microsoft.com/office/powerpoint/2010/main" val="809840982"/>
+        <p14:creationId xmlns:p14="http://schemas.microsoft.com/office/powerpoint/2010/main" val="3612393829"/>
       </p:ext>
     </p:extLst>
   </p:cSld>
@@ -11846,7 +12684,7 @@
           <a:p>
             <a:r>
               <a:rPr lang="en-US" dirty="0"/>
-              <a:t>Loan status by property area</a:t>
+              <a:t>Loan status per group (1)</a:t>
             </a:r>
           </a:p>
         </p:txBody>
@@ -11877,17 +12715,17 @@
             <a:pPr algn="just"/>
             <a:r>
               <a:rPr lang="en-US" sz="2000" dirty="0"/>
-              <a:t>Most applicants/co-applicants were married and are living in a semiurban area.</a:t>
+              <a:t>62% of the loan approval was given to applicants and co-applicants who are male, not graduated and married.</a:t>
             </a:r>
           </a:p>
         </p:txBody>
       </p:sp>
       <p:pic>
         <p:nvPicPr>
-          <p:cNvPr id="8" name="Picture 7">
-            <a:extLst>
-              <a:ext uri="{FF2B5EF4-FFF2-40B4-BE49-F238E27FC236}">
-                <a16:creationId xmlns:a16="http://schemas.microsoft.com/office/drawing/2014/main" id="{C6A4A1D5-D032-6A2E-8CA7-AEE95A3F97C8}"/>
+          <p:cNvPr id="3" name="Picture 2">
+            <a:extLst>
+              <a:ext uri="{FF2B5EF4-FFF2-40B4-BE49-F238E27FC236}">
+                <a16:creationId xmlns:a16="http://schemas.microsoft.com/office/drawing/2014/main" id="{7B065CF8-22B4-13FC-4B8C-270614F8AA30}"/>
               </a:ext>
             </a:extLst>
           </p:cNvPr>
@@ -11904,8 +12742,8 @@
         </p:blipFill>
         <p:spPr>
           <a:xfrm>
-            <a:off x="5998979" y="987424"/>
-            <a:ext cx="5852853" cy="4873626"/>
+            <a:off x="6576675" y="1246542"/>
+            <a:ext cx="5163129" cy="4364915"/>
           </a:xfrm>
           <a:prstGeom prst="rect">
             <a:avLst/>

</xml_diff>